<commit_message>
Modified "Goals" slide in power point
</commit_message>
<xml_diff>
--- a/BookStoreApp Presentation.pptx
+++ b/BookStoreApp Presentation.pptx
@@ -112,6 +112,11 @@
       </a:defRPr>
     </a:lvl9pPr>
   </p:defaultTextStyle>
+  <p:extLst>
+    <p:ext uri="{EFAFB233-063F-42B5-8137-9DF3F51BA10A}">
+      <p15:sldGuideLst xmlns:p15="http://schemas.microsoft.com/office/powerpoint/2012/main"/>
+    </p:ext>
+  </p:extLst>
 </p:presentation>
 </file>
 
@@ -301,7 +306,7 @@
           <a:p>
             <a:fld id="{F84A0333-8D1E-40F4-B17F-5D43FAAA70A1}" type="datetimeFigureOut">
               <a:rPr lang="en-US" smtClean="0"/>
-              <a:t>12/3/2014</a:t>
+              <a:t>12/8/2014</a:t>
             </a:fld>
             <a:endParaRPr lang="en-US"/>
           </a:p>
@@ -576,7 +581,7 @@
           <a:p>
             <a:fld id="{F84A0333-8D1E-40F4-B17F-5D43FAAA70A1}" type="datetimeFigureOut">
               <a:rPr lang="en-US" smtClean="0"/>
-              <a:t>12/3/2014</a:t>
+              <a:t>12/8/2014</a:t>
             </a:fld>
             <a:endParaRPr lang="en-US"/>
           </a:p>
@@ -770,7 +775,7 @@
           <a:p>
             <a:fld id="{F84A0333-8D1E-40F4-B17F-5D43FAAA70A1}" type="datetimeFigureOut">
               <a:rPr lang="en-US" smtClean="0"/>
-              <a:t>12/3/2014</a:t>
+              <a:t>12/8/2014</a:t>
             </a:fld>
             <a:endParaRPr lang="en-US"/>
           </a:p>
@@ -1043,7 +1048,7 @@
           <a:p>
             <a:fld id="{F84A0333-8D1E-40F4-B17F-5D43FAAA70A1}" type="datetimeFigureOut">
               <a:rPr lang="en-US" smtClean="0"/>
-              <a:t>12/3/2014</a:t>
+              <a:t>12/8/2014</a:t>
             </a:fld>
             <a:endParaRPr lang="en-US"/>
           </a:p>
@@ -1384,7 +1389,7 @@
           <a:p>
             <a:fld id="{F84A0333-8D1E-40F4-B17F-5D43FAAA70A1}" type="datetimeFigureOut">
               <a:rPr lang="en-US" smtClean="0"/>
-              <a:t>12/3/2014</a:t>
+              <a:t>12/8/2014</a:t>
             </a:fld>
             <a:endParaRPr lang="en-US"/>
           </a:p>
@@ -2007,7 +2012,7 @@
           <a:p>
             <a:fld id="{F84A0333-8D1E-40F4-B17F-5D43FAAA70A1}" type="datetimeFigureOut">
               <a:rPr lang="en-US" smtClean="0"/>
-              <a:t>12/3/2014</a:t>
+              <a:t>12/8/2014</a:t>
             </a:fld>
             <a:endParaRPr lang="en-US"/>
           </a:p>
@@ -2867,7 +2872,7 @@
           <a:p>
             <a:fld id="{F84A0333-8D1E-40F4-B17F-5D43FAAA70A1}" type="datetimeFigureOut">
               <a:rPr lang="en-US" smtClean="0"/>
-              <a:t>12/3/2014</a:t>
+              <a:t>12/8/2014</a:t>
             </a:fld>
             <a:endParaRPr lang="en-US"/>
           </a:p>
@@ -3037,7 +3042,7 @@
           <a:p>
             <a:fld id="{F84A0333-8D1E-40F4-B17F-5D43FAAA70A1}" type="datetimeFigureOut">
               <a:rPr lang="en-US" smtClean="0"/>
-              <a:t>12/3/2014</a:t>
+              <a:t>12/8/2014</a:t>
             </a:fld>
             <a:endParaRPr lang="en-US"/>
           </a:p>
@@ -3217,7 +3222,7 @@
           <a:p>
             <a:fld id="{F84A0333-8D1E-40F4-B17F-5D43FAAA70A1}" type="datetimeFigureOut">
               <a:rPr lang="en-US" smtClean="0"/>
-              <a:t>12/3/2014</a:t>
+              <a:t>12/8/2014</a:t>
             </a:fld>
             <a:endParaRPr lang="en-US"/>
           </a:p>
@@ -3387,7 +3392,7 @@
           <a:p>
             <a:fld id="{F84A0333-8D1E-40F4-B17F-5D43FAAA70A1}" type="datetimeFigureOut">
               <a:rPr lang="en-US" smtClean="0"/>
-              <a:t>12/3/2014</a:t>
+              <a:t>12/8/2014</a:t>
             </a:fld>
             <a:endParaRPr lang="en-US"/>
           </a:p>
@@ -3634,7 +3639,7 @@
           <a:p>
             <a:fld id="{F84A0333-8D1E-40F4-B17F-5D43FAAA70A1}" type="datetimeFigureOut">
               <a:rPr lang="en-US" smtClean="0"/>
-              <a:t>12/3/2014</a:t>
+              <a:t>12/8/2014</a:t>
             </a:fld>
             <a:endParaRPr lang="en-US"/>
           </a:p>
@@ -3926,7 +3931,7 @@
           <a:p>
             <a:fld id="{F84A0333-8D1E-40F4-B17F-5D43FAAA70A1}" type="datetimeFigureOut">
               <a:rPr lang="en-US" smtClean="0"/>
-              <a:t>12/3/2014</a:t>
+              <a:t>12/8/2014</a:t>
             </a:fld>
             <a:endParaRPr lang="en-US"/>
           </a:p>
@@ -4370,7 +4375,7 @@
           <a:p>
             <a:fld id="{F84A0333-8D1E-40F4-B17F-5D43FAAA70A1}" type="datetimeFigureOut">
               <a:rPr lang="en-US" smtClean="0"/>
-              <a:t>12/3/2014</a:t>
+              <a:t>12/8/2014</a:t>
             </a:fld>
             <a:endParaRPr lang="en-US"/>
           </a:p>
@@ -4488,7 +4493,7 @@
           <a:p>
             <a:fld id="{F84A0333-8D1E-40F4-B17F-5D43FAAA70A1}" type="datetimeFigureOut">
               <a:rPr lang="en-US" smtClean="0"/>
-              <a:t>12/3/2014</a:t>
+              <a:t>12/8/2014</a:t>
             </a:fld>
             <a:endParaRPr lang="en-US"/>
           </a:p>
@@ -4583,7 +4588,7 @@
           <a:p>
             <a:fld id="{F84A0333-8D1E-40F4-B17F-5D43FAAA70A1}" type="datetimeFigureOut">
               <a:rPr lang="en-US" smtClean="0"/>
-              <a:t>12/3/2014</a:t>
+              <a:t>12/8/2014</a:t>
             </a:fld>
             <a:endParaRPr lang="en-US"/>
           </a:p>
@@ -4862,7 +4867,7 @@
           <a:p>
             <a:fld id="{F84A0333-8D1E-40F4-B17F-5D43FAAA70A1}" type="datetimeFigureOut">
               <a:rPr lang="en-US" smtClean="0"/>
-              <a:t>12/3/2014</a:t>
+              <a:t>12/8/2014</a:t>
             </a:fld>
             <a:endParaRPr lang="en-US"/>
           </a:p>
@@ -5137,7 +5142,7 @@
           <a:p>
             <a:fld id="{F84A0333-8D1E-40F4-B17F-5D43FAAA70A1}" type="datetimeFigureOut">
               <a:rPr lang="en-US" smtClean="0"/>
-              <a:t>12/3/2014</a:t>
+              <a:t>12/8/2014</a:t>
             </a:fld>
             <a:endParaRPr lang="en-US"/>
           </a:p>
@@ -5566,7 +5571,7 @@
           <a:p>
             <a:fld id="{F84A0333-8D1E-40F4-B17F-5D43FAAA70A1}" type="datetimeFigureOut">
               <a:rPr lang="en-US" smtClean="0"/>
-              <a:t>12/3/2014</a:t>
+              <a:t>12/8/2014</a:t>
             </a:fld>
             <a:endParaRPr lang="en-US"/>
           </a:p>
@@ -6283,7 +6288,7 @@
           <a:p>
             <a:r>
               <a:rPr lang="en-US" dirty="0" smtClean="0"/>
-              <a:t>OVERVIEW</a:t>
+              <a:t>Design Goals</a:t>
             </a:r>
             <a:endParaRPr lang="en-US" dirty="0"/>
           </a:p>
@@ -6299,22 +6304,95 @@
             <p:ph idx="1"/>
           </p:nvPr>
         </p:nvSpPr>
-        <p:spPr/>
-        <p:txBody>
-          <a:bodyPr/>
+        <p:spPr>
+          <a:xfrm>
+            <a:off x="797169" y="1336431"/>
+            <a:ext cx="11207262" cy="5392614"/>
+          </a:xfrm>
+        </p:spPr>
+        <p:txBody>
+          <a:bodyPr>
+            <a:normAutofit/>
+          </a:bodyPr>
           <a:lstStyle/>
           <a:p>
             <a:r>
               <a:rPr lang="en-US" dirty="0" smtClean="0"/>
-              <a:t>goals of project</a:t>
-            </a:r>
-          </a:p>
-          <a:p>
+              <a:t>Must be able to search inventory for Books, </a:t>
+            </a:r>
+            <a:r>
+              <a:rPr lang="en-US" dirty="0" err="1" smtClean="0"/>
+              <a:t>ebooks</a:t>
+            </a:r>
             <a:r>
               <a:rPr lang="en-US" dirty="0" smtClean="0"/>
-              <a:t>functionalities</a:t>
-            </a:r>
-            <a:endParaRPr lang="en-US" dirty="0"/>
+              <a:t> and audio books.</a:t>
+            </a:r>
+          </a:p>
+          <a:p>
+            <a:pPr lvl="1"/>
+            <a:r>
+              <a:rPr lang="en-US" sz="2000" dirty="0" smtClean="0"/>
+              <a:t>Search by ISBN and display current inventory.</a:t>
+            </a:r>
+          </a:p>
+          <a:p>
+            <a:pPr marL="457200" lvl="1" indent="0">
+              <a:buNone/>
+            </a:pPr>
+            <a:endParaRPr lang="en-US" sz="2000" dirty="0" smtClean="0"/>
+          </a:p>
+          <a:p>
+            <a:r>
+              <a:rPr lang="en-US" dirty="0" smtClean="0"/>
+              <a:t>Must be able to display and manipulate the inventory database</a:t>
+            </a:r>
+          </a:p>
+          <a:p>
+            <a:pPr lvl="1"/>
+            <a:r>
+              <a:rPr lang="en-US" sz="2000" dirty="0" smtClean="0"/>
+              <a:t>Add, remove and display inventory items.</a:t>
+            </a:r>
+          </a:p>
+          <a:p>
+            <a:pPr marL="457200" lvl="1" indent="0">
+              <a:buNone/>
+            </a:pPr>
+            <a:endParaRPr lang="en-US" sz="2000" dirty="0" smtClean="0"/>
+          </a:p>
+          <a:p>
+            <a:r>
+              <a:rPr lang="en-US" dirty="0" smtClean="0"/>
+              <a:t>Must be able to display and manipulate the Employee database.</a:t>
+            </a:r>
+          </a:p>
+          <a:p>
+            <a:pPr lvl="1"/>
+            <a:r>
+              <a:rPr lang="en-US" sz="2000" dirty="0" smtClean="0"/>
+              <a:t>Add, remove and display current employee.</a:t>
+            </a:r>
+          </a:p>
+          <a:p>
+            <a:pPr marL="457200" lvl="1" indent="0">
+              <a:buNone/>
+            </a:pPr>
+            <a:endParaRPr lang="en-US" sz="2000" dirty="0" smtClean="0"/>
+          </a:p>
+          <a:p>
+            <a:r>
+              <a:rPr lang="en-US" dirty="0" smtClean="0"/>
+              <a:t>Must be able to display and manipulate transaction database.</a:t>
+            </a:r>
+          </a:p>
+          <a:p>
+            <a:pPr lvl="1"/>
+            <a:r>
+              <a:rPr lang="en-US" sz="2000" dirty="0" smtClean="0"/>
+              <a:t>Place new orders, remove existing orders and display current orders</a:t>
+            </a:r>
+            <a:endParaRPr lang="en-US" sz="2000" dirty="0"/>
           </a:p>
         </p:txBody>
       </p:sp>

</xml_diff>

<commit_message>
Added a few "Future features" to the power point
</commit_message>
<xml_diff>
--- a/BookStoreApp Presentation.pptx
+++ b/BookStoreApp Presentation.pptx
@@ -6889,7 +6889,38 @@
           <a:bodyPr/>
           <a:lstStyle/>
           <a:p>
-            <a:endParaRPr lang="en-US"/>
+            <a:pPr lvl="0"/>
+            <a:r>
+              <a:rPr lang="en-US" dirty="0" smtClean="0"/>
+              <a:t>Additional search criteria such as keywords and genre.</a:t>
+            </a:r>
+            <a:endParaRPr lang="en-US" dirty="0"/>
+          </a:p>
+          <a:p>
+            <a:pPr lvl="0"/>
+            <a:r>
+              <a:rPr lang="en-US" dirty="0" smtClean="0"/>
+              <a:t>Track </a:t>
+            </a:r>
+            <a:r>
+              <a:rPr lang="en-US" dirty="0" smtClean="0"/>
+              <a:t>statistics</a:t>
+            </a:r>
+          </a:p>
+          <a:p>
+            <a:pPr lvl="1"/>
+            <a:r>
+              <a:rPr lang="en-US" dirty="0" smtClean="0"/>
+              <a:t>Most popular Book, author, etc. </a:t>
+            </a:r>
+            <a:endParaRPr lang="en-US" dirty="0"/>
+          </a:p>
+          <a:p>
+            <a:r>
+              <a:rPr lang="en-US" dirty="0" smtClean="0"/>
+              <a:t>Addition functionality for managers such as discount items</a:t>
+            </a:r>
+            <a:endParaRPr lang="en-US" dirty="0"/>
           </a:p>
         </p:txBody>
       </p:sp>

</xml_diff>

<commit_message>
Added the inheritance hierarchy
</commit_message>
<xml_diff>
--- a/BookStoreApp Presentation.pptx
+++ b/BookStoreApp Presentation.pptx
@@ -114,7 +114,7 @@
   </p:defaultTextStyle>
   <p:extLst>
     <p:ext uri="{EFAFB233-063F-42B5-8137-9DF3F51BA10A}">
-      <p15:sldGuideLst xmlns:p15="http://schemas.microsoft.com/office/powerpoint/2012/main"/>
+      <p15:sldGuideLst xmlns:p15="http://schemas.microsoft.com/office/powerpoint/2012/main" xmlns=""/>
     </p:ext>
   </p:extLst>
 </p:presentation>
@@ -306,7 +306,7 @@
           <a:p>
             <a:fld id="{F84A0333-8D1E-40F4-B17F-5D43FAAA70A1}" type="datetimeFigureOut">
               <a:rPr lang="en-US" smtClean="0"/>
-              <a:t>12/8/2014</a:t>
+              <a:t>12/8/14</a:t>
             </a:fld>
             <a:endParaRPr lang="en-US"/>
           </a:p>
@@ -581,7 +581,7 @@
           <a:p>
             <a:fld id="{F84A0333-8D1E-40F4-B17F-5D43FAAA70A1}" type="datetimeFigureOut">
               <a:rPr lang="en-US" smtClean="0"/>
-              <a:t>12/8/2014</a:t>
+              <a:t>12/8/14</a:t>
             </a:fld>
             <a:endParaRPr lang="en-US"/>
           </a:p>
@@ -775,7 +775,7 @@
           <a:p>
             <a:fld id="{F84A0333-8D1E-40F4-B17F-5D43FAAA70A1}" type="datetimeFigureOut">
               <a:rPr lang="en-US" smtClean="0"/>
-              <a:t>12/8/2014</a:t>
+              <a:t>12/8/14</a:t>
             </a:fld>
             <a:endParaRPr lang="en-US"/>
           </a:p>
@@ -1048,7 +1048,7 @@
           <a:p>
             <a:fld id="{F84A0333-8D1E-40F4-B17F-5D43FAAA70A1}" type="datetimeFigureOut">
               <a:rPr lang="en-US" smtClean="0"/>
-              <a:t>12/8/2014</a:t>
+              <a:t>12/8/14</a:t>
             </a:fld>
             <a:endParaRPr lang="en-US"/>
           </a:p>
@@ -1389,7 +1389,7 @@
           <a:p>
             <a:fld id="{F84A0333-8D1E-40F4-B17F-5D43FAAA70A1}" type="datetimeFigureOut">
               <a:rPr lang="en-US" smtClean="0"/>
-              <a:t>12/8/2014</a:t>
+              <a:t>12/8/14</a:t>
             </a:fld>
             <a:endParaRPr lang="en-US"/>
           </a:p>
@@ -2012,7 +2012,7 @@
           <a:p>
             <a:fld id="{F84A0333-8D1E-40F4-B17F-5D43FAAA70A1}" type="datetimeFigureOut">
               <a:rPr lang="en-US" smtClean="0"/>
-              <a:t>12/8/2014</a:t>
+              <a:t>12/8/14</a:t>
             </a:fld>
             <a:endParaRPr lang="en-US"/>
           </a:p>
@@ -2872,7 +2872,7 @@
           <a:p>
             <a:fld id="{F84A0333-8D1E-40F4-B17F-5D43FAAA70A1}" type="datetimeFigureOut">
               <a:rPr lang="en-US" smtClean="0"/>
-              <a:t>12/8/2014</a:t>
+              <a:t>12/8/14</a:t>
             </a:fld>
             <a:endParaRPr lang="en-US"/>
           </a:p>
@@ -3042,7 +3042,7 @@
           <a:p>
             <a:fld id="{F84A0333-8D1E-40F4-B17F-5D43FAAA70A1}" type="datetimeFigureOut">
               <a:rPr lang="en-US" smtClean="0"/>
-              <a:t>12/8/2014</a:t>
+              <a:t>12/8/14</a:t>
             </a:fld>
             <a:endParaRPr lang="en-US"/>
           </a:p>
@@ -3222,7 +3222,7 @@
           <a:p>
             <a:fld id="{F84A0333-8D1E-40F4-B17F-5D43FAAA70A1}" type="datetimeFigureOut">
               <a:rPr lang="en-US" smtClean="0"/>
-              <a:t>12/8/2014</a:t>
+              <a:t>12/8/14</a:t>
             </a:fld>
             <a:endParaRPr lang="en-US"/>
           </a:p>
@@ -3392,7 +3392,7 @@
           <a:p>
             <a:fld id="{F84A0333-8D1E-40F4-B17F-5D43FAAA70A1}" type="datetimeFigureOut">
               <a:rPr lang="en-US" smtClean="0"/>
-              <a:t>12/8/2014</a:t>
+              <a:t>12/8/14</a:t>
             </a:fld>
             <a:endParaRPr lang="en-US"/>
           </a:p>
@@ -3639,7 +3639,7 @@
           <a:p>
             <a:fld id="{F84A0333-8D1E-40F4-B17F-5D43FAAA70A1}" type="datetimeFigureOut">
               <a:rPr lang="en-US" smtClean="0"/>
-              <a:t>12/8/2014</a:t>
+              <a:t>12/8/14</a:t>
             </a:fld>
             <a:endParaRPr lang="en-US"/>
           </a:p>
@@ -3931,7 +3931,7 @@
           <a:p>
             <a:fld id="{F84A0333-8D1E-40F4-B17F-5D43FAAA70A1}" type="datetimeFigureOut">
               <a:rPr lang="en-US" smtClean="0"/>
-              <a:t>12/8/2014</a:t>
+              <a:t>12/8/14</a:t>
             </a:fld>
             <a:endParaRPr lang="en-US"/>
           </a:p>
@@ -4375,7 +4375,7 @@
           <a:p>
             <a:fld id="{F84A0333-8D1E-40F4-B17F-5D43FAAA70A1}" type="datetimeFigureOut">
               <a:rPr lang="en-US" smtClean="0"/>
-              <a:t>12/8/2014</a:t>
+              <a:t>12/8/14</a:t>
             </a:fld>
             <a:endParaRPr lang="en-US"/>
           </a:p>
@@ -4493,7 +4493,7 @@
           <a:p>
             <a:fld id="{F84A0333-8D1E-40F4-B17F-5D43FAAA70A1}" type="datetimeFigureOut">
               <a:rPr lang="en-US" smtClean="0"/>
-              <a:t>12/8/2014</a:t>
+              <a:t>12/8/14</a:t>
             </a:fld>
             <a:endParaRPr lang="en-US"/>
           </a:p>
@@ -4588,7 +4588,7 @@
           <a:p>
             <a:fld id="{F84A0333-8D1E-40F4-B17F-5D43FAAA70A1}" type="datetimeFigureOut">
               <a:rPr lang="en-US" smtClean="0"/>
-              <a:t>12/8/2014</a:t>
+              <a:t>12/8/14</a:t>
             </a:fld>
             <a:endParaRPr lang="en-US"/>
           </a:p>
@@ -4867,7 +4867,7 @@
           <a:p>
             <a:fld id="{F84A0333-8D1E-40F4-B17F-5D43FAAA70A1}" type="datetimeFigureOut">
               <a:rPr lang="en-US" smtClean="0"/>
-              <a:t>12/8/2014</a:t>
+              <a:t>12/8/14</a:t>
             </a:fld>
             <a:endParaRPr lang="en-US"/>
           </a:p>
@@ -5142,7 +5142,7 @@
           <a:p>
             <a:fld id="{F84A0333-8D1E-40F4-B17F-5D43FAAA70A1}" type="datetimeFigureOut">
               <a:rPr lang="en-US" smtClean="0"/>
-              <a:t>12/8/2014</a:t>
+              <a:t>12/8/14</a:t>
             </a:fld>
             <a:endParaRPr lang="en-US"/>
           </a:p>
@@ -5571,7 +5571,7 @@
           <a:p>
             <a:fld id="{F84A0333-8D1E-40F4-B17F-5D43FAAA70A1}" type="datetimeFigureOut">
               <a:rPr lang="en-US" smtClean="0"/>
-              <a:t>12/8/2014</a:t>
+              <a:t>12/8/14</a:t>
             </a:fld>
             <a:endParaRPr lang="en-US"/>
           </a:p>
@@ -6247,7 +6247,7 @@
   <p:timing>
     <p:tnLst>
       <p:par>
-        <p:cTn id="1" dur="indefinite" restart="never" nodeType="tmRoot"/>
+        <p:cTn xmlns:p14="http://schemas.microsoft.com/office/powerpoint/2010/main" id="1" dur="indefinite" restart="never" nodeType="tmRoot"/>
       </p:par>
     </p:tnLst>
   </p:timing>
@@ -6409,7 +6409,7 @@
   <p:timing>
     <p:tnLst>
       <p:par>
-        <p:cTn id="1" dur="indefinite" restart="never" nodeType="tmRoot"/>
+        <p:cTn xmlns:p14="http://schemas.microsoft.com/office/powerpoint/2010/main" id="1" dur="indefinite" restart="never" nodeType="tmRoot"/>
       </p:par>
     </p:tnLst>
   </p:timing>
@@ -6466,14 +6466,230 @@
             <p:ph idx="1"/>
           </p:nvPr>
         </p:nvSpPr>
-        <p:spPr/>
-        <p:txBody>
-          <a:bodyPr/>
+        <p:spPr>
+          <a:xfrm>
+            <a:off x="1103312" y="1374588"/>
+            <a:ext cx="8946541" cy="4873812"/>
+          </a:xfrm>
+        </p:spPr>
+        <p:txBody>
+          <a:bodyPr>
+            <a:normAutofit fontScale="92500" lnSpcReduction="10000"/>
+          </a:bodyPr>
           <a:lstStyle/>
           <a:p>
             <a:r>
               <a:rPr lang="en-US" dirty="0" smtClean="0"/>
-              <a:t>Separate slide for each Class</a:t>
+              <a:t>Separate slide for each </a:t>
+            </a:r>
+            <a:r>
+              <a:rPr lang="en-US" dirty="0" smtClean="0"/>
+              <a:t>Class </a:t>
+            </a:r>
+            <a:r>
+              <a:rPr lang="en-US" dirty="0" smtClean="0">
+                <a:sym typeface="Wingdings"/>
+              </a:rPr>
+              <a:t> this will make the presentation too long, how about:</a:t>
+            </a:r>
+          </a:p>
+          <a:p>
+            <a:r>
+              <a:rPr lang="en-US" dirty="0" smtClean="0">
+                <a:sym typeface="Wingdings"/>
+              </a:rPr>
+              <a:t>Item Hierarchy: </a:t>
+            </a:r>
+          </a:p>
+          <a:p>
+            <a:pPr lvl="1"/>
+            <a:r>
+              <a:rPr lang="en-US" dirty="0">
+                <a:sym typeface="Wingdings"/>
+              </a:rPr>
+              <a:t>A</a:t>
+            </a:r>
+            <a:r>
+              <a:rPr lang="en-US" dirty="0" smtClean="0">
+                <a:sym typeface="Wingdings"/>
+              </a:rPr>
+              <a:t>ll the items that can be ordered</a:t>
+            </a:r>
+          </a:p>
+          <a:p>
+            <a:pPr lvl="1"/>
+            <a:r>
+              <a:rPr lang="en-US" dirty="0" smtClean="0">
+                <a:sym typeface="Wingdings"/>
+              </a:rPr>
+              <a:t>Item, </a:t>
+            </a:r>
+            <a:r>
+              <a:rPr lang="en-US" dirty="0" err="1" smtClean="0">
+                <a:sym typeface="Wingdings"/>
+              </a:rPr>
+              <a:t>InventoryItem</a:t>
+            </a:r>
+            <a:r>
+              <a:rPr lang="en-US" dirty="0" smtClean="0">
+                <a:sym typeface="Wingdings"/>
+              </a:rPr>
+              <a:t>, Product, Book, </a:t>
+            </a:r>
+            <a:r>
+              <a:rPr lang="en-US" dirty="0" err="1" smtClean="0">
+                <a:sym typeface="Wingdings"/>
+              </a:rPr>
+              <a:t>PaperBook</a:t>
+            </a:r>
+            <a:r>
+              <a:rPr lang="en-US" dirty="0" smtClean="0">
+                <a:sym typeface="Wingdings"/>
+              </a:rPr>
+              <a:t>/eBook/</a:t>
+            </a:r>
+            <a:r>
+              <a:rPr lang="en-US" dirty="0" err="1" smtClean="0">
+                <a:sym typeface="Wingdings"/>
+              </a:rPr>
+              <a:t>AudioBook</a:t>
+            </a:r>
+            <a:endParaRPr lang="en-US" dirty="0" smtClean="0">
+              <a:sym typeface="Wingdings"/>
+            </a:endParaRPr>
+          </a:p>
+          <a:p>
+            <a:r>
+              <a:rPr lang="en-US" dirty="0" smtClean="0">
+                <a:sym typeface="Wingdings"/>
+              </a:rPr>
+              <a:t>Person Hierarchy:</a:t>
+            </a:r>
+          </a:p>
+          <a:p>
+            <a:pPr lvl="1"/>
+            <a:r>
+              <a:rPr lang="en-US" dirty="0" smtClean="0">
+                <a:sym typeface="Wingdings"/>
+              </a:rPr>
+              <a:t>Children are Employee and Customer. Employee </a:t>
+            </a:r>
+            <a:r>
+              <a:rPr lang="en-US" dirty="0" smtClean="0">
+                <a:sym typeface="Wingdings"/>
+              </a:rPr>
+              <a:t>is </a:t>
+            </a:r>
+            <a:r>
+              <a:rPr lang="en-US" dirty="0" smtClean="0">
+                <a:sym typeface="Wingdings"/>
+              </a:rPr>
+              <a:t>parent to Manager.</a:t>
+            </a:r>
+          </a:p>
+          <a:p>
+            <a:r>
+              <a:rPr lang="en-US" dirty="0" smtClean="0">
+                <a:sym typeface="Wingdings"/>
+              </a:rPr>
+              <a:t>Order Hierarchy:</a:t>
+            </a:r>
+          </a:p>
+          <a:p>
+            <a:pPr lvl="1"/>
+            <a:r>
+              <a:rPr lang="en-US" dirty="0" smtClean="0">
+                <a:sym typeface="Wingdings"/>
+              </a:rPr>
+              <a:t>Currently only one child: </a:t>
+            </a:r>
+            <a:r>
+              <a:rPr lang="en-US" dirty="0" err="1" smtClean="0">
+                <a:sym typeface="Wingdings"/>
+              </a:rPr>
+              <a:t>StoreOrder</a:t>
+            </a:r>
+            <a:r>
+              <a:rPr lang="en-US" dirty="0" smtClean="0">
+                <a:sym typeface="Wingdings"/>
+              </a:rPr>
+              <a:t>. Time did not permit </a:t>
+            </a:r>
+            <a:r>
+              <a:rPr lang="en-US" dirty="0" err="1" smtClean="0">
+                <a:sym typeface="Wingdings"/>
+              </a:rPr>
+              <a:t>CustomerOrder</a:t>
+            </a:r>
+            <a:r>
+              <a:rPr lang="en-US" dirty="0" smtClean="0">
+                <a:sym typeface="Wingdings"/>
+              </a:rPr>
+              <a:t>.</a:t>
+            </a:r>
+          </a:p>
+          <a:p>
+            <a:r>
+              <a:rPr lang="en-US" dirty="0" smtClean="0">
+                <a:sym typeface="Wingdings"/>
+              </a:rPr>
+              <a:t>List Hierarchy:</a:t>
+            </a:r>
+          </a:p>
+          <a:p>
+            <a:pPr lvl="1"/>
+            <a:r>
+              <a:rPr lang="en-US" dirty="0" err="1" smtClean="0">
+                <a:sym typeface="Wingdings"/>
+              </a:rPr>
+              <a:t>InventoryList</a:t>
+            </a:r>
+            <a:r>
+              <a:rPr lang="en-US" dirty="0" smtClean="0">
+                <a:sym typeface="Wingdings"/>
+              </a:rPr>
+              <a:t> of all items, </a:t>
+            </a:r>
+            <a:r>
+              <a:rPr lang="en-US" dirty="0" err="1" smtClean="0">
+                <a:sym typeface="Wingdings"/>
+              </a:rPr>
+              <a:t>EmployeeList</a:t>
+            </a:r>
+            <a:r>
+              <a:rPr lang="en-US" dirty="0" smtClean="0">
+                <a:sym typeface="Wingdings"/>
+              </a:rPr>
+              <a:t> of all employees, </a:t>
+            </a:r>
+            <a:r>
+              <a:rPr lang="en-US" dirty="0" err="1" smtClean="0">
+                <a:sym typeface="Wingdings"/>
+              </a:rPr>
+              <a:t>OrderList</a:t>
+            </a:r>
+            <a:r>
+              <a:rPr lang="en-US" dirty="0" smtClean="0">
+                <a:sym typeface="Wingdings"/>
+              </a:rPr>
+              <a:t> of all orders.</a:t>
+            </a:r>
+            <a:endParaRPr lang="en-US" dirty="0" smtClean="0">
+              <a:sym typeface="Wingdings"/>
+            </a:endParaRPr>
+          </a:p>
+          <a:p>
+            <a:r>
+              <a:rPr lang="en-US" dirty="0" err="1" smtClean="0">
+                <a:sym typeface="Wingdings"/>
+              </a:rPr>
+              <a:t>BookStoreSystem</a:t>
+            </a:r>
+            <a:r>
+              <a:rPr lang="en-US" dirty="0" smtClean="0">
+                <a:sym typeface="Wingdings"/>
+              </a:rPr>
+              <a:t>: Reads data from the three database files and shows menu to add/remove/view item/employee/order</a:t>
             </a:r>
             <a:endParaRPr lang="en-US" dirty="0"/>
           </a:p>
@@ -6492,7 +6708,7 @@
   <p:timing>
     <p:tnLst>
       <p:par>
-        <p:cTn id="1" dur="indefinite" restart="never" nodeType="tmRoot"/>
+        <p:cTn xmlns:p14="http://schemas.microsoft.com/office/powerpoint/2010/main" id="1" dur="indefinite" restart="never" nodeType="tmRoot"/>
       </p:par>
     </p:tnLst>
   </p:timing>
@@ -6571,7 +6787,7 @@
   <p:timing>
     <p:tnLst>
       <p:par>
-        <p:cTn id="1" dur="indefinite" restart="never" nodeType="tmRoot"/>
+        <p:cTn xmlns:p14="http://schemas.microsoft.com/office/powerpoint/2010/main" id="1" dur="indefinite" restart="never" nodeType="tmRoot"/>
       </p:par>
     </p:tnLst>
   </p:timing>
@@ -6620,19 +6836,1360 @@
       </p:sp>
       <p:sp>
         <p:nvSpPr>
-          <p:cNvPr id="3" name="Content Placeholder 2"/>
-          <p:cNvSpPr>
-            <a:spLocks noGrp="1"/>
-          </p:cNvSpPr>
-          <p:nvPr>
-            <p:ph idx="1"/>
-          </p:nvPr>
-        </p:nvSpPr>
-        <p:spPr/>
-        <p:txBody>
-          <a:bodyPr/>
-          <a:lstStyle/>
-          <a:p>
+          <p:cNvPr id="4" name="Rectangle 3"/>
+          <p:cNvSpPr/>
+          <p:nvPr/>
+        </p:nvSpPr>
+        <p:spPr>
+          <a:xfrm>
+            <a:off x="4915647" y="2510117"/>
+            <a:ext cx="1778000" cy="552825"/>
+          </a:xfrm>
+          <a:prstGeom prst="rect">
+            <a:avLst/>
+          </a:prstGeom>
+          <a:noFill/>
+          <a:ln>
+            <a:solidFill>
+              <a:schemeClr val="tx1"/>
+            </a:solidFill>
+          </a:ln>
+        </p:spPr>
+        <p:style>
+          <a:lnRef idx="1">
+            <a:schemeClr val="accent1"/>
+          </a:lnRef>
+          <a:fillRef idx="3">
+            <a:schemeClr val="accent1"/>
+          </a:fillRef>
+          <a:effectRef idx="2">
+            <a:schemeClr val="accent1"/>
+          </a:effectRef>
+          <a:fontRef idx="minor">
+            <a:schemeClr val="lt1"/>
+          </a:fontRef>
+        </p:style>
+        <p:txBody>
+          <a:bodyPr rtlCol="0" anchor="ctr"/>
+          <a:lstStyle/>
+          <a:p>
+            <a:pPr algn="ctr"/>
+            <a:r>
+              <a:rPr lang="en-US" dirty="0" smtClean="0"/>
+              <a:t>Item</a:t>
+            </a:r>
+            <a:endParaRPr lang="en-US" dirty="0"/>
+          </a:p>
+        </p:txBody>
+      </p:sp>
+      <p:sp>
+        <p:nvSpPr>
+          <p:cNvPr id="5" name="Rectangle 4"/>
+          <p:cNvSpPr/>
+          <p:nvPr/>
+        </p:nvSpPr>
+        <p:spPr>
+          <a:xfrm>
+            <a:off x="4918635" y="3376706"/>
+            <a:ext cx="1775011" cy="510990"/>
+          </a:xfrm>
+          <a:prstGeom prst="rect">
+            <a:avLst/>
+          </a:prstGeom>
+          <a:noFill/>
+          <a:ln>
+            <a:solidFill>
+              <a:schemeClr val="tx1"/>
+            </a:solidFill>
+          </a:ln>
+        </p:spPr>
+        <p:style>
+          <a:lnRef idx="1">
+            <a:schemeClr val="accent1"/>
+          </a:lnRef>
+          <a:fillRef idx="3">
+            <a:schemeClr val="accent1"/>
+          </a:fillRef>
+          <a:effectRef idx="2">
+            <a:schemeClr val="accent1"/>
+          </a:effectRef>
+          <a:fontRef idx="minor">
+            <a:schemeClr val="lt1"/>
+          </a:fontRef>
+        </p:style>
+        <p:txBody>
+          <a:bodyPr rtlCol="0" anchor="ctr"/>
+          <a:lstStyle/>
+          <a:p>
+            <a:pPr algn="ctr"/>
+            <a:r>
+              <a:rPr lang="en-US" dirty="0" err="1" smtClean="0"/>
+              <a:t>InventoryItem</a:t>
+            </a:r>
+            <a:endParaRPr lang="en-US" dirty="0"/>
+          </a:p>
+        </p:txBody>
+      </p:sp>
+      <p:sp>
+        <p:nvSpPr>
+          <p:cNvPr id="6" name="Rectangle 5"/>
+          <p:cNvSpPr/>
+          <p:nvPr/>
+        </p:nvSpPr>
+        <p:spPr>
+          <a:xfrm>
+            <a:off x="4918635" y="4228353"/>
+            <a:ext cx="1775011" cy="510990"/>
+          </a:xfrm>
+          <a:prstGeom prst="rect">
+            <a:avLst/>
+          </a:prstGeom>
+          <a:noFill/>
+          <a:ln>
+            <a:solidFill>
+              <a:schemeClr val="tx1"/>
+            </a:solidFill>
+          </a:ln>
+        </p:spPr>
+        <p:style>
+          <a:lnRef idx="1">
+            <a:schemeClr val="accent1"/>
+          </a:lnRef>
+          <a:fillRef idx="3">
+            <a:schemeClr val="accent1"/>
+          </a:fillRef>
+          <a:effectRef idx="2">
+            <a:schemeClr val="accent1"/>
+          </a:effectRef>
+          <a:fontRef idx="minor">
+            <a:schemeClr val="lt1"/>
+          </a:fontRef>
+        </p:style>
+        <p:txBody>
+          <a:bodyPr rtlCol="0" anchor="ctr"/>
+          <a:lstStyle/>
+          <a:p>
+            <a:pPr algn="ctr"/>
+            <a:r>
+              <a:rPr lang="en-US" dirty="0" smtClean="0"/>
+              <a:t>Product</a:t>
+            </a:r>
+            <a:endParaRPr lang="en-US" dirty="0"/>
+          </a:p>
+        </p:txBody>
+      </p:sp>
+      <p:sp>
+        <p:nvSpPr>
+          <p:cNvPr id="7" name="Rectangle 6"/>
+          <p:cNvSpPr/>
+          <p:nvPr/>
+        </p:nvSpPr>
+        <p:spPr>
+          <a:xfrm>
+            <a:off x="4933577" y="5124823"/>
+            <a:ext cx="1760070" cy="496049"/>
+          </a:xfrm>
+          <a:prstGeom prst="rect">
+            <a:avLst/>
+          </a:prstGeom>
+          <a:noFill/>
+          <a:ln>
+            <a:solidFill>
+              <a:schemeClr val="tx1"/>
+            </a:solidFill>
+          </a:ln>
+        </p:spPr>
+        <p:style>
+          <a:lnRef idx="1">
+            <a:schemeClr val="accent1"/>
+          </a:lnRef>
+          <a:fillRef idx="3">
+            <a:schemeClr val="accent1"/>
+          </a:fillRef>
+          <a:effectRef idx="2">
+            <a:schemeClr val="accent1"/>
+          </a:effectRef>
+          <a:fontRef idx="minor">
+            <a:schemeClr val="lt1"/>
+          </a:fontRef>
+        </p:style>
+        <p:txBody>
+          <a:bodyPr rtlCol="0" anchor="ctr"/>
+          <a:lstStyle/>
+          <a:p>
+            <a:pPr algn="ctr"/>
+            <a:r>
+              <a:rPr lang="en-US" dirty="0" smtClean="0"/>
+              <a:t>Book</a:t>
+            </a:r>
+            <a:endParaRPr lang="en-US" dirty="0"/>
+          </a:p>
+        </p:txBody>
+      </p:sp>
+      <p:sp>
+        <p:nvSpPr>
+          <p:cNvPr id="9" name="Rectangle 8"/>
+          <p:cNvSpPr/>
+          <p:nvPr/>
+        </p:nvSpPr>
+        <p:spPr>
+          <a:xfrm>
+            <a:off x="3316941" y="5982450"/>
+            <a:ext cx="1485152" cy="597646"/>
+          </a:xfrm>
+          <a:prstGeom prst="rect">
+            <a:avLst/>
+          </a:prstGeom>
+          <a:noFill/>
+          <a:ln>
+            <a:solidFill>
+              <a:schemeClr val="tx1"/>
+            </a:solidFill>
+          </a:ln>
+        </p:spPr>
+        <p:style>
+          <a:lnRef idx="1">
+            <a:schemeClr val="accent1"/>
+          </a:lnRef>
+          <a:fillRef idx="3">
+            <a:schemeClr val="accent1"/>
+          </a:fillRef>
+          <a:effectRef idx="2">
+            <a:schemeClr val="accent1"/>
+          </a:effectRef>
+          <a:fontRef idx="minor">
+            <a:schemeClr val="lt1"/>
+          </a:fontRef>
+        </p:style>
+        <p:txBody>
+          <a:bodyPr rtlCol="0" anchor="ctr"/>
+          <a:lstStyle/>
+          <a:p>
+            <a:pPr algn="ctr"/>
+            <a:r>
+              <a:rPr lang="en-US" dirty="0" smtClean="0"/>
+              <a:t>eBook</a:t>
+            </a:r>
+            <a:endParaRPr lang="en-US" dirty="0"/>
+          </a:p>
+        </p:txBody>
+      </p:sp>
+      <p:sp>
+        <p:nvSpPr>
+          <p:cNvPr id="10" name="Rectangle 9"/>
+          <p:cNvSpPr/>
+          <p:nvPr/>
+        </p:nvSpPr>
+        <p:spPr>
+          <a:xfrm>
+            <a:off x="4993340" y="5970497"/>
+            <a:ext cx="1610659" cy="597646"/>
+          </a:xfrm>
+          <a:prstGeom prst="rect">
+            <a:avLst/>
+          </a:prstGeom>
+          <a:noFill/>
+          <a:ln>
+            <a:solidFill>
+              <a:schemeClr val="tx1"/>
+            </a:solidFill>
+          </a:ln>
+        </p:spPr>
+        <p:style>
+          <a:lnRef idx="1">
+            <a:schemeClr val="accent1"/>
+          </a:lnRef>
+          <a:fillRef idx="3">
+            <a:schemeClr val="accent1"/>
+          </a:fillRef>
+          <a:effectRef idx="2">
+            <a:schemeClr val="accent1"/>
+          </a:effectRef>
+          <a:fontRef idx="minor">
+            <a:schemeClr val="lt1"/>
+          </a:fontRef>
+        </p:style>
+        <p:txBody>
+          <a:bodyPr rtlCol="0" anchor="ctr"/>
+          <a:lstStyle/>
+          <a:p>
+            <a:pPr algn="ctr"/>
+            <a:r>
+              <a:rPr lang="en-US" dirty="0" err="1" smtClean="0"/>
+              <a:t>PaperBook</a:t>
+            </a:r>
+            <a:endParaRPr lang="en-US" dirty="0"/>
+          </a:p>
+        </p:txBody>
+      </p:sp>
+      <p:sp>
+        <p:nvSpPr>
+          <p:cNvPr id="11" name="Rectangle 10"/>
+          <p:cNvSpPr/>
+          <p:nvPr/>
+        </p:nvSpPr>
+        <p:spPr>
+          <a:xfrm>
+            <a:off x="6819152" y="5973485"/>
+            <a:ext cx="1485152" cy="597646"/>
+          </a:xfrm>
+          <a:prstGeom prst="rect">
+            <a:avLst/>
+          </a:prstGeom>
+          <a:noFill/>
+          <a:ln>
+            <a:solidFill>
+              <a:schemeClr val="tx1"/>
+            </a:solidFill>
+          </a:ln>
+        </p:spPr>
+        <p:style>
+          <a:lnRef idx="1">
+            <a:schemeClr val="accent1"/>
+          </a:lnRef>
+          <a:fillRef idx="3">
+            <a:schemeClr val="accent1"/>
+          </a:fillRef>
+          <a:effectRef idx="2">
+            <a:schemeClr val="accent1"/>
+          </a:effectRef>
+          <a:fontRef idx="minor">
+            <a:schemeClr val="lt1"/>
+          </a:fontRef>
+        </p:style>
+        <p:txBody>
+          <a:bodyPr rtlCol="0" anchor="ctr"/>
+          <a:lstStyle/>
+          <a:p>
+            <a:pPr algn="ctr"/>
+            <a:r>
+              <a:rPr lang="en-US" dirty="0" err="1" smtClean="0"/>
+              <a:t>AudioBook</a:t>
+            </a:r>
+            <a:endParaRPr lang="en-US" dirty="0"/>
+          </a:p>
+        </p:txBody>
+      </p:sp>
+      <p:cxnSp>
+        <p:nvCxnSpPr>
+          <p:cNvPr id="13" name="Straight Arrow Connector 12"/>
+          <p:cNvCxnSpPr>
+            <a:stCxn id="5" idx="0"/>
+            <a:endCxn id="4" idx="2"/>
+          </p:cNvCxnSpPr>
+          <p:nvPr/>
+        </p:nvCxnSpPr>
+        <p:spPr>
+          <a:xfrm flipH="1" flipV="1">
+            <a:off x="5804647" y="3062942"/>
+            <a:ext cx="1494" cy="313764"/>
+          </a:xfrm>
+          <a:prstGeom prst="straightConnector1">
+            <a:avLst/>
+          </a:prstGeom>
+          <a:ln>
+            <a:solidFill>
+              <a:srgbClr val="FFFFFF"/>
+            </a:solidFill>
+            <a:tailEnd type="arrow"/>
+          </a:ln>
+        </p:spPr>
+        <p:style>
+          <a:lnRef idx="2">
+            <a:schemeClr val="accent1"/>
+          </a:lnRef>
+          <a:fillRef idx="0">
+            <a:schemeClr val="accent1"/>
+          </a:fillRef>
+          <a:effectRef idx="1">
+            <a:schemeClr val="accent1"/>
+          </a:effectRef>
+          <a:fontRef idx="minor">
+            <a:schemeClr val="tx1"/>
+          </a:fontRef>
+        </p:style>
+      </p:cxnSp>
+      <p:cxnSp>
+        <p:nvCxnSpPr>
+          <p:cNvPr id="14" name="Straight Arrow Connector 13"/>
+          <p:cNvCxnSpPr>
+            <a:stCxn id="10" idx="0"/>
+          </p:cNvCxnSpPr>
+          <p:nvPr/>
+        </p:nvCxnSpPr>
+        <p:spPr>
+          <a:xfrm flipH="1" flipV="1">
+            <a:off x="5792694" y="5605933"/>
+            <a:ext cx="5976" cy="364564"/>
+          </a:xfrm>
+          <a:prstGeom prst="straightConnector1">
+            <a:avLst/>
+          </a:prstGeom>
+          <a:ln>
+            <a:solidFill>
+              <a:srgbClr val="FFFFFF"/>
+            </a:solidFill>
+            <a:tailEnd type="arrow"/>
+          </a:ln>
+        </p:spPr>
+        <p:style>
+          <a:lnRef idx="2">
+            <a:schemeClr val="accent1"/>
+          </a:lnRef>
+          <a:fillRef idx="0">
+            <a:schemeClr val="accent1"/>
+          </a:fillRef>
+          <a:effectRef idx="1">
+            <a:schemeClr val="accent1"/>
+          </a:effectRef>
+          <a:fontRef idx="minor">
+            <a:schemeClr val="tx1"/>
+          </a:fontRef>
+        </p:style>
+      </p:cxnSp>
+      <p:cxnSp>
+        <p:nvCxnSpPr>
+          <p:cNvPr id="15" name="Straight Arrow Connector 14"/>
+          <p:cNvCxnSpPr>
+            <a:endCxn id="6" idx="2"/>
+          </p:cNvCxnSpPr>
+          <p:nvPr/>
+        </p:nvCxnSpPr>
+        <p:spPr>
+          <a:xfrm flipH="1" flipV="1">
+            <a:off x="5806141" y="4739343"/>
+            <a:ext cx="5976" cy="274920"/>
+          </a:xfrm>
+          <a:prstGeom prst="straightConnector1">
+            <a:avLst/>
+          </a:prstGeom>
+          <a:ln>
+            <a:solidFill>
+              <a:srgbClr val="FFFFFF"/>
+            </a:solidFill>
+            <a:tailEnd type="arrow"/>
+          </a:ln>
+        </p:spPr>
+        <p:style>
+          <a:lnRef idx="2">
+            <a:schemeClr val="accent1"/>
+          </a:lnRef>
+          <a:fillRef idx="0">
+            <a:schemeClr val="accent1"/>
+          </a:fillRef>
+          <a:effectRef idx="1">
+            <a:schemeClr val="accent1"/>
+          </a:effectRef>
+          <a:fontRef idx="minor">
+            <a:schemeClr val="tx1"/>
+          </a:fontRef>
+        </p:style>
+      </p:cxnSp>
+      <p:cxnSp>
+        <p:nvCxnSpPr>
+          <p:cNvPr id="16" name="Straight Arrow Connector 15"/>
+          <p:cNvCxnSpPr/>
+          <p:nvPr/>
+        </p:nvCxnSpPr>
+        <p:spPr>
+          <a:xfrm flipH="1" flipV="1">
+            <a:off x="5798671" y="3908613"/>
+            <a:ext cx="1494" cy="227107"/>
+          </a:xfrm>
+          <a:prstGeom prst="straightConnector1">
+            <a:avLst/>
+          </a:prstGeom>
+          <a:ln>
+            <a:solidFill>
+              <a:srgbClr val="FFFFFF"/>
+            </a:solidFill>
+            <a:tailEnd type="arrow"/>
+          </a:ln>
+        </p:spPr>
+        <p:style>
+          <a:lnRef idx="2">
+            <a:schemeClr val="accent1"/>
+          </a:lnRef>
+          <a:fillRef idx="0">
+            <a:schemeClr val="accent1"/>
+          </a:fillRef>
+          <a:effectRef idx="1">
+            <a:schemeClr val="accent1"/>
+          </a:effectRef>
+          <a:fontRef idx="minor">
+            <a:schemeClr val="tx1"/>
+          </a:fontRef>
+        </p:style>
+      </p:cxnSp>
+      <p:cxnSp>
+        <p:nvCxnSpPr>
+          <p:cNvPr id="22" name="Straight Arrow Connector 21"/>
+          <p:cNvCxnSpPr>
+            <a:stCxn id="9" idx="0"/>
+            <a:endCxn id="7" idx="2"/>
+          </p:cNvCxnSpPr>
+          <p:nvPr/>
+        </p:nvCxnSpPr>
+        <p:spPr>
+          <a:xfrm flipV="1">
+            <a:off x="4059517" y="5620872"/>
+            <a:ext cx="1754095" cy="361578"/>
+          </a:xfrm>
+          <a:prstGeom prst="straightConnector1">
+            <a:avLst/>
+          </a:prstGeom>
+          <a:ln>
+            <a:solidFill>
+              <a:srgbClr val="FFFFFF"/>
+            </a:solidFill>
+            <a:tailEnd type="arrow"/>
+          </a:ln>
+        </p:spPr>
+        <p:style>
+          <a:lnRef idx="2">
+            <a:schemeClr val="accent1"/>
+          </a:lnRef>
+          <a:fillRef idx="0">
+            <a:schemeClr val="accent1"/>
+          </a:fillRef>
+          <a:effectRef idx="1">
+            <a:schemeClr val="accent1"/>
+          </a:effectRef>
+          <a:fontRef idx="minor">
+            <a:schemeClr val="tx1"/>
+          </a:fontRef>
+        </p:style>
+      </p:cxnSp>
+      <p:cxnSp>
+        <p:nvCxnSpPr>
+          <p:cNvPr id="25" name="Straight Arrow Connector 24"/>
+          <p:cNvCxnSpPr>
+            <a:stCxn id="11" idx="0"/>
+            <a:endCxn id="7" idx="2"/>
+          </p:cNvCxnSpPr>
+          <p:nvPr/>
+        </p:nvCxnSpPr>
+        <p:spPr>
+          <a:xfrm flipH="1" flipV="1">
+            <a:off x="5813612" y="5620872"/>
+            <a:ext cx="1748116" cy="352613"/>
+          </a:xfrm>
+          <a:prstGeom prst="straightConnector1">
+            <a:avLst/>
+          </a:prstGeom>
+          <a:ln>
+            <a:solidFill>
+              <a:srgbClr val="FFFFFF"/>
+            </a:solidFill>
+            <a:tailEnd type="arrow"/>
+          </a:ln>
+        </p:spPr>
+        <p:style>
+          <a:lnRef idx="2">
+            <a:schemeClr val="accent1"/>
+          </a:lnRef>
+          <a:fillRef idx="0">
+            <a:schemeClr val="accent1"/>
+          </a:fillRef>
+          <a:effectRef idx="1">
+            <a:schemeClr val="accent1"/>
+          </a:effectRef>
+          <a:fontRef idx="minor">
+            <a:schemeClr val="tx1"/>
+          </a:fontRef>
+        </p:style>
+      </p:cxnSp>
+      <p:sp>
+        <p:nvSpPr>
+          <p:cNvPr id="28" name="Rectangle 27"/>
+          <p:cNvSpPr/>
+          <p:nvPr/>
+        </p:nvSpPr>
+        <p:spPr>
+          <a:xfrm>
+            <a:off x="1386540" y="3421529"/>
+            <a:ext cx="1778000" cy="597646"/>
+          </a:xfrm>
+          <a:prstGeom prst="rect">
+            <a:avLst/>
+          </a:prstGeom>
+          <a:noFill/>
+          <a:ln>
+            <a:solidFill>
+              <a:schemeClr val="tx1"/>
+            </a:solidFill>
+          </a:ln>
+        </p:spPr>
+        <p:style>
+          <a:lnRef idx="1">
+            <a:schemeClr val="accent1"/>
+          </a:lnRef>
+          <a:fillRef idx="3">
+            <a:schemeClr val="accent1"/>
+          </a:fillRef>
+          <a:effectRef idx="2">
+            <a:schemeClr val="accent1"/>
+          </a:effectRef>
+          <a:fontRef idx="minor">
+            <a:schemeClr val="lt1"/>
+          </a:fontRef>
+        </p:style>
+        <p:txBody>
+          <a:bodyPr rtlCol="0" anchor="ctr"/>
+          <a:lstStyle/>
+          <a:p>
+            <a:pPr algn="ctr"/>
+            <a:r>
+              <a:rPr lang="en-US" dirty="0" smtClean="0"/>
+              <a:t>Person</a:t>
+            </a:r>
+            <a:endParaRPr lang="en-US" dirty="0"/>
+          </a:p>
+        </p:txBody>
+      </p:sp>
+      <p:sp>
+        <p:nvSpPr>
+          <p:cNvPr id="29" name="Rectangle 28"/>
+          <p:cNvSpPr/>
+          <p:nvPr/>
+        </p:nvSpPr>
+        <p:spPr>
+          <a:xfrm>
+            <a:off x="373529" y="4291106"/>
+            <a:ext cx="1622612" cy="597646"/>
+          </a:xfrm>
+          <a:prstGeom prst="rect">
+            <a:avLst/>
+          </a:prstGeom>
+          <a:noFill/>
+          <a:ln>
+            <a:solidFill>
+              <a:schemeClr val="tx1"/>
+            </a:solidFill>
+          </a:ln>
+        </p:spPr>
+        <p:style>
+          <a:lnRef idx="1">
+            <a:schemeClr val="accent1"/>
+          </a:lnRef>
+          <a:fillRef idx="3">
+            <a:schemeClr val="accent1"/>
+          </a:fillRef>
+          <a:effectRef idx="2">
+            <a:schemeClr val="accent1"/>
+          </a:effectRef>
+          <a:fontRef idx="minor">
+            <a:schemeClr val="lt1"/>
+          </a:fontRef>
+        </p:style>
+        <p:txBody>
+          <a:bodyPr rtlCol="0" anchor="ctr"/>
+          <a:lstStyle/>
+          <a:p>
+            <a:pPr algn="ctr"/>
+            <a:r>
+              <a:rPr lang="en-US" dirty="0" smtClean="0"/>
+              <a:t>Employee</a:t>
+            </a:r>
+            <a:endParaRPr lang="en-US" dirty="0"/>
+          </a:p>
+        </p:txBody>
+      </p:sp>
+      <p:sp>
+        <p:nvSpPr>
+          <p:cNvPr id="30" name="Rectangle 29"/>
+          <p:cNvSpPr/>
+          <p:nvPr/>
+        </p:nvSpPr>
+        <p:spPr>
+          <a:xfrm>
+            <a:off x="373529" y="5112870"/>
+            <a:ext cx="1622612" cy="597646"/>
+          </a:xfrm>
+          <a:prstGeom prst="rect">
+            <a:avLst/>
+          </a:prstGeom>
+          <a:noFill/>
+          <a:ln>
+            <a:solidFill>
+              <a:schemeClr val="tx1"/>
+            </a:solidFill>
+          </a:ln>
+        </p:spPr>
+        <p:style>
+          <a:lnRef idx="1">
+            <a:schemeClr val="accent1"/>
+          </a:lnRef>
+          <a:fillRef idx="3">
+            <a:schemeClr val="accent1"/>
+          </a:fillRef>
+          <a:effectRef idx="2">
+            <a:schemeClr val="accent1"/>
+          </a:effectRef>
+          <a:fontRef idx="minor">
+            <a:schemeClr val="lt1"/>
+          </a:fontRef>
+        </p:style>
+        <p:txBody>
+          <a:bodyPr rtlCol="0" anchor="ctr"/>
+          <a:lstStyle/>
+          <a:p>
+            <a:pPr algn="ctr"/>
+            <a:r>
+              <a:rPr lang="en-US" dirty="0" smtClean="0"/>
+              <a:t>Manager</a:t>
+            </a:r>
+            <a:endParaRPr lang="en-US" dirty="0"/>
+          </a:p>
+        </p:txBody>
+      </p:sp>
+      <p:sp>
+        <p:nvSpPr>
+          <p:cNvPr id="31" name="Rectangle 30"/>
+          <p:cNvSpPr/>
+          <p:nvPr/>
+        </p:nvSpPr>
+        <p:spPr>
+          <a:xfrm>
+            <a:off x="2348752" y="4279153"/>
+            <a:ext cx="1622612" cy="597646"/>
+          </a:xfrm>
+          <a:prstGeom prst="rect">
+            <a:avLst/>
+          </a:prstGeom>
+          <a:noFill/>
+          <a:ln>
+            <a:solidFill>
+              <a:schemeClr val="tx1"/>
+            </a:solidFill>
+          </a:ln>
+        </p:spPr>
+        <p:style>
+          <a:lnRef idx="1">
+            <a:schemeClr val="accent1"/>
+          </a:lnRef>
+          <a:fillRef idx="3">
+            <a:schemeClr val="accent1"/>
+          </a:fillRef>
+          <a:effectRef idx="2">
+            <a:schemeClr val="accent1"/>
+          </a:effectRef>
+          <a:fontRef idx="minor">
+            <a:schemeClr val="lt1"/>
+          </a:fontRef>
+        </p:style>
+        <p:txBody>
+          <a:bodyPr rtlCol="0" anchor="ctr"/>
+          <a:lstStyle/>
+          <a:p>
+            <a:pPr algn="ctr"/>
+            <a:r>
+              <a:rPr lang="en-US" dirty="0" smtClean="0"/>
+              <a:t>Customer</a:t>
+            </a:r>
+            <a:endParaRPr lang="en-US" dirty="0"/>
+          </a:p>
+        </p:txBody>
+      </p:sp>
+      <p:cxnSp>
+        <p:nvCxnSpPr>
+          <p:cNvPr id="32" name="Straight Arrow Connector 31"/>
+          <p:cNvCxnSpPr>
+            <a:stCxn id="29" idx="0"/>
+            <a:endCxn id="28" idx="2"/>
+          </p:cNvCxnSpPr>
+          <p:nvPr/>
+        </p:nvCxnSpPr>
+        <p:spPr>
+          <a:xfrm flipV="1">
+            <a:off x="1184835" y="4019175"/>
+            <a:ext cx="1090705" cy="271931"/>
+          </a:xfrm>
+          <a:prstGeom prst="straightConnector1">
+            <a:avLst/>
+          </a:prstGeom>
+          <a:ln>
+            <a:solidFill>
+              <a:srgbClr val="FFFFFF"/>
+            </a:solidFill>
+            <a:tailEnd type="arrow"/>
+          </a:ln>
+        </p:spPr>
+        <p:style>
+          <a:lnRef idx="2">
+            <a:schemeClr val="accent1"/>
+          </a:lnRef>
+          <a:fillRef idx="0">
+            <a:schemeClr val="accent1"/>
+          </a:fillRef>
+          <a:effectRef idx="1">
+            <a:schemeClr val="accent1"/>
+          </a:effectRef>
+          <a:fontRef idx="minor">
+            <a:schemeClr val="tx1"/>
+          </a:fontRef>
+        </p:style>
+      </p:cxnSp>
+      <p:cxnSp>
+        <p:nvCxnSpPr>
+          <p:cNvPr id="35" name="Straight Arrow Connector 34"/>
+          <p:cNvCxnSpPr>
+            <a:stCxn id="31" idx="0"/>
+            <a:endCxn id="28" idx="2"/>
+          </p:cNvCxnSpPr>
+          <p:nvPr/>
+        </p:nvCxnSpPr>
+        <p:spPr>
+          <a:xfrm flipH="1" flipV="1">
+            <a:off x="2275540" y="4019175"/>
+            <a:ext cx="884518" cy="259978"/>
+          </a:xfrm>
+          <a:prstGeom prst="straightConnector1">
+            <a:avLst/>
+          </a:prstGeom>
+          <a:ln>
+            <a:solidFill>
+              <a:srgbClr val="FFFFFF"/>
+            </a:solidFill>
+            <a:tailEnd type="arrow"/>
+          </a:ln>
+        </p:spPr>
+        <p:style>
+          <a:lnRef idx="2">
+            <a:schemeClr val="accent1"/>
+          </a:lnRef>
+          <a:fillRef idx="0">
+            <a:schemeClr val="accent1"/>
+          </a:fillRef>
+          <a:effectRef idx="1">
+            <a:schemeClr val="accent1"/>
+          </a:effectRef>
+          <a:fontRef idx="minor">
+            <a:schemeClr val="tx1"/>
+          </a:fontRef>
+        </p:style>
+      </p:cxnSp>
+      <p:cxnSp>
+        <p:nvCxnSpPr>
+          <p:cNvPr id="38" name="Straight Arrow Connector 37"/>
+          <p:cNvCxnSpPr/>
+          <p:nvPr/>
+        </p:nvCxnSpPr>
+        <p:spPr>
+          <a:xfrm flipV="1">
+            <a:off x="1184835" y="4873811"/>
+            <a:ext cx="0" cy="224118"/>
+          </a:xfrm>
+          <a:prstGeom prst="straightConnector1">
+            <a:avLst/>
+          </a:prstGeom>
+          <a:ln>
+            <a:solidFill>
+              <a:srgbClr val="FFFFFF"/>
+            </a:solidFill>
+            <a:tailEnd type="arrow"/>
+          </a:ln>
+        </p:spPr>
+        <p:style>
+          <a:lnRef idx="2">
+            <a:schemeClr val="accent1"/>
+          </a:lnRef>
+          <a:fillRef idx="0">
+            <a:schemeClr val="accent1"/>
+          </a:fillRef>
+          <a:effectRef idx="1">
+            <a:schemeClr val="accent1"/>
+          </a:effectRef>
+          <a:fontRef idx="minor">
+            <a:schemeClr val="tx1"/>
+          </a:fontRef>
+        </p:style>
+      </p:cxnSp>
+      <p:sp>
+        <p:nvSpPr>
+          <p:cNvPr id="41" name="Rectangle 40"/>
+          <p:cNvSpPr/>
+          <p:nvPr/>
+        </p:nvSpPr>
+        <p:spPr>
+          <a:xfrm>
+            <a:off x="8997577" y="4231345"/>
+            <a:ext cx="1778000" cy="597646"/>
+          </a:xfrm>
+          <a:prstGeom prst="rect">
+            <a:avLst/>
+          </a:prstGeom>
+          <a:noFill/>
+          <a:ln>
+            <a:solidFill>
+              <a:schemeClr val="tx1"/>
+            </a:solidFill>
+          </a:ln>
+        </p:spPr>
+        <p:style>
+          <a:lnRef idx="1">
+            <a:schemeClr val="accent1"/>
+          </a:lnRef>
+          <a:fillRef idx="3">
+            <a:schemeClr val="accent1"/>
+          </a:fillRef>
+          <a:effectRef idx="2">
+            <a:schemeClr val="accent1"/>
+          </a:effectRef>
+          <a:fontRef idx="minor">
+            <a:schemeClr val="lt1"/>
+          </a:fontRef>
+        </p:style>
+        <p:txBody>
+          <a:bodyPr rtlCol="0" anchor="ctr"/>
+          <a:lstStyle/>
+          <a:p>
+            <a:pPr algn="ctr"/>
+            <a:r>
+              <a:rPr lang="en-US" dirty="0" smtClean="0"/>
+              <a:t>Order</a:t>
+            </a:r>
+            <a:endParaRPr lang="en-US" dirty="0"/>
+          </a:p>
+        </p:txBody>
+      </p:sp>
+      <p:sp>
+        <p:nvSpPr>
+          <p:cNvPr id="42" name="Rectangle 41"/>
+          <p:cNvSpPr/>
+          <p:nvPr/>
+        </p:nvSpPr>
+        <p:spPr>
+          <a:xfrm>
+            <a:off x="9000565" y="5056098"/>
+            <a:ext cx="1775011" cy="597646"/>
+          </a:xfrm>
+          <a:prstGeom prst="rect">
+            <a:avLst/>
+          </a:prstGeom>
+          <a:noFill/>
+          <a:ln>
+            <a:solidFill>
+              <a:schemeClr val="tx1"/>
+            </a:solidFill>
+          </a:ln>
+        </p:spPr>
+        <p:style>
+          <a:lnRef idx="1">
+            <a:schemeClr val="accent1"/>
+          </a:lnRef>
+          <a:fillRef idx="3">
+            <a:schemeClr val="accent1"/>
+          </a:fillRef>
+          <a:effectRef idx="2">
+            <a:schemeClr val="accent1"/>
+          </a:effectRef>
+          <a:fontRef idx="minor">
+            <a:schemeClr val="lt1"/>
+          </a:fontRef>
+        </p:style>
+        <p:txBody>
+          <a:bodyPr rtlCol="0" anchor="ctr"/>
+          <a:lstStyle/>
+          <a:p>
+            <a:pPr algn="ctr"/>
+            <a:r>
+              <a:rPr lang="en-US" dirty="0" err="1" smtClean="0"/>
+              <a:t>StoreOrder</a:t>
+            </a:r>
+            <a:endParaRPr lang="en-US" dirty="0"/>
+          </a:p>
+        </p:txBody>
+      </p:sp>
+      <p:cxnSp>
+        <p:nvCxnSpPr>
+          <p:cNvPr id="43" name="Straight Arrow Connector 42"/>
+          <p:cNvCxnSpPr/>
+          <p:nvPr/>
+        </p:nvCxnSpPr>
+        <p:spPr>
+          <a:xfrm flipH="1" flipV="1">
+            <a:off x="9901519" y="4799110"/>
+            <a:ext cx="1494" cy="227107"/>
+          </a:xfrm>
+          <a:prstGeom prst="straightConnector1">
+            <a:avLst/>
+          </a:prstGeom>
+          <a:ln>
+            <a:solidFill>
+              <a:srgbClr val="FFFFFF"/>
+            </a:solidFill>
+            <a:tailEnd type="arrow"/>
+          </a:ln>
+        </p:spPr>
+        <p:style>
+          <a:lnRef idx="2">
+            <a:schemeClr val="accent1"/>
+          </a:lnRef>
+          <a:fillRef idx="0">
+            <a:schemeClr val="accent1"/>
+          </a:fillRef>
+          <a:effectRef idx="1">
+            <a:schemeClr val="accent1"/>
+          </a:effectRef>
+          <a:fontRef idx="minor">
+            <a:schemeClr val="tx1"/>
+          </a:fontRef>
+        </p:style>
+      </p:cxnSp>
+      <p:sp>
+        <p:nvSpPr>
+          <p:cNvPr id="44" name="Rectangle 43"/>
+          <p:cNvSpPr/>
+          <p:nvPr/>
+        </p:nvSpPr>
+        <p:spPr>
+          <a:xfrm>
+            <a:off x="8686800" y="1314824"/>
+            <a:ext cx="1760070" cy="597646"/>
+          </a:xfrm>
+          <a:prstGeom prst="rect">
+            <a:avLst/>
+          </a:prstGeom>
+          <a:noFill/>
+          <a:ln>
+            <a:solidFill>
+              <a:schemeClr val="tx1"/>
+            </a:solidFill>
+          </a:ln>
+        </p:spPr>
+        <p:style>
+          <a:lnRef idx="1">
+            <a:schemeClr val="accent1"/>
+          </a:lnRef>
+          <a:fillRef idx="3">
+            <a:schemeClr val="accent1"/>
+          </a:fillRef>
+          <a:effectRef idx="2">
+            <a:schemeClr val="accent1"/>
+          </a:effectRef>
+          <a:fontRef idx="minor">
+            <a:schemeClr val="lt1"/>
+          </a:fontRef>
+        </p:style>
+        <p:txBody>
+          <a:bodyPr rtlCol="0" anchor="ctr"/>
+          <a:lstStyle/>
+          <a:p>
+            <a:pPr algn="ctr"/>
+            <a:r>
+              <a:rPr lang="en-US" dirty="0" smtClean="0"/>
+              <a:t>List</a:t>
+            </a:r>
+            <a:endParaRPr lang="en-US" dirty="0"/>
+          </a:p>
+        </p:txBody>
+      </p:sp>
+      <p:sp>
+        <p:nvSpPr>
+          <p:cNvPr id="45" name="Rectangle 44"/>
+          <p:cNvSpPr/>
+          <p:nvPr/>
+        </p:nvSpPr>
+        <p:spPr>
+          <a:xfrm>
+            <a:off x="7052235" y="2274047"/>
+            <a:ext cx="1622611" cy="597646"/>
+          </a:xfrm>
+          <a:prstGeom prst="rect">
+            <a:avLst/>
+          </a:prstGeom>
+          <a:noFill/>
+          <a:ln>
+            <a:solidFill>
+              <a:schemeClr val="tx1"/>
+            </a:solidFill>
+          </a:ln>
+        </p:spPr>
+        <p:style>
+          <a:lnRef idx="1">
+            <a:schemeClr val="accent1"/>
+          </a:lnRef>
+          <a:fillRef idx="3">
+            <a:schemeClr val="accent1"/>
+          </a:fillRef>
+          <a:effectRef idx="2">
+            <a:schemeClr val="accent1"/>
+          </a:effectRef>
+          <a:fontRef idx="minor">
+            <a:schemeClr val="lt1"/>
+          </a:fontRef>
+        </p:style>
+        <p:txBody>
+          <a:bodyPr rtlCol="0" anchor="ctr"/>
+          <a:lstStyle/>
+          <a:p>
+            <a:pPr algn="ctr"/>
+            <a:r>
+              <a:rPr lang="en-US" dirty="0" err="1" smtClean="0"/>
+              <a:t>EmployeeList</a:t>
+            </a:r>
+            <a:endParaRPr lang="en-US" dirty="0"/>
+          </a:p>
+        </p:txBody>
+      </p:sp>
+      <p:sp>
+        <p:nvSpPr>
+          <p:cNvPr id="46" name="Rectangle 45"/>
+          <p:cNvSpPr/>
+          <p:nvPr/>
+        </p:nvSpPr>
+        <p:spPr>
+          <a:xfrm>
+            <a:off x="8845176" y="2262094"/>
+            <a:ext cx="1568824" cy="597646"/>
+          </a:xfrm>
+          <a:prstGeom prst="rect">
+            <a:avLst/>
+          </a:prstGeom>
+          <a:noFill/>
+          <a:ln>
+            <a:solidFill>
+              <a:schemeClr val="tx1"/>
+            </a:solidFill>
+          </a:ln>
+        </p:spPr>
+        <p:style>
+          <a:lnRef idx="1">
+            <a:schemeClr val="accent1"/>
+          </a:lnRef>
+          <a:fillRef idx="3">
+            <a:schemeClr val="accent1"/>
+          </a:fillRef>
+          <a:effectRef idx="2">
+            <a:schemeClr val="accent1"/>
+          </a:effectRef>
+          <a:fontRef idx="minor">
+            <a:schemeClr val="lt1"/>
+          </a:fontRef>
+        </p:style>
+        <p:txBody>
+          <a:bodyPr rtlCol="0" anchor="ctr"/>
+          <a:lstStyle/>
+          <a:p>
+            <a:pPr algn="ctr"/>
+            <a:r>
+              <a:rPr lang="en-US" dirty="0" err="1" smtClean="0"/>
+              <a:t>InventoryList</a:t>
+            </a:r>
+            <a:endParaRPr lang="en-US" dirty="0"/>
+          </a:p>
+        </p:txBody>
+      </p:sp>
+      <p:sp>
+        <p:nvSpPr>
+          <p:cNvPr id="47" name="Rectangle 46"/>
+          <p:cNvSpPr/>
+          <p:nvPr/>
+        </p:nvSpPr>
+        <p:spPr>
+          <a:xfrm>
+            <a:off x="10572375" y="2265082"/>
+            <a:ext cx="1350683" cy="597646"/>
+          </a:xfrm>
+          <a:prstGeom prst="rect">
+            <a:avLst/>
+          </a:prstGeom>
+          <a:noFill/>
+          <a:ln>
+            <a:solidFill>
+              <a:schemeClr val="tx1"/>
+            </a:solidFill>
+          </a:ln>
+        </p:spPr>
+        <p:style>
+          <a:lnRef idx="1">
+            <a:schemeClr val="accent1"/>
+          </a:lnRef>
+          <a:fillRef idx="3">
+            <a:schemeClr val="accent1"/>
+          </a:fillRef>
+          <a:effectRef idx="2">
+            <a:schemeClr val="accent1"/>
+          </a:effectRef>
+          <a:fontRef idx="minor">
+            <a:schemeClr val="lt1"/>
+          </a:fontRef>
+        </p:style>
+        <p:txBody>
+          <a:bodyPr rtlCol="0" anchor="ctr"/>
+          <a:lstStyle/>
+          <a:p>
+            <a:pPr algn="ctr"/>
+            <a:r>
+              <a:rPr lang="en-US" dirty="0" err="1" smtClean="0"/>
+              <a:t>OrderList</a:t>
+            </a:r>
+            <a:endParaRPr lang="en-US" dirty="0"/>
+          </a:p>
+        </p:txBody>
+      </p:sp>
+      <p:cxnSp>
+        <p:nvCxnSpPr>
+          <p:cNvPr id="48" name="Straight Arrow Connector 47"/>
+          <p:cNvCxnSpPr>
+            <a:stCxn id="46" idx="0"/>
+            <a:endCxn id="44" idx="2"/>
+          </p:cNvCxnSpPr>
+          <p:nvPr/>
+        </p:nvCxnSpPr>
+        <p:spPr>
+          <a:xfrm flipH="1" flipV="1">
+            <a:off x="9566835" y="1912470"/>
+            <a:ext cx="62753" cy="349624"/>
+          </a:xfrm>
+          <a:prstGeom prst="straightConnector1">
+            <a:avLst/>
+          </a:prstGeom>
+          <a:ln>
+            <a:solidFill>
+              <a:srgbClr val="FFFFFF"/>
+            </a:solidFill>
+            <a:tailEnd type="arrow"/>
+          </a:ln>
+        </p:spPr>
+        <p:style>
+          <a:lnRef idx="2">
+            <a:schemeClr val="accent1"/>
+          </a:lnRef>
+          <a:fillRef idx="0">
+            <a:schemeClr val="accent1"/>
+          </a:fillRef>
+          <a:effectRef idx="1">
+            <a:schemeClr val="accent1"/>
+          </a:effectRef>
+          <a:fontRef idx="minor">
+            <a:schemeClr val="tx1"/>
+          </a:fontRef>
+        </p:style>
+      </p:cxnSp>
+      <p:cxnSp>
+        <p:nvCxnSpPr>
+          <p:cNvPr id="49" name="Straight Arrow Connector 48"/>
+          <p:cNvCxnSpPr>
+            <a:stCxn id="45" idx="0"/>
+            <a:endCxn id="44" idx="2"/>
+          </p:cNvCxnSpPr>
+          <p:nvPr/>
+        </p:nvCxnSpPr>
+        <p:spPr>
+          <a:xfrm flipV="1">
+            <a:off x="7863541" y="1912470"/>
+            <a:ext cx="1703294" cy="361577"/>
+          </a:xfrm>
+          <a:prstGeom prst="straightConnector1">
+            <a:avLst/>
+          </a:prstGeom>
+          <a:ln>
+            <a:solidFill>
+              <a:srgbClr val="FFFFFF"/>
+            </a:solidFill>
+            <a:tailEnd type="arrow"/>
+          </a:ln>
+        </p:spPr>
+        <p:style>
+          <a:lnRef idx="2">
+            <a:schemeClr val="accent1"/>
+          </a:lnRef>
+          <a:fillRef idx="0">
+            <a:schemeClr val="accent1"/>
+          </a:fillRef>
+          <a:effectRef idx="1">
+            <a:schemeClr val="accent1"/>
+          </a:effectRef>
+          <a:fontRef idx="minor">
+            <a:schemeClr val="tx1"/>
+          </a:fontRef>
+        </p:style>
+      </p:cxnSp>
+      <p:cxnSp>
+        <p:nvCxnSpPr>
+          <p:cNvPr id="50" name="Straight Arrow Connector 49"/>
+          <p:cNvCxnSpPr>
+            <a:stCxn id="47" idx="0"/>
+            <a:endCxn id="44" idx="2"/>
+          </p:cNvCxnSpPr>
+          <p:nvPr/>
+        </p:nvCxnSpPr>
+        <p:spPr>
+          <a:xfrm flipH="1" flipV="1">
+            <a:off x="9566835" y="1912470"/>
+            <a:ext cx="1680882" cy="352612"/>
+          </a:xfrm>
+          <a:prstGeom prst="straightConnector1">
+            <a:avLst/>
+          </a:prstGeom>
+          <a:ln>
+            <a:solidFill>
+              <a:srgbClr val="FFFFFF"/>
+            </a:solidFill>
+            <a:tailEnd type="arrow"/>
+          </a:ln>
+        </p:spPr>
+        <p:style>
+          <a:lnRef idx="2">
+            <a:schemeClr val="accent1"/>
+          </a:lnRef>
+          <a:fillRef idx="0">
+            <a:schemeClr val="accent1"/>
+          </a:fillRef>
+          <a:effectRef idx="1">
+            <a:schemeClr val="accent1"/>
+          </a:effectRef>
+          <a:fontRef idx="minor">
+            <a:schemeClr val="tx1"/>
+          </a:fontRef>
+        </p:style>
+      </p:cxnSp>
+      <p:sp>
+        <p:nvSpPr>
+          <p:cNvPr id="58" name="Rectangle 57"/>
+          <p:cNvSpPr/>
+          <p:nvPr/>
+        </p:nvSpPr>
+        <p:spPr>
+          <a:xfrm>
+            <a:off x="756023" y="1721225"/>
+            <a:ext cx="2635623" cy="597646"/>
+          </a:xfrm>
+          <a:prstGeom prst="rect">
+            <a:avLst/>
+          </a:prstGeom>
+          <a:noFill/>
+          <a:ln>
+            <a:solidFill>
+              <a:schemeClr val="tx1"/>
+            </a:solidFill>
+          </a:ln>
+        </p:spPr>
+        <p:style>
+          <a:lnRef idx="1">
+            <a:schemeClr val="accent1"/>
+          </a:lnRef>
+          <a:fillRef idx="3">
+            <a:schemeClr val="accent1"/>
+          </a:fillRef>
+          <a:effectRef idx="2">
+            <a:schemeClr val="accent1"/>
+          </a:effectRef>
+          <a:fontRef idx="minor">
+            <a:schemeClr val="lt1"/>
+          </a:fontRef>
+        </p:style>
+        <p:txBody>
+          <a:bodyPr rtlCol="0" anchor="ctr"/>
+          <a:lstStyle/>
+          <a:p>
+            <a:pPr algn="ctr"/>
+            <a:r>
+              <a:rPr lang="en-US" dirty="0" err="1" smtClean="0"/>
+              <a:t>BookStoreSystem</a:t>
+            </a:r>
             <a:endParaRPr lang="en-US" dirty="0"/>
           </a:p>
         </p:txBody>
@@ -6650,7 +8207,7 @@
   <p:timing>
     <p:tnLst>
       <p:par>
-        <p:cTn id="1" dur="indefinite" restart="never" nodeType="tmRoot"/>
+        <p:cTn xmlns:p14="http://schemas.microsoft.com/office/powerpoint/2010/main" id="1" dur="indefinite" restart="never" nodeType="tmRoot"/>
       </p:par>
     </p:tnLst>
   </p:timing>
@@ -6738,7 +8295,7 @@
   <p:timing>
     <p:tnLst>
       <p:par>
-        <p:cTn id="1" dur="indefinite" restart="never" nodeType="tmRoot"/>
+        <p:cTn xmlns:p14="http://schemas.microsoft.com/office/powerpoint/2010/main" id="1" dur="indefinite" restart="never" nodeType="tmRoot"/>
       </p:par>
     </p:tnLst>
   </p:timing>
@@ -6827,7 +8384,7 @@
   <p:timing>
     <p:tnLst>
       <p:par>
-        <p:cTn id="1" dur="indefinite" restart="never" nodeType="tmRoot"/>
+        <p:cTn xmlns:p14="http://schemas.microsoft.com/office/powerpoint/2010/main" id="1" dur="indefinite" restart="never" nodeType="tmRoot"/>
       </p:par>
     </p:tnLst>
   </p:timing>
@@ -6900,11 +8457,7 @@
             <a:pPr lvl="0"/>
             <a:r>
               <a:rPr lang="en-US" dirty="0" smtClean="0"/>
-              <a:t>Track </a:t>
-            </a:r>
-            <a:r>
-              <a:rPr lang="en-US" dirty="0" smtClean="0"/>
-              <a:t>statistics</a:t>
+              <a:t>Track statistics</a:t>
             </a:r>
           </a:p>
           <a:p>
@@ -6937,7 +8490,7 @@
   <p:timing>
     <p:tnLst>
       <p:par>
-        <p:cTn id="1" dur="indefinite" restart="never" nodeType="tmRoot"/>
+        <p:cTn xmlns:p14="http://schemas.microsoft.com/office/powerpoint/2010/main" id="1" dur="indefinite" restart="never" nodeType="tmRoot"/>
       </p:par>
     </p:tnLst>
   </p:timing>
@@ -7020,7 +8573,7 @@
   <p:timing>
     <p:tnLst>
       <p:par>
-        <p:cTn id="1" dur="indefinite" restart="never" nodeType="tmRoot"/>
+        <p:cTn xmlns:p14="http://schemas.microsoft.com/office/powerpoint/2010/main" id="1" dur="indefinite" restart="never" nodeType="tmRoot"/>
       </p:par>
     </p:tnLst>
   </p:timing>
@@ -7070,7 +8623,7 @@
     </a:clrScheme>
     <a:fontScheme name="Ion">
       <a:majorFont>
-        <a:latin typeface="Century Gothic" panose="020B0502020202020204"/>
+        <a:latin typeface="Century Gothic"/>
         <a:ea typeface=""/>
         <a:cs typeface=""/>
         <a:font script="Jpan" typeface="メイリオ"/>
@@ -7105,7 +8658,7 @@
         <a:font script="Geor" typeface="Sylfaen"/>
       </a:majorFont>
       <a:minorFont>
-        <a:latin typeface="Century Gothic" panose="020B0502020202020204"/>
+        <a:latin typeface="Century Gothic"/>
         <a:ea typeface=""/>
         <a:cs typeface=""/>
         <a:font script="Jpan" typeface="メイリオ"/>
@@ -7287,7 +8840,7 @@
   <a:extraClrSchemeLst/>
   <a:extLst>
     <a:ext uri="{05A4C25C-085E-4340-85A3-A5531E510DB2}">
-      <thm15:themeFamily xmlns:thm15="http://schemas.microsoft.com/office/thememl/2012/main" name="Ion" id="{B8441ADB-2E43-4AF7-B97A-BD870242C6A8}" vid="{292E63A9-BB86-4E3D-B92A-7223C6510D2E}"/>
+      <thm15:themeFamily xmlns:thm15="http://schemas.microsoft.com/office/thememl/2012/main" xmlns="" name="Ion" id="{B8441ADB-2E43-4AF7-B97A-BD870242C6A8}" vid="{292E63A9-BB86-4E3D-B92A-7223C6510D2E}"/>
     </a:ext>
   </a:extLst>
 </a:theme>

</xml_diff>

<commit_message>
fixed a spelling error
</commit_message>
<xml_diff>
--- a/BookStoreApp Presentation.pptx
+++ b/BookStoreApp Presentation.pptx
@@ -114,7 +114,18 @@
   </p:defaultTextStyle>
   <p:extLst>
     <p:ext uri="{EFAFB233-063F-42B5-8137-9DF3F51BA10A}">
-      <p15:sldGuideLst xmlns:p15="http://schemas.microsoft.com/office/powerpoint/2012/main" xmlns=""/>
+      <p15:sldGuideLst xmlns:p15="http://schemas.microsoft.com/office/powerpoint/2012/main">
+        <p15:guide id="1" orient="horz" pos="2160">
+          <p15:clr>
+            <a:srgbClr val="A4A3A4"/>
+          </p15:clr>
+        </p15:guide>
+        <p15:guide id="2" pos="3840">
+          <p15:clr>
+            <a:srgbClr val="A4A3A4"/>
+          </p15:clr>
+        </p15:guide>
+      </p15:sldGuideLst>
     </p:ext>
   </p:extLst>
 </p:presentation>
@@ -306,7 +317,7 @@
           <a:p>
             <a:fld id="{F84A0333-8D1E-40F4-B17F-5D43FAAA70A1}" type="datetimeFigureOut">
               <a:rPr lang="en-US" smtClean="0"/>
-              <a:t>12/8/14</a:t>
+              <a:t>12/8/2014</a:t>
             </a:fld>
             <a:endParaRPr lang="en-US"/>
           </a:p>
@@ -581,7 +592,7 @@
           <a:p>
             <a:fld id="{F84A0333-8D1E-40F4-B17F-5D43FAAA70A1}" type="datetimeFigureOut">
               <a:rPr lang="en-US" smtClean="0"/>
-              <a:t>12/8/14</a:t>
+              <a:t>12/8/2014</a:t>
             </a:fld>
             <a:endParaRPr lang="en-US"/>
           </a:p>
@@ -775,7 +786,7 @@
           <a:p>
             <a:fld id="{F84A0333-8D1E-40F4-B17F-5D43FAAA70A1}" type="datetimeFigureOut">
               <a:rPr lang="en-US" smtClean="0"/>
-              <a:t>12/8/14</a:t>
+              <a:t>12/8/2014</a:t>
             </a:fld>
             <a:endParaRPr lang="en-US"/>
           </a:p>
@@ -1048,7 +1059,7 @@
           <a:p>
             <a:fld id="{F84A0333-8D1E-40F4-B17F-5D43FAAA70A1}" type="datetimeFigureOut">
               <a:rPr lang="en-US" smtClean="0"/>
-              <a:t>12/8/14</a:t>
+              <a:t>12/8/2014</a:t>
             </a:fld>
             <a:endParaRPr lang="en-US"/>
           </a:p>
@@ -1389,7 +1400,7 @@
           <a:p>
             <a:fld id="{F84A0333-8D1E-40F4-B17F-5D43FAAA70A1}" type="datetimeFigureOut">
               <a:rPr lang="en-US" smtClean="0"/>
-              <a:t>12/8/14</a:t>
+              <a:t>12/8/2014</a:t>
             </a:fld>
             <a:endParaRPr lang="en-US"/>
           </a:p>
@@ -2012,7 +2023,7 @@
           <a:p>
             <a:fld id="{F84A0333-8D1E-40F4-B17F-5D43FAAA70A1}" type="datetimeFigureOut">
               <a:rPr lang="en-US" smtClean="0"/>
-              <a:t>12/8/14</a:t>
+              <a:t>12/8/2014</a:t>
             </a:fld>
             <a:endParaRPr lang="en-US"/>
           </a:p>
@@ -2872,7 +2883,7 @@
           <a:p>
             <a:fld id="{F84A0333-8D1E-40F4-B17F-5D43FAAA70A1}" type="datetimeFigureOut">
               <a:rPr lang="en-US" smtClean="0"/>
-              <a:t>12/8/14</a:t>
+              <a:t>12/8/2014</a:t>
             </a:fld>
             <a:endParaRPr lang="en-US"/>
           </a:p>
@@ -3042,7 +3053,7 @@
           <a:p>
             <a:fld id="{F84A0333-8D1E-40F4-B17F-5D43FAAA70A1}" type="datetimeFigureOut">
               <a:rPr lang="en-US" smtClean="0"/>
-              <a:t>12/8/14</a:t>
+              <a:t>12/8/2014</a:t>
             </a:fld>
             <a:endParaRPr lang="en-US"/>
           </a:p>
@@ -3222,7 +3233,7 @@
           <a:p>
             <a:fld id="{F84A0333-8D1E-40F4-B17F-5D43FAAA70A1}" type="datetimeFigureOut">
               <a:rPr lang="en-US" smtClean="0"/>
-              <a:t>12/8/14</a:t>
+              <a:t>12/8/2014</a:t>
             </a:fld>
             <a:endParaRPr lang="en-US"/>
           </a:p>
@@ -3392,7 +3403,7 @@
           <a:p>
             <a:fld id="{F84A0333-8D1E-40F4-B17F-5D43FAAA70A1}" type="datetimeFigureOut">
               <a:rPr lang="en-US" smtClean="0"/>
-              <a:t>12/8/14</a:t>
+              <a:t>12/8/2014</a:t>
             </a:fld>
             <a:endParaRPr lang="en-US"/>
           </a:p>
@@ -3639,7 +3650,7 @@
           <a:p>
             <a:fld id="{F84A0333-8D1E-40F4-B17F-5D43FAAA70A1}" type="datetimeFigureOut">
               <a:rPr lang="en-US" smtClean="0"/>
-              <a:t>12/8/14</a:t>
+              <a:t>12/8/2014</a:t>
             </a:fld>
             <a:endParaRPr lang="en-US"/>
           </a:p>
@@ -3931,7 +3942,7 @@
           <a:p>
             <a:fld id="{F84A0333-8D1E-40F4-B17F-5D43FAAA70A1}" type="datetimeFigureOut">
               <a:rPr lang="en-US" smtClean="0"/>
-              <a:t>12/8/14</a:t>
+              <a:t>12/8/2014</a:t>
             </a:fld>
             <a:endParaRPr lang="en-US"/>
           </a:p>
@@ -4375,7 +4386,7 @@
           <a:p>
             <a:fld id="{F84A0333-8D1E-40F4-B17F-5D43FAAA70A1}" type="datetimeFigureOut">
               <a:rPr lang="en-US" smtClean="0"/>
-              <a:t>12/8/14</a:t>
+              <a:t>12/8/2014</a:t>
             </a:fld>
             <a:endParaRPr lang="en-US"/>
           </a:p>
@@ -4493,7 +4504,7 @@
           <a:p>
             <a:fld id="{F84A0333-8D1E-40F4-B17F-5D43FAAA70A1}" type="datetimeFigureOut">
               <a:rPr lang="en-US" smtClean="0"/>
-              <a:t>12/8/14</a:t>
+              <a:t>12/8/2014</a:t>
             </a:fld>
             <a:endParaRPr lang="en-US"/>
           </a:p>
@@ -4588,7 +4599,7 @@
           <a:p>
             <a:fld id="{F84A0333-8D1E-40F4-B17F-5D43FAAA70A1}" type="datetimeFigureOut">
               <a:rPr lang="en-US" smtClean="0"/>
-              <a:t>12/8/14</a:t>
+              <a:t>12/8/2014</a:t>
             </a:fld>
             <a:endParaRPr lang="en-US"/>
           </a:p>
@@ -4867,7 +4878,7 @@
           <a:p>
             <a:fld id="{F84A0333-8D1E-40F4-B17F-5D43FAAA70A1}" type="datetimeFigureOut">
               <a:rPr lang="en-US" smtClean="0"/>
-              <a:t>12/8/14</a:t>
+              <a:t>12/8/2014</a:t>
             </a:fld>
             <a:endParaRPr lang="en-US"/>
           </a:p>
@@ -5142,7 +5153,7 @@
           <a:p>
             <a:fld id="{F84A0333-8D1E-40F4-B17F-5D43FAAA70A1}" type="datetimeFigureOut">
               <a:rPr lang="en-US" smtClean="0"/>
-              <a:t>12/8/14</a:t>
+              <a:t>12/8/2014</a:t>
             </a:fld>
             <a:endParaRPr lang="en-US"/>
           </a:p>
@@ -5571,7 +5582,7 @@
           <a:p>
             <a:fld id="{F84A0333-8D1E-40F4-B17F-5D43FAAA70A1}" type="datetimeFigureOut">
               <a:rPr lang="en-US" smtClean="0"/>
-              <a:t>12/8/14</a:t>
+              <a:t>12/8/2014</a:t>
             </a:fld>
             <a:endParaRPr lang="en-US"/>
           </a:p>
@@ -6247,7 +6258,7 @@
   <p:timing>
     <p:tnLst>
       <p:par>
-        <p:cTn xmlns:p14="http://schemas.microsoft.com/office/powerpoint/2010/main" id="1" dur="indefinite" restart="never" nodeType="tmRoot"/>
+        <p:cTn id="1" dur="indefinite" restart="never" nodeType="tmRoot"/>
       </p:par>
     </p:tnLst>
   </p:timing>
@@ -6409,7 +6420,7 @@
   <p:timing>
     <p:tnLst>
       <p:par>
-        <p:cTn xmlns:p14="http://schemas.microsoft.com/office/powerpoint/2010/main" id="1" dur="indefinite" restart="never" nodeType="tmRoot"/>
+        <p:cTn id="1" dur="indefinite" restart="never" nodeType="tmRoot"/>
       </p:par>
     </p:tnLst>
   </p:timing>
@@ -6480,11 +6491,7 @@
           <a:p>
             <a:r>
               <a:rPr lang="en-US" dirty="0" smtClean="0"/>
-              <a:t>Separate slide for each </a:t>
-            </a:r>
-            <a:r>
-              <a:rPr lang="en-US" dirty="0" smtClean="0"/>
-              <a:t>Class </a:t>
+              <a:t>Separate slide for each Class </a:t>
             </a:r>
             <a:r>
               <a:rPr lang="en-US" dirty="0" smtClean="0">
@@ -6572,19 +6579,7 @@
               <a:rPr lang="en-US" dirty="0" smtClean="0">
                 <a:sym typeface="Wingdings"/>
               </a:rPr>
-              <a:t>Children are Employee and Customer. Employee </a:t>
-            </a:r>
-            <a:r>
-              <a:rPr lang="en-US" dirty="0" smtClean="0">
-                <a:sym typeface="Wingdings"/>
-              </a:rPr>
-              <a:t>is </a:t>
-            </a:r>
-            <a:r>
-              <a:rPr lang="en-US" dirty="0" smtClean="0">
-                <a:sym typeface="Wingdings"/>
-              </a:rPr>
-              <a:t>parent to Manager.</a:t>
+              <a:t>Children are Employee and Customer. Employee is parent to Manager.</a:t>
             </a:r>
           </a:p>
           <a:p>
@@ -6674,9 +6669,6 @@
               </a:rPr>
               <a:t> of all orders.</a:t>
             </a:r>
-            <a:endParaRPr lang="en-US" dirty="0" smtClean="0">
-              <a:sym typeface="Wingdings"/>
-            </a:endParaRPr>
           </a:p>
           <a:p>
             <a:r>
@@ -6708,7 +6700,7 @@
   <p:timing>
     <p:tnLst>
       <p:par>
-        <p:cTn xmlns:p14="http://schemas.microsoft.com/office/powerpoint/2010/main" id="1" dur="indefinite" restart="never" nodeType="tmRoot"/>
+        <p:cTn id="1" dur="indefinite" restart="never" nodeType="tmRoot"/>
       </p:par>
     </p:tnLst>
   </p:timing>
@@ -6787,7 +6779,7 @@
   <p:timing>
     <p:tnLst>
       <p:par>
-        <p:cTn xmlns:p14="http://schemas.microsoft.com/office/powerpoint/2010/main" id="1" dur="indefinite" restart="never" nodeType="tmRoot"/>
+        <p:cTn id="1" dur="indefinite" restart="never" nodeType="tmRoot"/>
       </p:par>
     </p:tnLst>
   </p:timing>
@@ -8207,7 +8199,7 @@
   <p:timing>
     <p:tnLst>
       <p:par>
-        <p:cTn xmlns:p14="http://schemas.microsoft.com/office/powerpoint/2010/main" id="1" dur="indefinite" restart="never" nodeType="tmRoot"/>
+        <p:cTn id="1" dur="indefinite" restart="never" nodeType="tmRoot"/>
       </p:par>
     </p:tnLst>
   </p:timing>
@@ -8295,7 +8287,7 @@
   <p:timing>
     <p:tnLst>
       <p:par>
-        <p:cTn xmlns:p14="http://schemas.microsoft.com/office/powerpoint/2010/main" id="1" dur="indefinite" restart="never" nodeType="tmRoot"/>
+        <p:cTn id="1" dur="indefinite" restart="never" nodeType="tmRoot"/>
       </p:par>
     </p:tnLst>
   </p:timing>
@@ -8384,7 +8376,7 @@
   <p:timing>
     <p:tnLst>
       <p:par>
-        <p:cTn xmlns:p14="http://schemas.microsoft.com/office/powerpoint/2010/main" id="1" dur="indefinite" restart="never" nodeType="tmRoot"/>
+        <p:cTn id="1" dur="indefinite" restart="never" nodeType="tmRoot"/>
       </p:par>
     </p:tnLst>
   </p:timing>
@@ -8471,7 +8463,23 @@
           <a:p>
             <a:r>
               <a:rPr lang="en-US" dirty="0" smtClean="0"/>
-              <a:t>Addition functionality for managers such as discount items</a:t>
+              <a:t>Additional </a:t>
+            </a:r>
+            <a:r>
+              <a:rPr lang="en-US" dirty="0" smtClean="0"/>
+              <a:t>functionality </a:t>
+            </a:r>
+            <a:r>
+              <a:rPr lang="en-US" smtClean="0"/>
+              <a:t>specific to </a:t>
+            </a:r>
+            <a:r>
+              <a:rPr lang="en-US" smtClean="0"/>
+              <a:t>managers </a:t>
+            </a:r>
+            <a:r>
+              <a:rPr lang="en-US" dirty="0" smtClean="0"/>
+              <a:t>such as discount items</a:t>
             </a:r>
             <a:endParaRPr lang="en-US" dirty="0"/>
           </a:p>
@@ -8490,7 +8498,7 @@
   <p:timing>
     <p:tnLst>
       <p:par>
-        <p:cTn xmlns:p14="http://schemas.microsoft.com/office/powerpoint/2010/main" id="1" dur="indefinite" restart="never" nodeType="tmRoot"/>
+        <p:cTn id="1" dur="indefinite" restart="never" nodeType="tmRoot"/>
       </p:par>
     </p:tnLst>
   </p:timing>
@@ -8573,7 +8581,7 @@
   <p:timing>
     <p:tnLst>
       <p:par>
-        <p:cTn xmlns:p14="http://schemas.microsoft.com/office/powerpoint/2010/main" id="1" dur="indefinite" restart="never" nodeType="tmRoot"/>
+        <p:cTn id="1" dur="indefinite" restart="never" nodeType="tmRoot"/>
       </p:par>
     </p:tnLst>
   </p:timing>
@@ -8840,7 +8848,7 @@
   <a:extraClrSchemeLst/>
   <a:extLst>
     <a:ext uri="{05A4C25C-085E-4340-85A3-A5531E510DB2}">
-      <thm15:themeFamily xmlns:thm15="http://schemas.microsoft.com/office/thememl/2012/main" xmlns="" name="Ion" id="{B8441ADB-2E43-4AF7-B97A-BD870242C6A8}" vid="{292E63A9-BB86-4E3D-B92A-7223C6510D2E}"/>
+      <thm15:themeFamily xmlns:thm15="http://schemas.microsoft.com/office/thememl/2012/main" name="Ion" id="{B8441ADB-2E43-4AF7-B97A-BD870242C6A8}" vid="{292E63A9-BB86-4E3D-B92A-7223C6510D2E}"/>
     </a:ext>
   </a:extLst>
 </a:theme>

</xml_diff>

<commit_message>
added how to use to presentation
</commit_message>
<xml_diff>
--- a/BookStoreApp Presentation.pptx
+++ b/BookStoreApp Presentation.pptx
@@ -114,7 +114,7 @@
   </p:defaultTextStyle>
   <p:extLst>
     <p:ext uri="{EFAFB233-063F-42B5-8137-9DF3F51BA10A}">
-      <p15:sldGuideLst xmlns:p15="http://schemas.microsoft.com/office/powerpoint/2012/main">
+      <p15:sldGuideLst xmlns:p15="http://schemas.microsoft.com/office/powerpoint/2012/main" xmlns="">
         <p15:guide id="1" orient="horz" pos="2160">
           <p15:clr>
             <a:srgbClr val="A4A3A4"/>
@@ -317,7 +317,7 @@
           <a:p>
             <a:fld id="{F84A0333-8D1E-40F4-B17F-5D43FAAA70A1}" type="datetimeFigureOut">
               <a:rPr lang="en-US" smtClean="0"/>
-              <a:t>12/8/2014</a:t>
+              <a:t>12/8/14</a:t>
             </a:fld>
             <a:endParaRPr lang="en-US"/>
           </a:p>
@@ -592,7 +592,7 @@
           <a:p>
             <a:fld id="{F84A0333-8D1E-40F4-B17F-5D43FAAA70A1}" type="datetimeFigureOut">
               <a:rPr lang="en-US" smtClean="0"/>
-              <a:t>12/8/2014</a:t>
+              <a:t>12/8/14</a:t>
             </a:fld>
             <a:endParaRPr lang="en-US"/>
           </a:p>
@@ -786,7 +786,7 @@
           <a:p>
             <a:fld id="{F84A0333-8D1E-40F4-B17F-5D43FAAA70A1}" type="datetimeFigureOut">
               <a:rPr lang="en-US" smtClean="0"/>
-              <a:t>12/8/2014</a:t>
+              <a:t>12/8/14</a:t>
             </a:fld>
             <a:endParaRPr lang="en-US"/>
           </a:p>
@@ -1059,7 +1059,7 @@
           <a:p>
             <a:fld id="{F84A0333-8D1E-40F4-B17F-5D43FAAA70A1}" type="datetimeFigureOut">
               <a:rPr lang="en-US" smtClean="0"/>
-              <a:t>12/8/2014</a:t>
+              <a:t>12/8/14</a:t>
             </a:fld>
             <a:endParaRPr lang="en-US"/>
           </a:p>
@@ -1400,7 +1400,7 @@
           <a:p>
             <a:fld id="{F84A0333-8D1E-40F4-B17F-5D43FAAA70A1}" type="datetimeFigureOut">
               <a:rPr lang="en-US" smtClean="0"/>
-              <a:t>12/8/2014</a:t>
+              <a:t>12/8/14</a:t>
             </a:fld>
             <a:endParaRPr lang="en-US"/>
           </a:p>
@@ -2023,7 +2023,7 @@
           <a:p>
             <a:fld id="{F84A0333-8D1E-40F4-B17F-5D43FAAA70A1}" type="datetimeFigureOut">
               <a:rPr lang="en-US" smtClean="0"/>
-              <a:t>12/8/2014</a:t>
+              <a:t>12/8/14</a:t>
             </a:fld>
             <a:endParaRPr lang="en-US"/>
           </a:p>
@@ -2883,7 +2883,7 @@
           <a:p>
             <a:fld id="{F84A0333-8D1E-40F4-B17F-5D43FAAA70A1}" type="datetimeFigureOut">
               <a:rPr lang="en-US" smtClean="0"/>
-              <a:t>12/8/2014</a:t>
+              <a:t>12/8/14</a:t>
             </a:fld>
             <a:endParaRPr lang="en-US"/>
           </a:p>
@@ -3053,7 +3053,7 @@
           <a:p>
             <a:fld id="{F84A0333-8D1E-40F4-B17F-5D43FAAA70A1}" type="datetimeFigureOut">
               <a:rPr lang="en-US" smtClean="0"/>
-              <a:t>12/8/2014</a:t>
+              <a:t>12/8/14</a:t>
             </a:fld>
             <a:endParaRPr lang="en-US"/>
           </a:p>
@@ -3233,7 +3233,7 @@
           <a:p>
             <a:fld id="{F84A0333-8D1E-40F4-B17F-5D43FAAA70A1}" type="datetimeFigureOut">
               <a:rPr lang="en-US" smtClean="0"/>
-              <a:t>12/8/2014</a:t>
+              <a:t>12/8/14</a:t>
             </a:fld>
             <a:endParaRPr lang="en-US"/>
           </a:p>
@@ -3403,7 +3403,7 @@
           <a:p>
             <a:fld id="{F84A0333-8D1E-40F4-B17F-5D43FAAA70A1}" type="datetimeFigureOut">
               <a:rPr lang="en-US" smtClean="0"/>
-              <a:t>12/8/2014</a:t>
+              <a:t>12/8/14</a:t>
             </a:fld>
             <a:endParaRPr lang="en-US"/>
           </a:p>
@@ -3650,7 +3650,7 @@
           <a:p>
             <a:fld id="{F84A0333-8D1E-40F4-B17F-5D43FAAA70A1}" type="datetimeFigureOut">
               <a:rPr lang="en-US" smtClean="0"/>
-              <a:t>12/8/2014</a:t>
+              <a:t>12/8/14</a:t>
             </a:fld>
             <a:endParaRPr lang="en-US"/>
           </a:p>
@@ -3942,7 +3942,7 @@
           <a:p>
             <a:fld id="{F84A0333-8D1E-40F4-B17F-5D43FAAA70A1}" type="datetimeFigureOut">
               <a:rPr lang="en-US" smtClean="0"/>
-              <a:t>12/8/2014</a:t>
+              <a:t>12/8/14</a:t>
             </a:fld>
             <a:endParaRPr lang="en-US"/>
           </a:p>
@@ -4386,7 +4386,7 @@
           <a:p>
             <a:fld id="{F84A0333-8D1E-40F4-B17F-5D43FAAA70A1}" type="datetimeFigureOut">
               <a:rPr lang="en-US" smtClean="0"/>
-              <a:t>12/8/2014</a:t>
+              <a:t>12/8/14</a:t>
             </a:fld>
             <a:endParaRPr lang="en-US"/>
           </a:p>
@@ -4504,7 +4504,7 @@
           <a:p>
             <a:fld id="{F84A0333-8D1E-40F4-B17F-5D43FAAA70A1}" type="datetimeFigureOut">
               <a:rPr lang="en-US" smtClean="0"/>
-              <a:t>12/8/2014</a:t>
+              <a:t>12/8/14</a:t>
             </a:fld>
             <a:endParaRPr lang="en-US"/>
           </a:p>
@@ -4599,7 +4599,7 @@
           <a:p>
             <a:fld id="{F84A0333-8D1E-40F4-B17F-5D43FAAA70A1}" type="datetimeFigureOut">
               <a:rPr lang="en-US" smtClean="0"/>
-              <a:t>12/8/2014</a:t>
+              <a:t>12/8/14</a:t>
             </a:fld>
             <a:endParaRPr lang="en-US"/>
           </a:p>
@@ -4878,7 +4878,7 @@
           <a:p>
             <a:fld id="{F84A0333-8D1E-40F4-B17F-5D43FAAA70A1}" type="datetimeFigureOut">
               <a:rPr lang="en-US" smtClean="0"/>
-              <a:t>12/8/2014</a:t>
+              <a:t>12/8/14</a:t>
             </a:fld>
             <a:endParaRPr lang="en-US"/>
           </a:p>
@@ -5153,7 +5153,7 @@
           <a:p>
             <a:fld id="{F84A0333-8D1E-40F4-B17F-5D43FAAA70A1}" type="datetimeFigureOut">
               <a:rPr lang="en-US" smtClean="0"/>
-              <a:t>12/8/2014</a:t>
+              <a:t>12/8/14</a:t>
             </a:fld>
             <a:endParaRPr lang="en-US"/>
           </a:p>
@@ -5582,7 +5582,7 @@
           <a:p>
             <a:fld id="{F84A0333-8D1E-40F4-B17F-5D43FAAA70A1}" type="datetimeFigureOut">
               <a:rPr lang="en-US" smtClean="0"/>
-              <a:t>12/8/2014</a:t>
+              <a:t>12/8/14</a:t>
             </a:fld>
             <a:endParaRPr lang="en-US"/>
           </a:p>
@@ -6258,7 +6258,7 @@
   <p:timing>
     <p:tnLst>
       <p:par>
-        <p:cTn id="1" dur="indefinite" restart="never" nodeType="tmRoot"/>
+        <p:cTn xmlns:p14="http://schemas.microsoft.com/office/powerpoint/2010/main" id="1" dur="indefinite" restart="never" nodeType="tmRoot"/>
       </p:par>
     </p:tnLst>
   </p:timing>
@@ -6420,7 +6420,7 @@
   <p:timing>
     <p:tnLst>
       <p:par>
-        <p:cTn id="1" dur="indefinite" restart="never" nodeType="tmRoot"/>
+        <p:cTn xmlns:p14="http://schemas.microsoft.com/office/powerpoint/2010/main" id="1" dur="indefinite" restart="never" nodeType="tmRoot"/>
       </p:par>
     </p:tnLst>
   </p:timing>
@@ -6700,7 +6700,7 @@
   <p:timing>
     <p:tnLst>
       <p:par>
-        <p:cTn id="1" dur="indefinite" restart="never" nodeType="tmRoot"/>
+        <p:cTn xmlns:p14="http://schemas.microsoft.com/office/powerpoint/2010/main" id="1" dur="indefinite" restart="never" nodeType="tmRoot"/>
       </p:par>
     </p:tnLst>
   </p:timing>
@@ -6757,11 +6757,66 @@
             <p:ph idx="1"/>
           </p:nvPr>
         </p:nvSpPr>
-        <p:spPr/>
+        <p:spPr>
+          <a:xfrm>
+            <a:off x="1103312" y="2052918"/>
+            <a:ext cx="8946541" cy="4615440"/>
+          </a:xfrm>
+        </p:spPr>
         <p:txBody>
           <a:bodyPr/>
           <a:lstStyle/>
           <a:p>
+            <a:r>
+              <a:rPr lang="en-US" dirty="0" smtClean="0"/>
+              <a:t>The program begins by reading in a list of databases required.</a:t>
+            </a:r>
+          </a:p>
+          <a:p>
+            <a:r>
+              <a:rPr lang="en-US" dirty="0" smtClean="0"/>
+              <a:t>The user then logs in with their Employee ID</a:t>
+            </a:r>
+          </a:p>
+          <a:p>
+            <a:r>
+              <a:rPr lang="en-US" dirty="0" smtClean="0"/>
+              <a:t>The </a:t>
+            </a:r>
+            <a:r>
+              <a:rPr lang="en-US" dirty="0" smtClean="0"/>
+              <a:t>employee is </a:t>
+            </a:r>
+            <a:r>
+              <a:rPr lang="en-US" dirty="0" smtClean="0"/>
+              <a:t>then presented with a menu list of options to choose from</a:t>
+            </a:r>
+          </a:p>
+          <a:p>
+            <a:r>
+              <a:rPr lang="en-US" dirty="0" smtClean="0"/>
+              <a:t>The first three options prints out the store’s databases and important details</a:t>
+            </a:r>
+          </a:p>
+          <a:p>
+            <a:r>
+              <a:rPr lang="en-US" dirty="0" smtClean="0"/>
+              <a:t>Options 3-6 allows the user to interact with the databases to edit employees (Add a new employee, edit an existing, or remove an employee), edit store </a:t>
+            </a:r>
+            <a:r>
+              <a:rPr lang="en-US" dirty="0"/>
+              <a:t>transactions </a:t>
+            </a:r>
+            <a:r>
+              <a:rPr lang="en-US" dirty="0" smtClean="0"/>
+              <a:t>(Reorder, Order new, remove an order, or view an order), and edit the inventory (Add new, remove, and view)</a:t>
+            </a:r>
+          </a:p>
+          <a:p>
+            <a:r>
+              <a:rPr lang="en-US" dirty="0" smtClean="0"/>
+              <a:t>Finally, the user can search a book by ISBN to help out customers</a:t>
+            </a:r>
             <a:endParaRPr lang="en-US" dirty="0"/>
           </a:p>
         </p:txBody>
@@ -6779,7 +6834,7 @@
   <p:timing>
     <p:tnLst>
       <p:par>
-        <p:cTn id="1" dur="indefinite" restart="never" nodeType="tmRoot"/>
+        <p:cTn xmlns:p14="http://schemas.microsoft.com/office/powerpoint/2010/main" id="1" dur="indefinite" restart="never" nodeType="tmRoot"/>
       </p:par>
     </p:tnLst>
   </p:timing>
@@ -8199,7 +8254,7 @@
   <p:timing>
     <p:tnLst>
       <p:par>
-        <p:cTn id="1" dur="indefinite" restart="never" nodeType="tmRoot"/>
+        <p:cTn xmlns:p14="http://schemas.microsoft.com/office/powerpoint/2010/main" id="1" dur="indefinite" restart="never" nodeType="tmRoot"/>
       </p:par>
     </p:tnLst>
   </p:timing>
@@ -8287,7 +8342,7 @@
   <p:timing>
     <p:tnLst>
       <p:par>
-        <p:cTn id="1" dur="indefinite" restart="never" nodeType="tmRoot"/>
+        <p:cTn xmlns:p14="http://schemas.microsoft.com/office/powerpoint/2010/main" id="1" dur="indefinite" restart="never" nodeType="tmRoot"/>
       </p:par>
     </p:tnLst>
   </p:timing>
@@ -8376,7 +8431,7 @@
   <p:timing>
     <p:tnLst>
       <p:par>
-        <p:cTn id="1" dur="indefinite" restart="never" nodeType="tmRoot"/>
+        <p:cTn xmlns:p14="http://schemas.microsoft.com/office/powerpoint/2010/main" id="1" dur="indefinite" restart="never" nodeType="tmRoot"/>
       </p:par>
     </p:tnLst>
   </p:timing>
@@ -8463,19 +8518,11 @@
           <a:p>
             <a:r>
               <a:rPr lang="en-US" dirty="0" smtClean="0"/>
-              <a:t>Additional </a:t>
-            </a:r>
-            <a:r>
-              <a:rPr lang="en-US" dirty="0" smtClean="0"/>
-              <a:t>functionality </a:t>
-            </a:r>
-            <a:r>
-              <a:rPr lang="en-US" smtClean="0"/>
-              <a:t>specific to </a:t>
-            </a:r>
-            <a:r>
-              <a:rPr lang="en-US" smtClean="0"/>
-              <a:t>managers </a:t>
+              <a:t>Additional functionality </a:t>
+            </a:r>
+            <a:r>
+              <a:rPr lang="en-US" smtClean="0"/>
+              <a:t>specific to managers </a:t>
             </a:r>
             <a:r>
               <a:rPr lang="en-US" dirty="0" smtClean="0"/>
@@ -8498,7 +8545,7 @@
   <p:timing>
     <p:tnLst>
       <p:par>
-        <p:cTn id="1" dur="indefinite" restart="never" nodeType="tmRoot"/>
+        <p:cTn xmlns:p14="http://schemas.microsoft.com/office/powerpoint/2010/main" id="1" dur="indefinite" restart="never" nodeType="tmRoot"/>
       </p:par>
     </p:tnLst>
   </p:timing>
@@ -8581,7 +8628,7 @@
   <p:timing>
     <p:tnLst>
       <p:par>
-        <p:cTn id="1" dur="indefinite" restart="never" nodeType="tmRoot"/>
+        <p:cTn xmlns:p14="http://schemas.microsoft.com/office/powerpoint/2010/main" id="1" dur="indefinite" restart="never" nodeType="tmRoot"/>
       </p:par>
     </p:tnLst>
   </p:timing>
@@ -8848,7 +8895,7 @@
   <a:extraClrSchemeLst/>
   <a:extLst>
     <a:ext uri="{05A4C25C-085E-4340-85A3-A5531E510DB2}">
-      <thm15:themeFamily xmlns:thm15="http://schemas.microsoft.com/office/thememl/2012/main" name="Ion" id="{B8441ADB-2E43-4AF7-B97A-BD870242C6A8}" vid="{292E63A9-BB86-4E3D-B92A-7223C6510D2E}"/>
+      <thm15:themeFamily xmlns:thm15="http://schemas.microsoft.com/office/thememl/2012/main" xmlns="" name="Ion" id="{B8441ADB-2E43-4AF7-B97A-BD870242C6A8}" vid="{292E63A9-BB86-4E3D-B92A-7223C6510D2E}"/>
     </a:ext>
   </a:extLst>
 </a:theme>

</xml_diff>

<commit_message>
Added Problem statement slide.
</commit_message>
<xml_diff>
--- a/BookStoreApp Presentation.pptx
+++ b/BookStoreApp Presentation.pptx
@@ -114,7 +114,7 @@
   </p:defaultTextStyle>
   <p:extLst>
     <p:ext uri="{EFAFB233-063F-42B5-8137-9DF3F51BA10A}">
-      <p15:sldGuideLst xmlns:p15="http://schemas.microsoft.com/office/powerpoint/2012/main" xmlns="">
+      <p15:sldGuideLst xmlns:p15="http://schemas.microsoft.com/office/powerpoint/2012/main">
         <p15:guide id="1" orient="horz" pos="2160">
           <p15:clr>
             <a:srgbClr val="A4A3A4"/>
@@ -317,7 +317,7 @@
           <a:p>
             <a:fld id="{F84A0333-8D1E-40F4-B17F-5D43FAAA70A1}" type="datetimeFigureOut">
               <a:rPr lang="en-US" smtClean="0"/>
-              <a:t>12/8/14</a:t>
+              <a:t>12/9/2014</a:t>
             </a:fld>
             <a:endParaRPr lang="en-US"/>
           </a:p>
@@ -592,7 +592,7 @@
           <a:p>
             <a:fld id="{F84A0333-8D1E-40F4-B17F-5D43FAAA70A1}" type="datetimeFigureOut">
               <a:rPr lang="en-US" smtClean="0"/>
-              <a:t>12/8/14</a:t>
+              <a:t>12/9/2014</a:t>
             </a:fld>
             <a:endParaRPr lang="en-US"/>
           </a:p>
@@ -786,7 +786,7 @@
           <a:p>
             <a:fld id="{F84A0333-8D1E-40F4-B17F-5D43FAAA70A1}" type="datetimeFigureOut">
               <a:rPr lang="en-US" smtClean="0"/>
-              <a:t>12/8/14</a:t>
+              <a:t>12/9/2014</a:t>
             </a:fld>
             <a:endParaRPr lang="en-US"/>
           </a:p>
@@ -1059,7 +1059,7 @@
           <a:p>
             <a:fld id="{F84A0333-8D1E-40F4-B17F-5D43FAAA70A1}" type="datetimeFigureOut">
               <a:rPr lang="en-US" smtClean="0"/>
-              <a:t>12/8/14</a:t>
+              <a:t>12/9/2014</a:t>
             </a:fld>
             <a:endParaRPr lang="en-US"/>
           </a:p>
@@ -1400,7 +1400,7 @@
           <a:p>
             <a:fld id="{F84A0333-8D1E-40F4-B17F-5D43FAAA70A1}" type="datetimeFigureOut">
               <a:rPr lang="en-US" smtClean="0"/>
-              <a:t>12/8/14</a:t>
+              <a:t>12/9/2014</a:t>
             </a:fld>
             <a:endParaRPr lang="en-US"/>
           </a:p>
@@ -2023,7 +2023,7 @@
           <a:p>
             <a:fld id="{F84A0333-8D1E-40F4-B17F-5D43FAAA70A1}" type="datetimeFigureOut">
               <a:rPr lang="en-US" smtClean="0"/>
-              <a:t>12/8/14</a:t>
+              <a:t>12/9/2014</a:t>
             </a:fld>
             <a:endParaRPr lang="en-US"/>
           </a:p>
@@ -2883,7 +2883,7 @@
           <a:p>
             <a:fld id="{F84A0333-8D1E-40F4-B17F-5D43FAAA70A1}" type="datetimeFigureOut">
               <a:rPr lang="en-US" smtClean="0"/>
-              <a:t>12/8/14</a:t>
+              <a:t>12/9/2014</a:t>
             </a:fld>
             <a:endParaRPr lang="en-US"/>
           </a:p>
@@ -3053,7 +3053,7 @@
           <a:p>
             <a:fld id="{F84A0333-8D1E-40F4-B17F-5D43FAAA70A1}" type="datetimeFigureOut">
               <a:rPr lang="en-US" smtClean="0"/>
-              <a:t>12/8/14</a:t>
+              <a:t>12/9/2014</a:t>
             </a:fld>
             <a:endParaRPr lang="en-US"/>
           </a:p>
@@ -3233,7 +3233,7 @@
           <a:p>
             <a:fld id="{F84A0333-8D1E-40F4-B17F-5D43FAAA70A1}" type="datetimeFigureOut">
               <a:rPr lang="en-US" smtClean="0"/>
-              <a:t>12/8/14</a:t>
+              <a:t>12/9/2014</a:t>
             </a:fld>
             <a:endParaRPr lang="en-US"/>
           </a:p>
@@ -3403,7 +3403,7 @@
           <a:p>
             <a:fld id="{F84A0333-8D1E-40F4-B17F-5D43FAAA70A1}" type="datetimeFigureOut">
               <a:rPr lang="en-US" smtClean="0"/>
-              <a:t>12/8/14</a:t>
+              <a:t>12/9/2014</a:t>
             </a:fld>
             <a:endParaRPr lang="en-US"/>
           </a:p>
@@ -3650,7 +3650,7 @@
           <a:p>
             <a:fld id="{F84A0333-8D1E-40F4-B17F-5D43FAAA70A1}" type="datetimeFigureOut">
               <a:rPr lang="en-US" smtClean="0"/>
-              <a:t>12/8/14</a:t>
+              <a:t>12/9/2014</a:t>
             </a:fld>
             <a:endParaRPr lang="en-US"/>
           </a:p>
@@ -3942,7 +3942,7 @@
           <a:p>
             <a:fld id="{F84A0333-8D1E-40F4-B17F-5D43FAAA70A1}" type="datetimeFigureOut">
               <a:rPr lang="en-US" smtClean="0"/>
-              <a:t>12/8/14</a:t>
+              <a:t>12/9/2014</a:t>
             </a:fld>
             <a:endParaRPr lang="en-US"/>
           </a:p>
@@ -4386,7 +4386,7 @@
           <a:p>
             <a:fld id="{F84A0333-8D1E-40F4-B17F-5D43FAAA70A1}" type="datetimeFigureOut">
               <a:rPr lang="en-US" smtClean="0"/>
-              <a:t>12/8/14</a:t>
+              <a:t>12/9/2014</a:t>
             </a:fld>
             <a:endParaRPr lang="en-US"/>
           </a:p>
@@ -4504,7 +4504,7 @@
           <a:p>
             <a:fld id="{F84A0333-8D1E-40F4-B17F-5D43FAAA70A1}" type="datetimeFigureOut">
               <a:rPr lang="en-US" smtClean="0"/>
-              <a:t>12/8/14</a:t>
+              <a:t>12/9/2014</a:t>
             </a:fld>
             <a:endParaRPr lang="en-US"/>
           </a:p>
@@ -4599,7 +4599,7 @@
           <a:p>
             <a:fld id="{F84A0333-8D1E-40F4-B17F-5D43FAAA70A1}" type="datetimeFigureOut">
               <a:rPr lang="en-US" smtClean="0"/>
-              <a:t>12/8/14</a:t>
+              <a:t>12/9/2014</a:t>
             </a:fld>
             <a:endParaRPr lang="en-US"/>
           </a:p>
@@ -4878,7 +4878,7 @@
           <a:p>
             <a:fld id="{F84A0333-8D1E-40F4-B17F-5D43FAAA70A1}" type="datetimeFigureOut">
               <a:rPr lang="en-US" smtClean="0"/>
-              <a:t>12/8/14</a:t>
+              <a:t>12/9/2014</a:t>
             </a:fld>
             <a:endParaRPr lang="en-US"/>
           </a:p>
@@ -5153,7 +5153,7 @@
           <a:p>
             <a:fld id="{F84A0333-8D1E-40F4-B17F-5D43FAAA70A1}" type="datetimeFigureOut">
               <a:rPr lang="en-US" smtClean="0"/>
-              <a:t>12/8/14</a:t>
+              <a:t>12/9/2014</a:t>
             </a:fld>
             <a:endParaRPr lang="en-US"/>
           </a:p>
@@ -5582,7 +5582,7 @@
           <a:p>
             <a:fld id="{F84A0333-8D1E-40F4-B17F-5D43FAAA70A1}" type="datetimeFigureOut">
               <a:rPr lang="en-US" smtClean="0"/>
-              <a:t>12/8/14</a:t>
+              <a:t>12/9/2014</a:t>
             </a:fld>
             <a:endParaRPr lang="en-US"/>
           </a:p>
@@ -6156,7 +6156,7 @@
         </p:spPr>
         <p:txBody>
           <a:bodyPr>
-            <a:normAutofit/>
+            <a:normAutofit lnSpcReduction="10000"/>
           </a:bodyPr>
           <a:lstStyle/>
           <a:p>
@@ -6190,8 +6190,24 @@
           <a:p>
             <a:pPr algn="l"/>
             <a:r>
+              <a:rPr lang="en-US" dirty="0" err="1" smtClean="0"/>
+              <a:t>Siddhanth</a:t>
+            </a:r>
+            <a:r>
               <a:rPr lang="en-US" dirty="0" smtClean="0"/>
-              <a:t>Siddhanth Sabharwal</a:t>
+              <a:t> </a:t>
+            </a:r>
+            <a:r>
+              <a:rPr lang="en-US" dirty="0" err="1" smtClean="0"/>
+              <a:t>Sabharwal</a:t>
+            </a:r>
+            <a:endParaRPr lang="en-US" dirty="0" smtClean="0"/>
+          </a:p>
+          <a:p>
+            <a:pPr algn="l"/>
+            <a:r>
+              <a:rPr lang="en-US" dirty="0" smtClean="0"/>
+              <a:t>Timothy Walker</a:t>
             </a:r>
             <a:endParaRPr lang="en-US" dirty="0"/>
           </a:p>
@@ -6258,7 +6274,7 @@
   <p:timing>
     <p:tnLst>
       <p:par>
-        <p:cTn xmlns:p14="http://schemas.microsoft.com/office/powerpoint/2010/main" id="1" dur="indefinite" restart="never" nodeType="tmRoot"/>
+        <p:cTn id="1" dur="indefinite" restart="never" nodeType="tmRoot"/>
       </p:par>
     </p:tnLst>
   </p:timing>
@@ -6420,7 +6436,7 @@
   <p:timing>
     <p:tnLst>
       <p:par>
-        <p:cTn xmlns:p14="http://schemas.microsoft.com/office/powerpoint/2010/main" id="1" dur="indefinite" restart="never" nodeType="tmRoot"/>
+        <p:cTn id="1" dur="indefinite" restart="never" nodeType="tmRoot"/>
       </p:par>
     </p:tnLst>
   </p:timing>
@@ -6700,7 +6716,7 @@
   <p:timing>
     <p:tnLst>
       <p:par>
-        <p:cTn xmlns:p14="http://schemas.microsoft.com/office/powerpoint/2010/main" id="1" dur="indefinite" restart="never" nodeType="tmRoot"/>
+        <p:cTn id="1" dur="indefinite" restart="never" nodeType="tmRoot"/>
       </p:par>
     </p:tnLst>
   </p:timing>
@@ -6781,15 +6797,7 @@
           <a:p>
             <a:r>
               <a:rPr lang="en-US" dirty="0" smtClean="0"/>
-              <a:t>The </a:t>
-            </a:r>
-            <a:r>
-              <a:rPr lang="en-US" dirty="0" smtClean="0"/>
-              <a:t>employee is </a:t>
-            </a:r>
-            <a:r>
-              <a:rPr lang="en-US" dirty="0" smtClean="0"/>
-              <a:t>then presented with a menu list of options to choose from</a:t>
+              <a:t>The employee is then presented with a menu list of options to choose from</a:t>
             </a:r>
           </a:p>
           <a:p>
@@ -6834,7 +6842,7 @@
   <p:timing>
     <p:tnLst>
       <p:par>
-        <p:cTn xmlns:p14="http://schemas.microsoft.com/office/powerpoint/2010/main" id="1" dur="indefinite" restart="never" nodeType="tmRoot"/>
+        <p:cTn id="1" dur="indefinite" restart="never" nodeType="tmRoot"/>
       </p:par>
     </p:tnLst>
   </p:timing>
@@ -8254,7 +8262,7 @@
   <p:timing>
     <p:tnLst>
       <p:par>
-        <p:cTn xmlns:p14="http://schemas.microsoft.com/office/powerpoint/2010/main" id="1" dur="indefinite" restart="never" nodeType="tmRoot"/>
+        <p:cTn id="1" dur="indefinite" restart="never" nodeType="tmRoot"/>
       </p:par>
     </p:tnLst>
   </p:timing>
@@ -8342,7 +8350,7 @@
   <p:timing>
     <p:tnLst>
       <p:par>
-        <p:cTn xmlns:p14="http://schemas.microsoft.com/office/powerpoint/2010/main" id="1" dur="indefinite" restart="never" nodeType="tmRoot"/>
+        <p:cTn id="1" dur="indefinite" restart="never" nodeType="tmRoot"/>
       </p:par>
     </p:tnLst>
   </p:timing>
@@ -8383,7 +8391,7 @@
           <a:p>
             <a:r>
               <a:rPr lang="en-US" dirty="0" smtClean="0"/>
-              <a:t>EXPLANATION OF OUTPUT</a:t>
+              <a:t>Problem Statement</a:t>
             </a:r>
             <a:endParaRPr lang="en-US" dirty="0"/>
           </a:p>
@@ -8406,14 +8414,56 @@
           <a:p>
             <a:r>
               <a:rPr lang="en-US" dirty="0" smtClean="0"/>
-              <a:t>Why did the program work the way it did</a:t>
-            </a:r>
-          </a:p>
-          <a:p>
+              <a:t>Main Goal:</a:t>
+            </a:r>
+          </a:p>
+          <a:p>
+            <a:pPr marL="457200" lvl="1" indent="0">
+              <a:buNone/>
+            </a:pPr>
             <a:r>
               <a:rPr lang="en-US" dirty="0" smtClean="0"/>
-              <a:t>quick recap of what happened</a:t>
-            </a:r>
+              <a:t>To develop software to manage a bookstores inventory, employee databases and orders.</a:t>
+            </a:r>
+            <a:endParaRPr lang="en-US" dirty="0" smtClean="0"/>
+          </a:p>
+          <a:p>
+            <a:r>
+              <a:rPr lang="en-US" dirty="0" smtClean="0"/>
+              <a:t>This software is designed to be operated by, but not limited to, standard employees and managers.</a:t>
+            </a:r>
+          </a:p>
+          <a:p>
+            <a:r>
+              <a:rPr lang="en-US" dirty="0" smtClean="0"/>
+              <a:t>Non-Functional </a:t>
+            </a:r>
+            <a:r>
+              <a:rPr lang="en-US" dirty="0"/>
+              <a:t>R</a:t>
+            </a:r>
+            <a:r>
+              <a:rPr lang="en-US" dirty="0" smtClean="0"/>
+              <a:t>equirements</a:t>
+            </a:r>
+          </a:p>
+          <a:p>
+            <a:pPr lvl="1"/>
+            <a:r>
+              <a:rPr lang="en-US" dirty="0" smtClean="0"/>
+              <a:t>Operating system: Windows</a:t>
+            </a:r>
+          </a:p>
+          <a:p>
+            <a:pPr lvl="1"/>
+            <a:r>
+              <a:rPr lang="en-US" dirty="0" smtClean="0"/>
+              <a:t>Written in C++ programming language.</a:t>
+            </a:r>
+            <a:endParaRPr lang="en-US" dirty="0" smtClean="0"/>
+          </a:p>
+          <a:p>
+            <a:pPr lvl="1"/>
             <a:endParaRPr lang="en-US" dirty="0"/>
           </a:p>
         </p:txBody>
@@ -8431,7 +8481,7 @@
   <p:timing>
     <p:tnLst>
       <p:par>
-        <p:cTn xmlns:p14="http://schemas.microsoft.com/office/powerpoint/2010/main" id="1" dur="indefinite" restart="never" nodeType="tmRoot"/>
+        <p:cTn id="1" dur="indefinite" restart="never" nodeType="tmRoot"/>
       </p:par>
     </p:tnLst>
   </p:timing>
@@ -8545,7 +8595,7 @@
   <p:timing>
     <p:tnLst>
       <p:par>
-        <p:cTn xmlns:p14="http://schemas.microsoft.com/office/powerpoint/2010/main" id="1" dur="indefinite" restart="never" nodeType="tmRoot"/>
+        <p:cTn id="1" dur="indefinite" restart="never" nodeType="tmRoot"/>
       </p:par>
     </p:tnLst>
   </p:timing>
@@ -8628,7 +8678,7 @@
   <p:timing>
     <p:tnLst>
       <p:par>
-        <p:cTn xmlns:p14="http://schemas.microsoft.com/office/powerpoint/2010/main" id="1" dur="indefinite" restart="never" nodeType="tmRoot"/>
+        <p:cTn id="1" dur="indefinite" restart="never" nodeType="tmRoot"/>
       </p:par>
     </p:tnLst>
   </p:timing>
@@ -8895,7 +8945,7 @@
   <a:extraClrSchemeLst/>
   <a:extLst>
     <a:ext uri="{05A4C25C-085E-4340-85A3-A5531E510DB2}">
-      <thm15:themeFamily xmlns:thm15="http://schemas.microsoft.com/office/thememl/2012/main" xmlns="" name="Ion" id="{B8441ADB-2E43-4AF7-B97A-BD870242C6A8}" vid="{292E63A9-BB86-4E3D-B92A-7223C6510D2E}"/>
+      <thm15:themeFamily xmlns:thm15="http://schemas.microsoft.com/office/thememl/2012/main" name="Ion" id="{B8441ADB-2E43-4AF7-B97A-BD870242C6A8}" vid="{292E63A9-BB86-4E3D-B92A-7223C6510D2E}"/>
     </a:ext>
   </a:extLst>
 </a:theme>

</xml_diff>

<commit_message>
Changed some slides, and added more information to existing slides
</commit_message>
<xml_diff>
--- a/BookStoreApp Presentation.pptx
+++ b/BookStoreApp Presentation.pptx
@@ -6,12 +6,12 @@
   </p:sldMasterIdLst>
   <p:sldIdLst>
     <p:sldId id="256" r:id="rId2"/>
-    <p:sldId id="257" r:id="rId3"/>
-    <p:sldId id="258" r:id="rId4"/>
-    <p:sldId id="259" r:id="rId5"/>
-    <p:sldId id="260" r:id="rId6"/>
-    <p:sldId id="262" r:id="rId7"/>
-    <p:sldId id="263" r:id="rId8"/>
+    <p:sldId id="263" r:id="rId3"/>
+    <p:sldId id="257" r:id="rId4"/>
+    <p:sldId id="258" r:id="rId5"/>
+    <p:sldId id="259" r:id="rId6"/>
+    <p:sldId id="260" r:id="rId7"/>
+    <p:sldId id="262" r:id="rId8"/>
     <p:sldId id="261" r:id="rId9"/>
     <p:sldId id="264" r:id="rId10"/>
   </p:sldIdLst>
@@ -319,7 +319,7 @@
               <a:rPr lang="en-US" smtClean="0"/>
               <a:t>12/9/2014</a:t>
             </a:fld>
-            <a:endParaRPr lang="en-US"/>
+            <a:endParaRPr lang="en-US" dirty="0"/>
           </a:p>
         </p:txBody>
       </p:sp>
@@ -338,7 +338,7 @@
           <a:bodyPr/>
           <a:lstStyle/>
           <a:p>
-            <a:endParaRPr lang="en-US"/>
+            <a:endParaRPr lang="en-US" dirty="0"/>
           </a:p>
         </p:txBody>
       </p:sp>
@@ -361,7 +361,7 @@
               <a:rPr lang="en-US" smtClean="0"/>
               <a:t>‹#›</a:t>
             </a:fld>
-            <a:endParaRPr lang="en-US"/>
+            <a:endParaRPr lang="en-US" dirty="0"/>
           </a:p>
         </p:txBody>
       </p:sp>
@@ -501,7 +501,7 @@
           </a:lstStyle>
           <a:p>
             <a:r>
-              <a:rPr lang="en-US" smtClean="0"/>
+              <a:rPr lang="en-US" dirty="0" smtClean="0"/>
               <a:t>Click icon to add picture</a:t>
             </a:r>
             <a:endParaRPr lang="en-US" dirty="0"/>
@@ -594,7 +594,7 @@
               <a:rPr lang="en-US" smtClean="0"/>
               <a:t>12/9/2014</a:t>
             </a:fld>
-            <a:endParaRPr lang="en-US"/>
+            <a:endParaRPr lang="en-US" dirty="0"/>
           </a:p>
         </p:txBody>
       </p:sp>
@@ -613,7 +613,7 @@
           <a:bodyPr/>
           <a:lstStyle/>
           <a:p>
-            <a:endParaRPr lang="en-US"/>
+            <a:endParaRPr lang="en-US" dirty="0"/>
           </a:p>
         </p:txBody>
       </p:sp>
@@ -636,7 +636,7 @@
               <a:rPr lang="en-US" smtClean="0"/>
               <a:t>‹#›</a:t>
             </a:fld>
-            <a:endParaRPr lang="en-US"/>
+            <a:endParaRPr lang="en-US" dirty="0"/>
           </a:p>
         </p:txBody>
       </p:sp>
@@ -788,7 +788,7 @@
               <a:rPr lang="en-US" smtClean="0"/>
               <a:t>12/9/2014</a:t>
             </a:fld>
-            <a:endParaRPr lang="en-US"/>
+            <a:endParaRPr lang="en-US" dirty="0"/>
           </a:p>
         </p:txBody>
       </p:sp>
@@ -807,7 +807,7 @@
           <a:bodyPr/>
           <a:lstStyle/>
           <a:p>
-            <a:endParaRPr lang="en-US"/>
+            <a:endParaRPr lang="en-US" dirty="0"/>
           </a:p>
         </p:txBody>
       </p:sp>
@@ -830,7 +830,7 @@
               <a:rPr lang="en-US" smtClean="0"/>
               <a:t>‹#›</a:t>
             </a:fld>
-            <a:endParaRPr lang="en-US"/>
+            <a:endParaRPr lang="en-US" dirty="0"/>
           </a:p>
         </p:txBody>
       </p:sp>
@@ -1061,7 +1061,7 @@
               <a:rPr lang="en-US" smtClean="0"/>
               <a:t>12/9/2014</a:t>
             </a:fld>
-            <a:endParaRPr lang="en-US"/>
+            <a:endParaRPr lang="en-US" dirty="0"/>
           </a:p>
         </p:txBody>
       </p:sp>
@@ -1080,7 +1080,7 @@
           <a:bodyPr/>
           <a:lstStyle/>
           <a:p>
-            <a:endParaRPr lang="en-US"/>
+            <a:endParaRPr lang="en-US" dirty="0"/>
           </a:p>
         </p:txBody>
       </p:sp>
@@ -1103,7 +1103,7 @@
               <a:rPr lang="en-US" smtClean="0"/>
               <a:t>‹#›</a:t>
             </a:fld>
-            <a:endParaRPr lang="en-US"/>
+            <a:endParaRPr lang="en-US" dirty="0"/>
           </a:p>
         </p:txBody>
       </p:sp>
@@ -1402,7 +1402,7 @@
               <a:rPr lang="en-US" smtClean="0"/>
               <a:t>12/9/2014</a:t>
             </a:fld>
-            <a:endParaRPr lang="en-US"/>
+            <a:endParaRPr lang="en-US" dirty="0"/>
           </a:p>
         </p:txBody>
       </p:sp>
@@ -1421,7 +1421,7 @@
           <a:bodyPr/>
           <a:lstStyle/>
           <a:p>
-            <a:endParaRPr lang="en-US"/>
+            <a:endParaRPr lang="en-US" dirty="0"/>
           </a:p>
         </p:txBody>
       </p:sp>
@@ -1444,7 +1444,7 @@
               <a:rPr lang="en-US" smtClean="0"/>
               <a:t>‹#›</a:t>
             </a:fld>
-            <a:endParaRPr lang="en-US"/>
+            <a:endParaRPr lang="en-US" dirty="0"/>
           </a:p>
         </p:txBody>
       </p:sp>
@@ -2025,7 +2025,7 @@
               <a:rPr lang="en-US" smtClean="0"/>
               <a:t>12/9/2014</a:t>
             </a:fld>
-            <a:endParaRPr lang="en-US"/>
+            <a:endParaRPr lang="en-US" dirty="0"/>
           </a:p>
         </p:txBody>
       </p:sp>
@@ -2044,7 +2044,7 @@
           <a:bodyPr/>
           <a:lstStyle/>
           <a:p>
-            <a:endParaRPr lang="en-US"/>
+            <a:endParaRPr lang="en-US" dirty="0"/>
           </a:p>
         </p:txBody>
       </p:sp>
@@ -2067,7 +2067,7 @@
               <a:rPr lang="en-US" smtClean="0"/>
               <a:t>‹#›</a:t>
             </a:fld>
-            <a:endParaRPr lang="en-US"/>
+            <a:endParaRPr lang="en-US" dirty="0"/>
           </a:p>
         </p:txBody>
       </p:sp>
@@ -2274,7 +2274,7 @@
           </a:lstStyle>
           <a:p>
             <a:r>
-              <a:rPr lang="en-US" smtClean="0"/>
+              <a:rPr lang="en-US" dirty="0" smtClean="0"/>
               <a:t>Click icon to add picture</a:t>
             </a:r>
             <a:endParaRPr lang="en-US" dirty="0"/>
@@ -2494,7 +2494,7 @@
           </a:lstStyle>
           <a:p>
             <a:r>
-              <a:rPr lang="en-US" smtClean="0"/>
+              <a:rPr lang="en-US" dirty="0" smtClean="0"/>
               <a:t>Click icon to add picture</a:t>
             </a:r>
             <a:endParaRPr lang="en-US" dirty="0"/>
@@ -2714,7 +2714,7 @@
           </a:lstStyle>
           <a:p>
             <a:r>
-              <a:rPr lang="en-US" smtClean="0"/>
+              <a:rPr lang="en-US" dirty="0" smtClean="0"/>
               <a:t>Click icon to add picture</a:t>
             </a:r>
             <a:endParaRPr lang="en-US" dirty="0"/>
@@ -2885,7 +2885,7 @@
               <a:rPr lang="en-US" smtClean="0"/>
               <a:t>12/9/2014</a:t>
             </a:fld>
-            <a:endParaRPr lang="en-US"/>
+            <a:endParaRPr lang="en-US" dirty="0"/>
           </a:p>
         </p:txBody>
       </p:sp>
@@ -2904,7 +2904,7 @@
           <a:bodyPr/>
           <a:lstStyle/>
           <a:p>
-            <a:endParaRPr lang="en-US"/>
+            <a:endParaRPr lang="en-US" dirty="0"/>
           </a:p>
         </p:txBody>
       </p:sp>
@@ -2927,7 +2927,7 @@
               <a:rPr lang="en-US" smtClean="0"/>
               <a:t>‹#›</a:t>
             </a:fld>
-            <a:endParaRPr lang="en-US"/>
+            <a:endParaRPr lang="en-US" dirty="0"/>
           </a:p>
         </p:txBody>
       </p:sp>
@@ -3055,7 +3055,7 @@
               <a:rPr lang="en-US" smtClean="0"/>
               <a:t>12/9/2014</a:t>
             </a:fld>
-            <a:endParaRPr lang="en-US"/>
+            <a:endParaRPr lang="en-US" dirty="0"/>
           </a:p>
         </p:txBody>
       </p:sp>
@@ -3074,7 +3074,7 @@
           <a:bodyPr/>
           <a:lstStyle/>
           <a:p>
-            <a:endParaRPr lang="en-US"/>
+            <a:endParaRPr lang="en-US" dirty="0"/>
           </a:p>
         </p:txBody>
       </p:sp>
@@ -3097,7 +3097,7 @@
               <a:rPr lang="en-US" smtClean="0"/>
               <a:t>‹#›</a:t>
             </a:fld>
-            <a:endParaRPr lang="en-US"/>
+            <a:endParaRPr lang="en-US" dirty="0"/>
           </a:p>
         </p:txBody>
       </p:sp>
@@ -3235,7 +3235,7 @@
               <a:rPr lang="en-US" smtClean="0"/>
               <a:t>12/9/2014</a:t>
             </a:fld>
-            <a:endParaRPr lang="en-US"/>
+            <a:endParaRPr lang="en-US" dirty="0"/>
           </a:p>
         </p:txBody>
       </p:sp>
@@ -3254,7 +3254,7 @@
           <a:bodyPr/>
           <a:lstStyle/>
           <a:p>
-            <a:endParaRPr lang="en-US"/>
+            <a:endParaRPr lang="en-US" dirty="0"/>
           </a:p>
         </p:txBody>
       </p:sp>
@@ -3277,7 +3277,7 @@
               <a:rPr lang="en-US" smtClean="0"/>
               <a:t>‹#›</a:t>
             </a:fld>
-            <a:endParaRPr lang="en-US"/>
+            <a:endParaRPr lang="en-US" dirty="0"/>
           </a:p>
         </p:txBody>
       </p:sp>
@@ -3405,7 +3405,7 @@
               <a:rPr lang="en-US" smtClean="0"/>
               <a:t>12/9/2014</a:t>
             </a:fld>
-            <a:endParaRPr lang="en-US"/>
+            <a:endParaRPr lang="en-US" dirty="0"/>
           </a:p>
         </p:txBody>
       </p:sp>
@@ -3424,7 +3424,7 @@
           <a:bodyPr/>
           <a:lstStyle/>
           <a:p>
-            <a:endParaRPr lang="en-US"/>
+            <a:endParaRPr lang="en-US" dirty="0"/>
           </a:p>
         </p:txBody>
       </p:sp>
@@ -3447,7 +3447,7 @@
               <a:rPr lang="en-US" smtClean="0"/>
               <a:t>‹#›</a:t>
             </a:fld>
-            <a:endParaRPr lang="en-US"/>
+            <a:endParaRPr lang="en-US" dirty="0"/>
           </a:p>
         </p:txBody>
       </p:sp>
@@ -3652,7 +3652,7 @@
               <a:rPr lang="en-US" smtClean="0"/>
               <a:t>12/9/2014</a:t>
             </a:fld>
-            <a:endParaRPr lang="en-US"/>
+            <a:endParaRPr lang="en-US" dirty="0"/>
           </a:p>
         </p:txBody>
       </p:sp>
@@ -3671,7 +3671,7 @@
           <a:bodyPr/>
           <a:lstStyle/>
           <a:p>
-            <a:endParaRPr lang="en-US"/>
+            <a:endParaRPr lang="en-US" dirty="0"/>
           </a:p>
         </p:txBody>
       </p:sp>
@@ -3694,7 +3694,7 @@
               <a:rPr lang="en-US" smtClean="0"/>
               <a:t>‹#›</a:t>
             </a:fld>
-            <a:endParaRPr lang="en-US"/>
+            <a:endParaRPr lang="en-US" dirty="0"/>
           </a:p>
         </p:txBody>
       </p:sp>
@@ -3944,7 +3944,7 @@
               <a:rPr lang="en-US" smtClean="0"/>
               <a:t>12/9/2014</a:t>
             </a:fld>
-            <a:endParaRPr lang="en-US"/>
+            <a:endParaRPr lang="en-US" dirty="0"/>
           </a:p>
         </p:txBody>
       </p:sp>
@@ -3963,7 +3963,7 @@
           <a:bodyPr/>
           <a:lstStyle/>
           <a:p>
-            <a:endParaRPr lang="en-US"/>
+            <a:endParaRPr lang="en-US" dirty="0"/>
           </a:p>
         </p:txBody>
       </p:sp>
@@ -3986,7 +3986,7 @@
               <a:rPr lang="en-US" smtClean="0"/>
               <a:t>‹#›</a:t>
             </a:fld>
-            <a:endParaRPr lang="en-US"/>
+            <a:endParaRPr lang="en-US" dirty="0"/>
           </a:p>
         </p:txBody>
       </p:sp>
@@ -4388,7 +4388,7 @@
               <a:rPr lang="en-US" smtClean="0"/>
               <a:t>12/9/2014</a:t>
             </a:fld>
-            <a:endParaRPr lang="en-US"/>
+            <a:endParaRPr lang="en-US" dirty="0"/>
           </a:p>
         </p:txBody>
       </p:sp>
@@ -4407,7 +4407,7 @@
           <a:bodyPr/>
           <a:lstStyle/>
           <a:p>
-            <a:endParaRPr lang="en-US"/>
+            <a:endParaRPr lang="en-US" dirty="0"/>
           </a:p>
         </p:txBody>
       </p:sp>
@@ -4430,7 +4430,7 @@
               <a:rPr lang="en-US" smtClean="0"/>
               <a:t>‹#›</a:t>
             </a:fld>
-            <a:endParaRPr lang="en-US"/>
+            <a:endParaRPr lang="en-US" dirty="0"/>
           </a:p>
         </p:txBody>
       </p:sp>
@@ -4506,7 +4506,7 @@
               <a:rPr lang="en-US" smtClean="0"/>
               <a:t>12/9/2014</a:t>
             </a:fld>
-            <a:endParaRPr lang="en-US"/>
+            <a:endParaRPr lang="en-US" dirty="0"/>
           </a:p>
         </p:txBody>
       </p:sp>
@@ -4525,7 +4525,7 @@
           <a:bodyPr/>
           <a:lstStyle/>
           <a:p>
-            <a:endParaRPr lang="en-US"/>
+            <a:endParaRPr lang="en-US" dirty="0"/>
           </a:p>
         </p:txBody>
       </p:sp>
@@ -4548,7 +4548,7 @@
               <a:rPr lang="en-US" smtClean="0"/>
               <a:t>‹#›</a:t>
             </a:fld>
-            <a:endParaRPr lang="en-US"/>
+            <a:endParaRPr lang="en-US" dirty="0"/>
           </a:p>
         </p:txBody>
       </p:sp>
@@ -4601,7 +4601,7 @@
               <a:rPr lang="en-US" smtClean="0"/>
               <a:t>12/9/2014</a:t>
             </a:fld>
-            <a:endParaRPr lang="en-US"/>
+            <a:endParaRPr lang="en-US" dirty="0"/>
           </a:p>
         </p:txBody>
       </p:sp>
@@ -4620,7 +4620,7 @@
           <a:bodyPr/>
           <a:lstStyle/>
           <a:p>
-            <a:endParaRPr lang="en-US"/>
+            <a:endParaRPr lang="en-US" dirty="0"/>
           </a:p>
         </p:txBody>
       </p:sp>
@@ -4643,7 +4643,7 @@
               <a:rPr lang="en-US" smtClean="0"/>
               <a:t>‹#›</a:t>
             </a:fld>
-            <a:endParaRPr lang="en-US"/>
+            <a:endParaRPr lang="en-US" dirty="0"/>
           </a:p>
         </p:txBody>
       </p:sp>
@@ -4880,7 +4880,7 @@
               <a:rPr lang="en-US" smtClean="0"/>
               <a:t>12/9/2014</a:t>
             </a:fld>
-            <a:endParaRPr lang="en-US"/>
+            <a:endParaRPr lang="en-US" dirty="0"/>
           </a:p>
         </p:txBody>
       </p:sp>
@@ -4899,7 +4899,7 @@
           <a:bodyPr/>
           <a:lstStyle/>
           <a:p>
-            <a:endParaRPr lang="en-US"/>
+            <a:endParaRPr lang="en-US" dirty="0"/>
           </a:p>
         </p:txBody>
       </p:sp>
@@ -4922,7 +4922,7 @@
               <a:rPr lang="en-US" smtClean="0"/>
               <a:t>‹#›</a:t>
             </a:fld>
-            <a:endParaRPr lang="en-US"/>
+            <a:endParaRPr lang="en-US" dirty="0"/>
           </a:p>
         </p:txBody>
       </p:sp>
@@ -5062,7 +5062,7 @@
           </a:lstStyle>
           <a:p>
             <a:r>
-              <a:rPr lang="en-US" smtClean="0"/>
+              <a:rPr lang="en-US" dirty="0" smtClean="0"/>
               <a:t>Click icon to add picture</a:t>
             </a:r>
             <a:endParaRPr lang="en-US" dirty="0"/>
@@ -5155,7 +5155,7 @@
               <a:rPr lang="en-US" smtClean="0"/>
               <a:t>12/9/2014</a:t>
             </a:fld>
-            <a:endParaRPr lang="en-US"/>
+            <a:endParaRPr lang="en-US" dirty="0"/>
           </a:p>
         </p:txBody>
       </p:sp>
@@ -5174,7 +5174,7 @@
           <a:bodyPr/>
           <a:lstStyle/>
           <a:p>
-            <a:endParaRPr lang="en-US"/>
+            <a:endParaRPr lang="en-US" dirty="0"/>
           </a:p>
         </p:txBody>
       </p:sp>
@@ -5197,7 +5197,7 @@
               <a:rPr lang="en-US" smtClean="0"/>
               <a:t>‹#›</a:t>
             </a:fld>
-            <a:endParaRPr lang="en-US"/>
+            <a:endParaRPr lang="en-US" dirty="0"/>
           </a:p>
         </p:txBody>
       </p:sp>
@@ -5584,7 +5584,7 @@
               <a:rPr lang="en-US" smtClean="0"/>
               <a:t>12/9/2014</a:t>
             </a:fld>
-            <a:endParaRPr lang="en-US"/>
+            <a:endParaRPr lang="en-US" dirty="0"/>
           </a:p>
         </p:txBody>
       </p:sp>
@@ -5622,7 +5622,7 @@
             </a:lvl1pPr>
           </a:lstStyle>
           <a:p>
-            <a:endParaRPr lang="en-US"/>
+            <a:endParaRPr lang="en-US" dirty="0"/>
           </a:p>
         </p:txBody>
       </p:sp>
@@ -5663,7 +5663,7 @@
               <a:rPr lang="en-US" smtClean="0"/>
               <a:t>‹#›</a:t>
             </a:fld>
-            <a:endParaRPr lang="en-US"/>
+            <a:endParaRPr lang="en-US" dirty="0"/>
           </a:p>
         </p:txBody>
       </p:sp>
@@ -6190,18 +6190,9 @@
           <a:p>
             <a:pPr algn="l"/>
             <a:r>
-              <a:rPr lang="en-US" dirty="0" err="1" smtClean="0"/>
-              <a:t>Siddhanth</a:t>
-            </a:r>
-            <a:r>
               <a:rPr lang="en-US" dirty="0" smtClean="0"/>
-              <a:t> </a:t>
-            </a:r>
-            <a:r>
-              <a:rPr lang="en-US" dirty="0" err="1" smtClean="0"/>
-              <a:t>Sabharwal</a:t>
-            </a:r>
-            <a:endParaRPr lang="en-US" dirty="0" smtClean="0"/>
+              <a:t>Siddhanth Sabharwal</a:t>
+            </a:r>
           </a:p>
           <a:p>
             <a:pPr algn="l"/>
@@ -6315,7 +6306,7 @@
           <a:p>
             <a:r>
               <a:rPr lang="en-US" dirty="0" smtClean="0"/>
-              <a:t>Design Goals</a:t>
+              <a:t>Problem Statement</a:t>
             </a:r>
             <a:endParaRPr lang="en-US" dirty="0"/>
           </a:p>
@@ -6333,8 +6324,8 @@
         </p:nvSpPr>
         <p:spPr>
           <a:xfrm>
-            <a:off x="797169" y="1336431"/>
-            <a:ext cx="11207262" cy="5392614"/>
+            <a:off x="646111" y="1483575"/>
+            <a:ext cx="8946541" cy="4494531"/>
           </a:xfrm>
         </p:spPr>
         <p:txBody>
@@ -6344,89 +6335,57 @@
           <a:lstStyle/>
           <a:p>
             <a:r>
-              <a:rPr lang="en-US" dirty="0" smtClean="0"/>
-              <a:t>Must be able to search inventory for Books, </a:t>
-            </a:r>
-            <a:r>
-              <a:rPr lang="en-US" dirty="0" err="1" smtClean="0"/>
-              <a:t>ebooks</a:t>
-            </a:r>
-            <a:r>
-              <a:rPr lang="en-US" dirty="0" smtClean="0"/>
-              <a:t> and audio books.</a:t>
-            </a:r>
+              <a:rPr lang="en-US" sz="2800" dirty="0" smtClean="0"/>
+              <a:t>Objectives:</a:t>
+            </a:r>
+            <a:endParaRPr lang="en-US" sz="2800" dirty="0" smtClean="0"/>
           </a:p>
           <a:p>
             <a:pPr lvl="1"/>
             <a:r>
-              <a:rPr lang="en-US" sz="2000" dirty="0" smtClean="0"/>
-              <a:t>Search by ISBN and display current inventory.</a:t>
-            </a:r>
+              <a:rPr lang="en-US" sz="2400" dirty="0" smtClean="0"/>
+              <a:t>To develop </a:t>
+            </a:r>
+            <a:r>
+              <a:rPr lang="en-US" sz="2400" dirty="0" smtClean="0"/>
+              <a:t>a software program that can manage </a:t>
+            </a:r>
+            <a:r>
+              <a:rPr lang="en-US" sz="2400" dirty="0" smtClean="0"/>
+              <a:t>a bookstores inventory, employee databases and </a:t>
+            </a:r>
+            <a:r>
+              <a:rPr lang="en-US" sz="2400" dirty="0" smtClean="0"/>
+              <a:t>transactions.</a:t>
+            </a:r>
+          </a:p>
+          <a:p>
+            <a:pPr lvl="1"/>
+            <a:r>
+              <a:rPr lang="en-US" sz="2400" dirty="0" smtClean="0"/>
+              <a:t>To develop an inventory management system that is intuitive and easy to use for someone with no programming knowledge</a:t>
+            </a:r>
+          </a:p>
+          <a:p>
+            <a:pPr lvl="1"/>
+            <a:r>
+              <a:rPr lang="en-US" sz="2400" dirty="0" smtClean="0"/>
+              <a:t>To develop a searching procedure that is fast and efficient for the employees</a:t>
+            </a:r>
+            <a:endParaRPr lang="en-US" sz="2400" dirty="0"/>
           </a:p>
           <a:p>
             <a:pPr marL="457200" lvl="1" indent="0">
               <a:buNone/>
             </a:pPr>
-            <a:endParaRPr lang="en-US" sz="2000" dirty="0" smtClean="0"/>
-          </a:p>
-          <a:p>
-            <a:r>
-              <a:rPr lang="en-US" dirty="0" smtClean="0"/>
-              <a:t>Must be able to display and manipulate the inventory database</a:t>
-            </a:r>
-          </a:p>
-          <a:p>
-            <a:pPr lvl="1"/>
-            <a:r>
-              <a:rPr lang="en-US" sz="2000" dirty="0" smtClean="0"/>
-              <a:t>Add, remove and display inventory items.</a:t>
-            </a:r>
-          </a:p>
-          <a:p>
-            <a:pPr marL="457200" lvl="1" indent="0">
-              <a:buNone/>
-            </a:pPr>
-            <a:endParaRPr lang="en-US" sz="2000" dirty="0" smtClean="0"/>
-          </a:p>
-          <a:p>
-            <a:r>
-              <a:rPr lang="en-US" dirty="0" smtClean="0"/>
-              <a:t>Must be able to display and manipulate the Employee database.</a:t>
-            </a:r>
-          </a:p>
-          <a:p>
-            <a:pPr lvl="1"/>
-            <a:r>
-              <a:rPr lang="en-US" sz="2000" dirty="0" smtClean="0"/>
-              <a:t>Add, remove and display current employee.</a:t>
-            </a:r>
-          </a:p>
-          <a:p>
-            <a:pPr marL="457200" lvl="1" indent="0">
-              <a:buNone/>
-            </a:pPr>
-            <a:endParaRPr lang="en-US" sz="2000" dirty="0" smtClean="0"/>
-          </a:p>
-          <a:p>
-            <a:r>
-              <a:rPr lang="en-US" dirty="0" smtClean="0"/>
-              <a:t>Must be able to display and manipulate transaction database.</a:t>
-            </a:r>
-          </a:p>
-          <a:p>
-            <a:pPr lvl="1"/>
-            <a:r>
-              <a:rPr lang="en-US" sz="2000" dirty="0" smtClean="0"/>
-              <a:t>Place new orders, remove existing orders and display current orders</a:t>
-            </a:r>
-            <a:endParaRPr lang="en-US" sz="2000" dirty="0"/>
+            <a:endParaRPr lang="en-US" dirty="0"/>
           </a:p>
         </p:txBody>
       </p:sp>
     </p:spTree>
     <p:extLst>
       <p:ext uri="{BB962C8B-B14F-4D97-AF65-F5344CB8AC3E}">
-        <p14:creationId xmlns:p14="http://schemas.microsoft.com/office/powerpoint/2010/main" val="1750099303"/>
+        <p14:creationId xmlns:p14="http://schemas.microsoft.com/office/powerpoint/2010/main" val="3391240560"/>
       </p:ext>
     </p:extLst>
   </p:cSld>
@@ -6477,7 +6436,7 @@
           <a:p>
             <a:r>
               <a:rPr lang="en-US" dirty="0" smtClean="0"/>
-              <a:t>CLASS:</a:t>
+              <a:t>Design Goals</a:t>
             </a:r>
             <a:endParaRPr lang="en-US" dirty="0"/>
           </a:p>
@@ -6495,218 +6454,140 @@
         </p:nvSpPr>
         <p:spPr>
           <a:xfrm>
-            <a:off x="1103312" y="1374588"/>
-            <a:ext cx="8946541" cy="4873812"/>
+            <a:off x="797169" y="1336431"/>
+            <a:ext cx="11207262" cy="5392614"/>
           </a:xfrm>
         </p:spPr>
         <p:txBody>
           <a:bodyPr>
-            <a:normAutofit fontScale="92500" lnSpcReduction="10000"/>
+            <a:normAutofit/>
           </a:bodyPr>
           <a:lstStyle/>
           <a:p>
             <a:r>
               <a:rPr lang="en-US" dirty="0" smtClean="0"/>
-              <a:t>Separate slide for each Class </a:t>
-            </a:r>
-            <a:r>
-              <a:rPr lang="en-US" dirty="0" smtClean="0">
-                <a:sym typeface="Wingdings"/>
-              </a:rPr>
-              <a:t> this will make the presentation too long, how about:</a:t>
-            </a:r>
-          </a:p>
-          <a:p>
-            <a:r>
-              <a:rPr lang="en-US" dirty="0" smtClean="0">
-                <a:sym typeface="Wingdings"/>
-              </a:rPr>
-              <a:t>Item Hierarchy: </a:t>
+              <a:t>Must be able to search inventory for Books, </a:t>
+            </a:r>
+            <a:r>
+              <a:rPr lang="en-US" dirty="0" smtClean="0"/>
+              <a:t>eB</a:t>
+            </a:r>
+            <a:r>
+              <a:rPr lang="en-US" dirty="0" smtClean="0"/>
+              <a:t>ooks </a:t>
+            </a:r>
+            <a:r>
+              <a:rPr lang="en-US" dirty="0" smtClean="0"/>
+              <a:t>and </a:t>
+            </a:r>
+            <a:r>
+              <a:rPr lang="en-US" dirty="0" smtClean="0"/>
+              <a:t>Audio </a:t>
+            </a:r>
+            <a:r>
+              <a:rPr lang="en-US" dirty="0"/>
+              <a:t>B</a:t>
+            </a:r>
+            <a:r>
+              <a:rPr lang="en-US" dirty="0" smtClean="0"/>
+              <a:t>ooks</a:t>
+            </a:r>
+            <a:r>
+              <a:rPr lang="en-US" dirty="0" smtClean="0"/>
+              <a:t>.</a:t>
             </a:r>
           </a:p>
           <a:p>
             <a:pPr lvl="1"/>
             <a:r>
-              <a:rPr lang="en-US" dirty="0">
-                <a:sym typeface="Wingdings"/>
-              </a:rPr>
-              <a:t>A</a:t>
-            </a:r>
-            <a:r>
-              <a:rPr lang="en-US" dirty="0" smtClean="0">
-                <a:sym typeface="Wingdings"/>
-              </a:rPr>
-              <a:t>ll the items that can be ordered</a:t>
+              <a:rPr lang="en-US" sz="2000" dirty="0" smtClean="0"/>
+              <a:t>Search by </a:t>
+            </a:r>
+            <a:r>
+              <a:rPr lang="en-US" sz="2000" dirty="0" smtClean="0"/>
+              <a:t>ISBN and Product ID</a:t>
             </a:r>
           </a:p>
           <a:p>
             <a:pPr lvl="1"/>
             <a:r>
-              <a:rPr lang="en-US" dirty="0" smtClean="0">
-                <a:sym typeface="Wingdings"/>
-              </a:rPr>
-              <a:t>Item, </a:t>
-            </a:r>
-            <a:r>
-              <a:rPr lang="en-US" dirty="0" err="1" smtClean="0">
-                <a:sym typeface="Wingdings"/>
-              </a:rPr>
-              <a:t>InventoryItem</a:t>
-            </a:r>
-            <a:r>
-              <a:rPr lang="en-US" dirty="0" smtClean="0">
-                <a:sym typeface="Wingdings"/>
-              </a:rPr>
-              <a:t>, Product, Book, </a:t>
-            </a:r>
-            <a:r>
-              <a:rPr lang="en-US" dirty="0" err="1" smtClean="0">
-                <a:sym typeface="Wingdings"/>
-              </a:rPr>
-              <a:t>PaperBook</a:t>
-            </a:r>
-            <a:r>
-              <a:rPr lang="en-US" dirty="0" smtClean="0">
-                <a:sym typeface="Wingdings"/>
-              </a:rPr>
-              <a:t>/eBook/</a:t>
-            </a:r>
-            <a:r>
-              <a:rPr lang="en-US" dirty="0" err="1" smtClean="0">
-                <a:sym typeface="Wingdings"/>
-              </a:rPr>
-              <a:t>AudioBook</a:t>
-            </a:r>
-            <a:endParaRPr lang="en-US" dirty="0" smtClean="0">
-              <a:sym typeface="Wingdings"/>
-            </a:endParaRPr>
-          </a:p>
-          <a:p>
-            <a:r>
-              <a:rPr lang="en-US" dirty="0" smtClean="0">
-                <a:sym typeface="Wingdings"/>
-              </a:rPr>
-              <a:t>Person Hierarchy:</a:t>
+              <a:rPr lang="en-US" sz="2000" dirty="0" smtClean="0"/>
+              <a:t>Display </a:t>
+            </a:r>
+            <a:r>
+              <a:rPr lang="en-US" sz="2000" dirty="0" smtClean="0"/>
+              <a:t>c</a:t>
+            </a:r>
+            <a:r>
+              <a:rPr lang="en-US" sz="2000" dirty="0" smtClean="0"/>
+              <a:t>urrent inventory</a:t>
+            </a:r>
+            <a:endParaRPr lang="en-US" sz="2000" dirty="0" smtClean="0"/>
+          </a:p>
+          <a:p>
+            <a:pPr marL="457200" lvl="1" indent="0">
+              <a:buNone/>
+            </a:pPr>
+            <a:endParaRPr lang="en-US" sz="2000" dirty="0" smtClean="0"/>
+          </a:p>
+          <a:p>
+            <a:r>
+              <a:rPr lang="en-US" dirty="0" smtClean="0"/>
+              <a:t>Must be able to display and manipulate the inventory database</a:t>
             </a:r>
           </a:p>
           <a:p>
             <a:pPr lvl="1"/>
             <a:r>
-              <a:rPr lang="en-US" dirty="0" smtClean="0">
-                <a:sym typeface="Wingdings"/>
-              </a:rPr>
-              <a:t>Children are Employee and Customer. Employee is parent to Manager.</a:t>
-            </a:r>
-          </a:p>
-          <a:p>
-            <a:r>
-              <a:rPr lang="en-US" dirty="0" smtClean="0">
-                <a:sym typeface="Wingdings"/>
-              </a:rPr>
-              <a:t>Order Hierarchy:</a:t>
+              <a:rPr lang="en-US" sz="2000" dirty="0" smtClean="0"/>
+              <a:t>Add, remove and display inventory items.</a:t>
+            </a:r>
+          </a:p>
+          <a:p>
+            <a:pPr marL="457200" lvl="1" indent="0">
+              <a:buNone/>
+            </a:pPr>
+            <a:endParaRPr lang="en-US" sz="2000" dirty="0" smtClean="0"/>
+          </a:p>
+          <a:p>
+            <a:r>
+              <a:rPr lang="en-US" dirty="0" smtClean="0"/>
+              <a:t>Must be able to display and manipulate the Employee database.</a:t>
             </a:r>
           </a:p>
           <a:p>
             <a:pPr lvl="1"/>
             <a:r>
-              <a:rPr lang="en-US" dirty="0" smtClean="0">
-                <a:sym typeface="Wingdings"/>
-              </a:rPr>
-              <a:t>Currently only one child: </a:t>
-            </a:r>
-            <a:r>
-              <a:rPr lang="en-US" dirty="0" err="1" smtClean="0">
-                <a:sym typeface="Wingdings"/>
-              </a:rPr>
-              <a:t>StoreOrder</a:t>
-            </a:r>
-            <a:r>
-              <a:rPr lang="en-US" dirty="0" smtClean="0">
-                <a:sym typeface="Wingdings"/>
-              </a:rPr>
-              <a:t>. Time did not permit </a:t>
-            </a:r>
-            <a:r>
-              <a:rPr lang="en-US" dirty="0" err="1" smtClean="0">
-                <a:sym typeface="Wingdings"/>
-              </a:rPr>
-              <a:t>CustomerOrder</a:t>
-            </a:r>
-            <a:r>
-              <a:rPr lang="en-US" dirty="0" smtClean="0">
-                <a:sym typeface="Wingdings"/>
-              </a:rPr>
-              <a:t>.</a:t>
-            </a:r>
-          </a:p>
-          <a:p>
-            <a:r>
-              <a:rPr lang="en-US" dirty="0" smtClean="0">
-                <a:sym typeface="Wingdings"/>
-              </a:rPr>
-              <a:t>List Hierarchy:</a:t>
+              <a:rPr lang="en-US" sz="2000" dirty="0" smtClean="0"/>
+              <a:t>Add, remove and display current employee.</a:t>
+            </a:r>
+          </a:p>
+          <a:p>
+            <a:pPr marL="457200" lvl="1" indent="0">
+              <a:buNone/>
+            </a:pPr>
+            <a:endParaRPr lang="en-US" sz="2000" dirty="0" smtClean="0"/>
+          </a:p>
+          <a:p>
+            <a:r>
+              <a:rPr lang="en-US" dirty="0" smtClean="0"/>
+              <a:t>Must be able to display and manipulate transaction database.</a:t>
             </a:r>
           </a:p>
           <a:p>
             <a:pPr lvl="1"/>
             <a:r>
-              <a:rPr lang="en-US" dirty="0" err="1" smtClean="0">
-                <a:sym typeface="Wingdings"/>
-              </a:rPr>
-              <a:t>InventoryList</a:t>
-            </a:r>
-            <a:r>
-              <a:rPr lang="en-US" dirty="0" smtClean="0">
-                <a:sym typeface="Wingdings"/>
-              </a:rPr>
-              <a:t> of all items, </a:t>
-            </a:r>
-            <a:r>
-              <a:rPr lang="en-US" dirty="0" err="1" smtClean="0">
-                <a:sym typeface="Wingdings"/>
-              </a:rPr>
-              <a:t>EmployeeList</a:t>
-            </a:r>
-            <a:r>
-              <a:rPr lang="en-US" dirty="0" smtClean="0">
-                <a:sym typeface="Wingdings"/>
-              </a:rPr>
-              <a:t> of all employees, </a:t>
-            </a:r>
-            <a:r>
-              <a:rPr lang="en-US" dirty="0" err="1" smtClean="0">
-                <a:sym typeface="Wingdings"/>
-              </a:rPr>
-              <a:t>OrderList</a:t>
-            </a:r>
-            <a:r>
-              <a:rPr lang="en-US" dirty="0" smtClean="0">
-                <a:sym typeface="Wingdings"/>
-              </a:rPr>
-              <a:t> of all orders.</a:t>
-            </a:r>
-          </a:p>
-          <a:p>
-            <a:r>
-              <a:rPr lang="en-US" dirty="0" err="1" smtClean="0">
-                <a:sym typeface="Wingdings"/>
-              </a:rPr>
-              <a:t>BookStoreSystem</a:t>
-            </a:r>
-            <a:r>
-              <a:rPr lang="en-US" dirty="0" smtClean="0">
-                <a:sym typeface="Wingdings"/>
-              </a:rPr>
-              <a:t>: Reads data from the three database files and shows menu to add/remove/view item/employee/order</a:t>
-            </a:r>
-            <a:endParaRPr lang="en-US" dirty="0"/>
+              <a:rPr lang="en-US" sz="2000" dirty="0" smtClean="0"/>
+              <a:t>Place new orders, remove existing orders and display current orders</a:t>
+            </a:r>
+            <a:endParaRPr lang="en-US" sz="2000" dirty="0"/>
           </a:p>
         </p:txBody>
       </p:sp>
     </p:spTree>
     <p:extLst>
       <p:ext uri="{BB962C8B-B14F-4D97-AF65-F5344CB8AC3E}">
-        <p14:creationId xmlns:p14="http://schemas.microsoft.com/office/powerpoint/2010/main" val="2196039472"/>
+        <p14:creationId xmlns:p14="http://schemas.microsoft.com/office/powerpoint/2010/main" val="1750099303"/>
       </p:ext>
     </p:extLst>
   </p:cSld>
@@ -6757,7 +6638,7 @@
           <a:p>
             <a:r>
               <a:rPr lang="en-US" dirty="0" smtClean="0"/>
-              <a:t>MAIN PROGRAM:</a:t>
+              <a:t>CLASS:</a:t>
             </a:r>
             <a:endParaRPr lang="en-US" dirty="0"/>
           </a:p>
@@ -6775,55 +6656,122 @@
         </p:nvSpPr>
         <p:spPr>
           <a:xfrm>
-            <a:off x="1103312" y="2052918"/>
-            <a:ext cx="8946541" cy="4615440"/>
-          </a:xfrm>
-        </p:spPr>
-        <p:txBody>
-          <a:bodyPr/>
-          <a:lstStyle/>
-          <a:p>
-            <a:r>
-              <a:rPr lang="en-US" dirty="0" smtClean="0"/>
-              <a:t>The program begins by reading in a list of databases required.</a:t>
-            </a:r>
-          </a:p>
-          <a:p>
-            <a:r>
-              <a:rPr lang="en-US" dirty="0" smtClean="0"/>
-              <a:t>The user then logs in with their Employee ID</a:t>
-            </a:r>
-          </a:p>
-          <a:p>
-            <a:r>
-              <a:rPr lang="en-US" dirty="0" smtClean="0"/>
-              <a:t>The employee is then presented with a menu list of options to choose from</a:t>
-            </a:r>
-          </a:p>
-          <a:p>
-            <a:r>
-              <a:rPr lang="en-US" dirty="0" smtClean="0"/>
-              <a:t>The first three options prints out the store’s databases and important details</a:t>
-            </a:r>
-          </a:p>
-          <a:p>
-            <a:r>
-              <a:rPr lang="en-US" dirty="0" smtClean="0"/>
-              <a:t>Options 3-6 allows the user to interact with the databases to edit employees (Add a new employee, edit an existing, or remove an employee), edit store </a:t>
-            </a:r>
-            <a:r>
-              <a:rPr lang="en-US" dirty="0"/>
-              <a:t>transactions </a:t>
-            </a:r>
-            <a:r>
-              <a:rPr lang="en-US" dirty="0" smtClean="0"/>
-              <a:t>(Reorder, Order new, remove an order, or view an order), and edit the inventory (Add new, remove, and view)</a:t>
-            </a:r>
-          </a:p>
-          <a:p>
-            <a:r>
-              <a:rPr lang="en-US" dirty="0" smtClean="0"/>
-              <a:t>Finally, the user can search a book by ISBN to help out customers</a:t>
+            <a:off x="1103312" y="1374588"/>
+            <a:ext cx="8946541" cy="4873812"/>
+          </a:xfrm>
+        </p:spPr>
+        <p:txBody>
+          <a:bodyPr>
+            <a:normAutofit lnSpcReduction="10000"/>
+          </a:bodyPr>
+          <a:lstStyle/>
+          <a:p>
+            <a:r>
+              <a:rPr lang="en-US" dirty="0" smtClean="0">
+                <a:sym typeface="Wingdings"/>
+              </a:rPr>
+              <a:t>Item </a:t>
+            </a:r>
+            <a:r>
+              <a:rPr lang="en-US" dirty="0" smtClean="0">
+                <a:sym typeface="Wingdings"/>
+              </a:rPr>
+              <a:t>Hierarchy: </a:t>
+            </a:r>
+          </a:p>
+          <a:p>
+            <a:pPr lvl="1"/>
+            <a:r>
+              <a:rPr lang="en-US" dirty="0">
+                <a:sym typeface="Wingdings"/>
+              </a:rPr>
+              <a:t>A</a:t>
+            </a:r>
+            <a:r>
+              <a:rPr lang="en-US" dirty="0" smtClean="0">
+                <a:sym typeface="Wingdings"/>
+              </a:rPr>
+              <a:t>ll the items that can be ordered</a:t>
+            </a:r>
+          </a:p>
+          <a:p>
+            <a:pPr lvl="1"/>
+            <a:r>
+              <a:rPr lang="en-US" dirty="0" smtClean="0">
+                <a:sym typeface="Wingdings"/>
+              </a:rPr>
+              <a:t>Item, InventoryItem, Product, Book, </a:t>
+            </a:r>
+            <a:r>
+              <a:rPr lang="en-US" dirty="0" smtClean="0">
+                <a:sym typeface="Wingdings"/>
+              </a:rPr>
+              <a:t>PaperBook</a:t>
+            </a:r>
+            <a:r>
+              <a:rPr lang="en-US" dirty="0" smtClean="0">
+                <a:sym typeface="Wingdings"/>
+              </a:rPr>
+              <a:t>/eBook/AudioBook</a:t>
+            </a:r>
+          </a:p>
+          <a:p>
+            <a:r>
+              <a:rPr lang="en-US" dirty="0" smtClean="0">
+                <a:sym typeface="Wingdings"/>
+              </a:rPr>
+              <a:t>Person Hierarchy:</a:t>
+            </a:r>
+          </a:p>
+          <a:p>
+            <a:pPr lvl="1"/>
+            <a:r>
+              <a:rPr lang="en-US" dirty="0" smtClean="0">
+                <a:sym typeface="Wingdings"/>
+              </a:rPr>
+              <a:t>Children are Employee and Customer. Employee is parent to Manager.</a:t>
+            </a:r>
+          </a:p>
+          <a:p>
+            <a:r>
+              <a:rPr lang="en-US" dirty="0" smtClean="0">
+                <a:sym typeface="Wingdings"/>
+              </a:rPr>
+              <a:t>Order Hierarchy:</a:t>
+            </a:r>
+          </a:p>
+          <a:p>
+            <a:pPr lvl="1"/>
+            <a:r>
+              <a:rPr lang="en-US" dirty="0" smtClean="0">
+                <a:sym typeface="Wingdings"/>
+              </a:rPr>
+              <a:t>Currently only one child: StoreOrder. Time did not permit CustomerOrder.</a:t>
+            </a:r>
+          </a:p>
+          <a:p>
+            <a:r>
+              <a:rPr lang="en-US" dirty="0" smtClean="0">
+                <a:sym typeface="Wingdings"/>
+              </a:rPr>
+              <a:t>List Hierarchy:</a:t>
+            </a:r>
+          </a:p>
+          <a:p>
+            <a:pPr lvl="1"/>
+            <a:r>
+              <a:rPr lang="en-US" dirty="0" smtClean="0">
+                <a:sym typeface="Wingdings"/>
+              </a:rPr>
+              <a:t>InventoryList of all items, EmployeeList of all employees, OrderList of all orders.</a:t>
+            </a:r>
+          </a:p>
+          <a:p>
+            <a:r>
+              <a:rPr lang="en-US" dirty="0" smtClean="0">
+                <a:sym typeface="Wingdings"/>
+              </a:rPr>
+              <a:t>BookStoreSystem: Reads data from the three database files and shows menu to add/remove/view item/employee/order</a:t>
             </a:r>
             <a:endParaRPr lang="en-US" dirty="0"/>
           </a:p>
@@ -6832,7 +6780,7 @@
     </p:spTree>
     <p:extLst>
       <p:ext uri="{BB962C8B-B14F-4D97-AF65-F5344CB8AC3E}">
-        <p14:creationId xmlns:p14="http://schemas.microsoft.com/office/powerpoint/2010/main" val="3414519377"/>
+        <p14:creationId xmlns:p14="http://schemas.microsoft.com/office/powerpoint/2010/main" val="2196039472"/>
       </p:ext>
     </p:extLst>
   </p:cSld>
@@ -6883,1367 +6831,81 @@
           <a:p>
             <a:r>
               <a:rPr lang="en-US" dirty="0" smtClean="0"/>
-              <a:t>HOW CLASSES INTERACT</a:t>
-            </a:r>
-            <a:endParaRPr lang="en-US" dirty="0"/>
-          </a:p>
-        </p:txBody>
-      </p:sp>
-      <p:sp>
-        <p:nvSpPr>
-          <p:cNvPr id="4" name="Rectangle 3"/>
-          <p:cNvSpPr/>
-          <p:nvPr/>
+              <a:t>MAIN PROGRAM:</a:t>
+            </a:r>
+            <a:endParaRPr lang="en-US" dirty="0"/>
+          </a:p>
+        </p:txBody>
+      </p:sp>
+      <p:sp>
+        <p:nvSpPr>
+          <p:cNvPr id="3" name="Content Placeholder 2"/>
+          <p:cNvSpPr>
+            <a:spLocks noGrp="1"/>
+          </p:cNvSpPr>
+          <p:nvPr>
+            <p:ph idx="1"/>
+          </p:nvPr>
         </p:nvSpPr>
         <p:spPr>
           <a:xfrm>
-            <a:off x="4915647" y="2510117"/>
-            <a:ext cx="1778000" cy="552825"/>
-          </a:xfrm>
-          <a:prstGeom prst="rect">
-            <a:avLst/>
-          </a:prstGeom>
-          <a:noFill/>
-          <a:ln>
-            <a:solidFill>
-              <a:schemeClr val="tx1"/>
-            </a:solidFill>
-          </a:ln>
-        </p:spPr>
-        <p:style>
-          <a:lnRef idx="1">
-            <a:schemeClr val="accent1"/>
-          </a:lnRef>
-          <a:fillRef idx="3">
-            <a:schemeClr val="accent1"/>
-          </a:fillRef>
-          <a:effectRef idx="2">
-            <a:schemeClr val="accent1"/>
-          </a:effectRef>
-          <a:fontRef idx="minor">
-            <a:schemeClr val="lt1"/>
-          </a:fontRef>
-        </p:style>
-        <p:txBody>
-          <a:bodyPr rtlCol="0" anchor="ctr"/>
-          <a:lstStyle/>
-          <a:p>
-            <a:pPr algn="ctr"/>
+            <a:off x="646111" y="1354178"/>
+            <a:ext cx="8946541" cy="4615440"/>
+          </a:xfrm>
+        </p:spPr>
+        <p:txBody>
+          <a:bodyPr/>
+          <a:lstStyle/>
+          <a:p>
             <a:r>
               <a:rPr lang="en-US" dirty="0" smtClean="0"/>
-              <a:t>Item</a:t>
-            </a:r>
-            <a:endParaRPr lang="en-US" dirty="0"/>
-          </a:p>
-        </p:txBody>
-      </p:sp>
-      <p:sp>
-        <p:nvSpPr>
-          <p:cNvPr id="5" name="Rectangle 4"/>
-          <p:cNvSpPr/>
-          <p:nvPr/>
-        </p:nvSpPr>
-        <p:spPr>
-          <a:xfrm>
-            <a:off x="4918635" y="3376706"/>
-            <a:ext cx="1775011" cy="510990"/>
-          </a:xfrm>
-          <a:prstGeom prst="rect">
-            <a:avLst/>
-          </a:prstGeom>
-          <a:noFill/>
-          <a:ln>
-            <a:solidFill>
-              <a:schemeClr val="tx1"/>
-            </a:solidFill>
-          </a:ln>
-        </p:spPr>
-        <p:style>
-          <a:lnRef idx="1">
-            <a:schemeClr val="accent1"/>
-          </a:lnRef>
-          <a:fillRef idx="3">
-            <a:schemeClr val="accent1"/>
-          </a:fillRef>
-          <a:effectRef idx="2">
-            <a:schemeClr val="accent1"/>
-          </a:effectRef>
-          <a:fontRef idx="minor">
-            <a:schemeClr val="lt1"/>
-          </a:fontRef>
-        </p:style>
-        <p:txBody>
-          <a:bodyPr rtlCol="0" anchor="ctr"/>
-          <a:lstStyle/>
-          <a:p>
-            <a:pPr algn="ctr"/>
-            <a:r>
-              <a:rPr lang="en-US" dirty="0" err="1" smtClean="0"/>
-              <a:t>InventoryItem</a:t>
-            </a:r>
-            <a:endParaRPr lang="en-US" dirty="0"/>
-          </a:p>
-        </p:txBody>
-      </p:sp>
-      <p:sp>
-        <p:nvSpPr>
-          <p:cNvPr id="6" name="Rectangle 5"/>
-          <p:cNvSpPr/>
-          <p:nvPr/>
-        </p:nvSpPr>
-        <p:spPr>
-          <a:xfrm>
-            <a:off x="4918635" y="4228353"/>
-            <a:ext cx="1775011" cy="510990"/>
-          </a:xfrm>
-          <a:prstGeom prst="rect">
-            <a:avLst/>
-          </a:prstGeom>
-          <a:noFill/>
-          <a:ln>
-            <a:solidFill>
-              <a:schemeClr val="tx1"/>
-            </a:solidFill>
-          </a:ln>
-        </p:spPr>
-        <p:style>
-          <a:lnRef idx="1">
-            <a:schemeClr val="accent1"/>
-          </a:lnRef>
-          <a:fillRef idx="3">
-            <a:schemeClr val="accent1"/>
-          </a:fillRef>
-          <a:effectRef idx="2">
-            <a:schemeClr val="accent1"/>
-          </a:effectRef>
-          <a:fontRef idx="minor">
-            <a:schemeClr val="lt1"/>
-          </a:fontRef>
-        </p:style>
-        <p:txBody>
-          <a:bodyPr rtlCol="0" anchor="ctr"/>
-          <a:lstStyle/>
-          <a:p>
-            <a:pPr algn="ctr"/>
+              <a:t>The program begins by reading in a list of databases required.</a:t>
+            </a:r>
+          </a:p>
+          <a:p>
             <a:r>
               <a:rPr lang="en-US" dirty="0" smtClean="0"/>
-              <a:t>Product</a:t>
-            </a:r>
-            <a:endParaRPr lang="en-US" dirty="0"/>
-          </a:p>
-        </p:txBody>
-      </p:sp>
-      <p:sp>
-        <p:nvSpPr>
-          <p:cNvPr id="7" name="Rectangle 6"/>
-          <p:cNvSpPr/>
-          <p:nvPr/>
-        </p:nvSpPr>
-        <p:spPr>
-          <a:xfrm>
-            <a:off x="4933577" y="5124823"/>
-            <a:ext cx="1760070" cy="496049"/>
-          </a:xfrm>
-          <a:prstGeom prst="rect">
-            <a:avLst/>
-          </a:prstGeom>
-          <a:noFill/>
-          <a:ln>
-            <a:solidFill>
-              <a:schemeClr val="tx1"/>
-            </a:solidFill>
-          </a:ln>
-        </p:spPr>
-        <p:style>
-          <a:lnRef idx="1">
-            <a:schemeClr val="accent1"/>
-          </a:lnRef>
-          <a:fillRef idx="3">
-            <a:schemeClr val="accent1"/>
-          </a:fillRef>
-          <a:effectRef idx="2">
-            <a:schemeClr val="accent1"/>
-          </a:effectRef>
-          <a:fontRef idx="minor">
-            <a:schemeClr val="lt1"/>
-          </a:fontRef>
-        </p:style>
-        <p:txBody>
-          <a:bodyPr rtlCol="0" anchor="ctr"/>
-          <a:lstStyle/>
-          <a:p>
-            <a:pPr algn="ctr"/>
+              <a:t>The user then logs in with their Employee ID</a:t>
+            </a:r>
+          </a:p>
+          <a:p>
             <a:r>
               <a:rPr lang="en-US" dirty="0" smtClean="0"/>
-              <a:t>Book</a:t>
-            </a:r>
-            <a:endParaRPr lang="en-US" dirty="0"/>
-          </a:p>
-        </p:txBody>
-      </p:sp>
-      <p:sp>
-        <p:nvSpPr>
-          <p:cNvPr id="9" name="Rectangle 8"/>
-          <p:cNvSpPr/>
-          <p:nvPr/>
-        </p:nvSpPr>
-        <p:spPr>
-          <a:xfrm>
-            <a:off x="3316941" y="5982450"/>
-            <a:ext cx="1485152" cy="597646"/>
-          </a:xfrm>
-          <a:prstGeom prst="rect">
-            <a:avLst/>
-          </a:prstGeom>
-          <a:noFill/>
-          <a:ln>
-            <a:solidFill>
-              <a:schemeClr val="tx1"/>
-            </a:solidFill>
-          </a:ln>
-        </p:spPr>
-        <p:style>
-          <a:lnRef idx="1">
-            <a:schemeClr val="accent1"/>
-          </a:lnRef>
-          <a:fillRef idx="3">
-            <a:schemeClr val="accent1"/>
-          </a:fillRef>
-          <a:effectRef idx="2">
-            <a:schemeClr val="accent1"/>
-          </a:effectRef>
-          <a:fontRef idx="minor">
-            <a:schemeClr val="lt1"/>
-          </a:fontRef>
-        </p:style>
-        <p:txBody>
-          <a:bodyPr rtlCol="0" anchor="ctr"/>
-          <a:lstStyle/>
-          <a:p>
-            <a:pPr algn="ctr"/>
+              <a:t>The employee is then presented with a menu list of options to choose from</a:t>
+            </a:r>
+          </a:p>
+          <a:p>
             <a:r>
               <a:rPr lang="en-US" dirty="0" smtClean="0"/>
-              <a:t>eBook</a:t>
-            </a:r>
-            <a:endParaRPr lang="en-US" dirty="0"/>
-          </a:p>
-        </p:txBody>
-      </p:sp>
-      <p:sp>
-        <p:nvSpPr>
-          <p:cNvPr id="10" name="Rectangle 9"/>
-          <p:cNvSpPr/>
-          <p:nvPr/>
-        </p:nvSpPr>
-        <p:spPr>
-          <a:xfrm>
-            <a:off x="4993340" y="5970497"/>
-            <a:ext cx="1610659" cy="597646"/>
-          </a:xfrm>
-          <a:prstGeom prst="rect">
-            <a:avLst/>
-          </a:prstGeom>
-          <a:noFill/>
-          <a:ln>
-            <a:solidFill>
-              <a:schemeClr val="tx1"/>
-            </a:solidFill>
-          </a:ln>
-        </p:spPr>
-        <p:style>
-          <a:lnRef idx="1">
-            <a:schemeClr val="accent1"/>
-          </a:lnRef>
-          <a:fillRef idx="3">
-            <a:schemeClr val="accent1"/>
-          </a:fillRef>
-          <a:effectRef idx="2">
-            <a:schemeClr val="accent1"/>
-          </a:effectRef>
-          <a:fontRef idx="minor">
-            <a:schemeClr val="lt1"/>
-          </a:fontRef>
-        </p:style>
-        <p:txBody>
-          <a:bodyPr rtlCol="0" anchor="ctr"/>
-          <a:lstStyle/>
-          <a:p>
-            <a:pPr algn="ctr"/>
-            <a:r>
-              <a:rPr lang="en-US" dirty="0" err="1" smtClean="0"/>
-              <a:t>PaperBook</a:t>
-            </a:r>
-            <a:endParaRPr lang="en-US" dirty="0"/>
-          </a:p>
-        </p:txBody>
-      </p:sp>
-      <p:sp>
-        <p:nvSpPr>
-          <p:cNvPr id="11" name="Rectangle 10"/>
-          <p:cNvSpPr/>
-          <p:nvPr/>
-        </p:nvSpPr>
-        <p:spPr>
-          <a:xfrm>
-            <a:off x="6819152" y="5973485"/>
-            <a:ext cx="1485152" cy="597646"/>
-          </a:xfrm>
-          <a:prstGeom prst="rect">
-            <a:avLst/>
-          </a:prstGeom>
-          <a:noFill/>
-          <a:ln>
-            <a:solidFill>
-              <a:schemeClr val="tx1"/>
-            </a:solidFill>
-          </a:ln>
-        </p:spPr>
-        <p:style>
-          <a:lnRef idx="1">
-            <a:schemeClr val="accent1"/>
-          </a:lnRef>
-          <a:fillRef idx="3">
-            <a:schemeClr val="accent1"/>
-          </a:fillRef>
-          <a:effectRef idx="2">
-            <a:schemeClr val="accent1"/>
-          </a:effectRef>
-          <a:fontRef idx="minor">
-            <a:schemeClr val="lt1"/>
-          </a:fontRef>
-        </p:style>
-        <p:txBody>
-          <a:bodyPr rtlCol="0" anchor="ctr"/>
-          <a:lstStyle/>
-          <a:p>
-            <a:pPr algn="ctr"/>
-            <a:r>
-              <a:rPr lang="en-US" dirty="0" err="1" smtClean="0"/>
-              <a:t>AudioBook</a:t>
-            </a:r>
-            <a:endParaRPr lang="en-US" dirty="0"/>
-          </a:p>
-        </p:txBody>
-      </p:sp>
-      <p:cxnSp>
-        <p:nvCxnSpPr>
-          <p:cNvPr id="13" name="Straight Arrow Connector 12"/>
-          <p:cNvCxnSpPr>
-            <a:stCxn id="5" idx="0"/>
-            <a:endCxn id="4" idx="2"/>
-          </p:cNvCxnSpPr>
-          <p:nvPr/>
-        </p:nvCxnSpPr>
-        <p:spPr>
-          <a:xfrm flipH="1" flipV="1">
-            <a:off x="5804647" y="3062942"/>
-            <a:ext cx="1494" cy="313764"/>
-          </a:xfrm>
-          <a:prstGeom prst="straightConnector1">
-            <a:avLst/>
-          </a:prstGeom>
-          <a:ln>
-            <a:solidFill>
-              <a:srgbClr val="FFFFFF"/>
-            </a:solidFill>
-            <a:tailEnd type="arrow"/>
-          </a:ln>
-        </p:spPr>
-        <p:style>
-          <a:lnRef idx="2">
-            <a:schemeClr val="accent1"/>
-          </a:lnRef>
-          <a:fillRef idx="0">
-            <a:schemeClr val="accent1"/>
-          </a:fillRef>
-          <a:effectRef idx="1">
-            <a:schemeClr val="accent1"/>
-          </a:effectRef>
-          <a:fontRef idx="minor">
-            <a:schemeClr val="tx1"/>
-          </a:fontRef>
-        </p:style>
-      </p:cxnSp>
-      <p:cxnSp>
-        <p:nvCxnSpPr>
-          <p:cNvPr id="14" name="Straight Arrow Connector 13"/>
-          <p:cNvCxnSpPr>
-            <a:stCxn id="10" idx="0"/>
-          </p:cNvCxnSpPr>
-          <p:nvPr/>
-        </p:nvCxnSpPr>
-        <p:spPr>
-          <a:xfrm flipH="1" flipV="1">
-            <a:off x="5792694" y="5605933"/>
-            <a:ext cx="5976" cy="364564"/>
-          </a:xfrm>
-          <a:prstGeom prst="straightConnector1">
-            <a:avLst/>
-          </a:prstGeom>
-          <a:ln>
-            <a:solidFill>
-              <a:srgbClr val="FFFFFF"/>
-            </a:solidFill>
-            <a:tailEnd type="arrow"/>
-          </a:ln>
-        </p:spPr>
-        <p:style>
-          <a:lnRef idx="2">
-            <a:schemeClr val="accent1"/>
-          </a:lnRef>
-          <a:fillRef idx="0">
-            <a:schemeClr val="accent1"/>
-          </a:fillRef>
-          <a:effectRef idx="1">
-            <a:schemeClr val="accent1"/>
-          </a:effectRef>
-          <a:fontRef idx="minor">
-            <a:schemeClr val="tx1"/>
-          </a:fontRef>
-        </p:style>
-      </p:cxnSp>
-      <p:cxnSp>
-        <p:nvCxnSpPr>
-          <p:cNvPr id="15" name="Straight Arrow Connector 14"/>
-          <p:cNvCxnSpPr>
-            <a:endCxn id="6" idx="2"/>
-          </p:cNvCxnSpPr>
-          <p:nvPr/>
-        </p:nvCxnSpPr>
-        <p:spPr>
-          <a:xfrm flipH="1" flipV="1">
-            <a:off x="5806141" y="4739343"/>
-            <a:ext cx="5976" cy="274920"/>
-          </a:xfrm>
-          <a:prstGeom prst="straightConnector1">
-            <a:avLst/>
-          </a:prstGeom>
-          <a:ln>
-            <a:solidFill>
-              <a:srgbClr val="FFFFFF"/>
-            </a:solidFill>
-            <a:tailEnd type="arrow"/>
-          </a:ln>
-        </p:spPr>
-        <p:style>
-          <a:lnRef idx="2">
-            <a:schemeClr val="accent1"/>
-          </a:lnRef>
-          <a:fillRef idx="0">
-            <a:schemeClr val="accent1"/>
-          </a:fillRef>
-          <a:effectRef idx="1">
-            <a:schemeClr val="accent1"/>
-          </a:effectRef>
-          <a:fontRef idx="minor">
-            <a:schemeClr val="tx1"/>
-          </a:fontRef>
-        </p:style>
-      </p:cxnSp>
-      <p:cxnSp>
-        <p:nvCxnSpPr>
-          <p:cNvPr id="16" name="Straight Arrow Connector 15"/>
-          <p:cNvCxnSpPr/>
-          <p:nvPr/>
-        </p:nvCxnSpPr>
-        <p:spPr>
-          <a:xfrm flipH="1" flipV="1">
-            <a:off x="5798671" y="3908613"/>
-            <a:ext cx="1494" cy="227107"/>
-          </a:xfrm>
-          <a:prstGeom prst="straightConnector1">
-            <a:avLst/>
-          </a:prstGeom>
-          <a:ln>
-            <a:solidFill>
-              <a:srgbClr val="FFFFFF"/>
-            </a:solidFill>
-            <a:tailEnd type="arrow"/>
-          </a:ln>
-        </p:spPr>
-        <p:style>
-          <a:lnRef idx="2">
-            <a:schemeClr val="accent1"/>
-          </a:lnRef>
-          <a:fillRef idx="0">
-            <a:schemeClr val="accent1"/>
-          </a:fillRef>
-          <a:effectRef idx="1">
-            <a:schemeClr val="accent1"/>
-          </a:effectRef>
-          <a:fontRef idx="minor">
-            <a:schemeClr val="tx1"/>
-          </a:fontRef>
-        </p:style>
-      </p:cxnSp>
-      <p:cxnSp>
-        <p:nvCxnSpPr>
-          <p:cNvPr id="22" name="Straight Arrow Connector 21"/>
-          <p:cNvCxnSpPr>
-            <a:stCxn id="9" idx="0"/>
-            <a:endCxn id="7" idx="2"/>
-          </p:cNvCxnSpPr>
-          <p:nvPr/>
-        </p:nvCxnSpPr>
-        <p:spPr>
-          <a:xfrm flipV="1">
-            <a:off x="4059517" y="5620872"/>
-            <a:ext cx="1754095" cy="361578"/>
-          </a:xfrm>
-          <a:prstGeom prst="straightConnector1">
-            <a:avLst/>
-          </a:prstGeom>
-          <a:ln>
-            <a:solidFill>
-              <a:srgbClr val="FFFFFF"/>
-            </a:solidFill>
-            <a:tailEnd type="arrow"/>
-          </a:ln>
-        </p:spPr>
-        <p:style>
-          <a:lnRef idx="2">
-            <a:schemeClr val="accent1"/>
-          </a:lnRef>
-          <a:fillRef idx="0">
-            <a:schemeClr val="accent1"/>
-          </a:fillRef>
-          <a:effectRef idx="1">
-            <a:schemeClr val="accent1"/>
-          </a:effectRef>
-          <a:fontRef idx="minor">
-            <a:schemeClr val="tx1"/>
-          </a:fontRef>
-        </p:style>
-      </p:cxnSp>
-      <p:cxnSp>
-        <p:nvCxnSpPr>
-          <p:cNvPr id="25" name="Straight Arrow Connector 24"/>
-          <p:cNvCxnSpPr>
-            <a:stCxn id="11" idx="0"/>
-            <a:endCxn id="7" idx="2"/>
-          </p:cNvCxnSpPr>
-          <p:nvPr/>
-        </p:nvCxnSpPr>
-        <p:spPr>
-          <a:xfrm flipH="1" flipV="1">
-            <a:off x="5813612" y="5620872"/>
-            <a:ext cx="1748116" cy="352613"/>
-          </a:xfrm>
-          <a:prstGeom prst="straightConnector1">
-            <a:avLst/>
-          </a:prstGeom>
-          <a:ln>
-            <a:solidFill>
-              <a:srgbClr val="FFFFFF"/>
-            </a:solidFill>
-            <a:tailEnd type="arrow"/>
-          </a:ln>
-        </p:spPr>
-        <p:style>
-          <a:lnRef idx="2">
-            <a:schemeClr val="accent1"/>
-          </a:lnRef>
-          <a:fillRef idx="0">
-            <a:schemeClr val="accent1"/>
-          </a:fillRef>
-          <a:effectRef idx="1">
-            <a:schemeClr val="accent1"/>
-          </a:effectRef>
-          <a:fontRef idx="minor">
-            <a:schemeClr val="tx1"/>
-          </a:fontRef>
-        </p:style>
-      </p:cxnSp>
-      <p:sp>
-        <p:nvSpPr>
-          <p:cNvPr id="28" name="Rectangle 27"/>
-          <p:cNvSpPr/>
-          <p:nvPr/>
-        </p:nvSpPr>
-        <p:spPr>
-          <a:xfrm>
-            <a:off x="1386540" y="3421529"/>
-            <a:ext cx="1778000" cy="597646"/>
-          </a:xfrm>
-          <a:prstGeom prst="rect">
-            <a:avLst/>
-          </a:prstGeom>
-          <a:noFill/>
-          <a:ln>
-            <a:solidFill>
-              <a:schemeClr val="tx1"/>
-            </a:solidFill>
-          </a:ln>
-        </p:spPr>
-        <p:style>
-          <a:lnRef idx="1">
-            <a:schemeClr val="accent1"/>
-          </a:lnRef>
-          <a:fillRef idx="3">
-            <a:schemeClr val="accent1"/>
-          </a:fillRef>
-          <a:effectRef idx="2">
-            <a:schemeClr val="accent1"/>
-          </a:effectRef>
-          <a:fontRef idx="minor">
-            <a:schemeClr val="lt1"/>
-          </a:fontRef>
-        </p:style>
-        <p:txBody>
-          <a:bodyPr rtlCol="0" anchor="ctr"/>
-          <a:lstStyle/>
-          <a:p>
-            <a:pPr algn="ctr"/>
+              <a:t>The first three options prints out the store’s databases and important details</a:t>
+            </a:r>
+          </a:p>
+          <a:p>
             <a:r>
               <a:rPr lang="en-US" dirty="0" smtClean="0"/>
-              <a:t>Person</a:t>
-            </a:r>
-            <a:endParaRPr lang="en-US" dirty="0"/>
-          </a:p>
-        </p:txBody>
-      </p:sp>
-      <p:sp>
-        <p:nvSpPr>
-          <p:cNvPr id="29" name="Rectangle 28"/>
-          <p:cNvSpPr/>
-          <p:nvPr/>
-        </p:nvSpPr>
-        <p:spPr>
-          <a:xfrm>
-            <a:off x="373529" y="4291106"/>
-            <a:ext cx="1622612" cy="597646"/>
-          </a:xfrm>
-          <a:prstGeom prst="rect">
-            <a:avLst/>
-          </a:prstGeom>
-          <a:noFill/>
-          <a:ln>
-            <a:solidFill>
-              <a:schemeClr val="tx1"/>
-            </a:solidFill>
-          </a:ln>
-        </p:spPr>
-        <p:style>
-          <a:lnRef idx="1">
-            <a:schemeClr val="accent1"/>
-          </a:lnRef>
-          <a:fillRef idx="3">
-            <a:schemeClr val="accent1"/>
-          </a:fillRef>
-          <a:effectRef idx="2">
-            <a:schemeClr val="accent1"/>
-          </a:effectRef>
-          <a:fontRef idx="minor">
-            <a:schemeClr val="lt1"/>
-          </a:fontRef>
-        </p:style>
-        <p:txBody>
-          <a:bodyPr rtlCol="0" anchor="ctr"/>
-          <a:lstStyle/>
-          <a:p>
-            <a:pPr algn="ctr"/>
+              <a:t>Options </a:t>
+            </a:r>
             <a:r>
               <a:rPr lang="en-US" dirty="0" smtClean="0"/>
-              <a:t>Employee</a:t>
-            </a:r>
-            <a:endParaRPr lang="en-US" dirty="0"/>
-          </a:p>
-        </p:txBody>
-      </p:sp>
-      <p:sp>
-        <p:nvSpPr>
-          <p:cNvPr id="30" name="Rectangle 29"/>
-          <p:cNvSpPr/>
-          <p:nvPr/>
-        </p:nvSpPr>
-        <p:spPr>
-          <a:xfrm>
-            <a:off x="373529" y="5112870"/>
-            <a:ext cx="1622612" cy="597646"/>
-          </a:xfrm>
-          <a:prstGeom prst="rect">
-            <a:avLst/>
-          </a:prstGeom>
-          <a:noFill/>
-          <a:ln>
-            <a:solidFill>
-              <a:schemeClr val="tx1"/>
-            </a:solidFill>
-          </a:ln>
-        </p:spPr>
-        <p:style>
-          <a:lnRef idx="1">
-            <a:schemeClr val="accent1"/>
-          </a:lnRef>
-          <a:fillRef idx="3">
-            <a:schemeClr val="accent1"/>
-          </a:fillRef>
-          <a:effectRef idx="2">
-            <a:schemeClr val="accent1"/>
-          </a:effectRef>
-          <a:fontRef idx="minor">
-            <a:schemeClr val="lt1"/>
-          </a:fontRef>
-        </p:style>
-        <p:txBody>
-          <a:bodyPr rtlCol="0" anchor="ctr"/>
-          <a:lstStyle/>
-          <a:p>
-            <a:pPr algn="ctr"/>
+              <a:t>4-6 </a:t>
+            </a:r>
             <a:r>
               <a:rPr lang="en-US" dirty="0" smtClean="0"/>
-              <a:t>Manager</a:t>
-            </a:r>
-            <a:endParaRPr lang="en-US" dirty="0"/>
-          </a:p>
-        </p:txBody>
-      </p:sp>
-      <p:sp>
-        <p:nvSpPr>
-          <p:cNvPr id="31" name="Rectangle 30"/>
-          <p:cNvSpPr/>
-          <p:nvPr/>
-        </p:nvSpPr>
-        <p:spPr>
-          <a:xfrm>
-            <a:off x="2348752" y="4279153"/>
-            <a:ext cx="1622612" cy="597646"/>
-          </a:xfrm>
-          <a:prstGeom prst="rect">
-            <a:avLst/>
-          </a:prstGeom>
-          <a:noFill/>
-          <a:ln>
-            <a:solidFill>
-              <a:schemeClr val="tx1"/>
-            </a:solidFill>
-          </a:ln>
-        </p:spPr>
-        <p:style>
-          <a:lnRef idx="1">
-            <a:schemeClr val="accent1"/>
-          </a:lnRef>
-          <a:fillRef idx="3">
-            <a:schemeClr val="accent1"/>
-          </a:fillRef>
-          <a:effectRef idx="2">
-            <a:schemeClr val="accent1"/>
-          </a:effectRef>
-          <a:fontRef idx="minor">
-            <a:schemeClr val="lt1"/>
-          </a:fontRef>
-        </p:style>
-        <p:txBody>
-          <a:bodyPr rtlCol="0" anchor="ctr"/>
-          <a:lstStyle/>
-          <a:p>
-            <a:pPr algn="ctr"/>
+              <a:t>allows the user to interact with the databases to edit employees (Add a new employee, edit an existing, or remove an employee), edit store </a:t>
+            </a:r>
+            <a:r>
+              <a:rPr lang="en-US" dirty="0"/>
+              <a:t>transactions </a:t>
+            </a:r>
             <a:r>
               <a:rPr lang="en-US" dirty="0" smtClean="0"/>
-              <a:t>Customer</a:t>
-            </a:r>
-            <a:endParaRPr lang="en-US" dirty="0"/>
-          </a:p>
-        </p:txBody>
-      </p:sp>
-      <p:cxnSp>
-        <p:nvCxnSpPr>
-          <p:cNvPr id="32" name="Straight Arrow Connector 31"/>
-          <p:cNvCxnSpPr>
-            <a:stCxn id="29" idx="0"/>
-            <a:endCxn id="28" idx="2"/>
-          </p:cNvCxnSpPr>
-          <p:nvPr/>
-        </p:nvCxnSpPr>
-        <p:spPr>
-          <a:xfrm flipV="1">
-            <a:off x="1184835" y="4019175"/>
-            <a:ext cx="1090705" cy="271931"/>
-          </a:xfrm>
-          <a:prstGeom prst="straightConnector1">
-            <a:avLst/>
-          </a:prstGeom>
-          <a:ln>
-            <a:solidFill>
-              <a:srgbClr val="FFFFFF"/>
-            </a:solidFill>
-            <a:tailEnd type="arrow"/>
-          </a:ln>
-        </p:spPr>
-        <p:style>
-          <a:lnRef idx="2">
-            <a:schemeClr val="accent1"/>
-          </a:lnRef>
-          <a:fillRef idx="0">
-            <a:schemeClr val="accent1"/>
-          </a:fillRef>
-          <a:effectRef idx="1">
-            <a:schemeClr val="accent1"/>
-          </a:effectRef>
-          <a:fontRef idx="minor">
-            <a:schemeClr val="tx1"/>
-          </a:fontRef>
-        </p:style>
-      </p:cxnSp>
-      <p:cxnSp>
-        <p:nvCxnSpPr>
-          <p:cNvPr id="35" name="Straight Arrow Connector 34"/>
-          <p:cNvCxnSpPr>
-            <a:stCxn id="31" idx="0"/>
-            <a:endCxn id="28" idx="2"/>
-          </p:cNvCxnSpPr>
-          <p:nvPr/>
-        </p:nvCxnSpPr>
-        <p:spPr>
-          <a:xfrm flipH="1" flipV="1">
-            <a:off x="2275540" y="4019175"/>
-            <a:ext cx="884518" cy="259978"/>
-          </a:xfrm>
-          <a:prstGeom prst="straightConnector1">
-            <a:avLst/>
-          </a:prstGeom>
-          <a:ln>
-            <a:solidFill>
-              <a:srgbClr val="FFFFFF"/>
-            </a:solidFill>
-            <a:tailEnd type="arrow"/>
-          </a:ln>
-        </p:spPr>
-        <p:style>
-          <a:lnRef idx="2">
-            <a:schemeClr val="accent1"/>
-          </a:lnRef>
-          <a:fillRef idx="0">
-            <a:schemeClr val="accent1"/>
-          </a:fillRef>
-          <a:effectRef idx="1">
-            <a:schemeClr val="accent1"/>
-          </a:effectRef>
-          <a:fontRef idx="minor">
-            <a:schemeClr val="tx1"/>
-          </a:fontRef>
-        </p:style>
-      </p:cxnSp>
-      <p:cxnSp>
-        <p:nvCxnSpPr>
-          <p:cNvPr id="38" name="Straight Arrow Connector 37"/>
-          <p:cNvCxnSpPr/>
-          <p:nvPr/>
-        </p:nvCxnSpPr>
-        <p:spPr>
-          <a:xfrm flipV="1">
-            <a:off x="1184835" y="4873811"/>
-            <a:ext cx="0" cy="224118"/>
-          </a:xfrm>
-          <a:prstGeom prst="straightConnector1">
-            <a:avLst/>
-          </a:prstGeom>
-          <a:ln>
-            <a:solidFill>
-              <a:srgbClr val="FFFFFF"/>
-            </a:solidFill>
-            <a:tailEnd type="arrow"/>
-          </a:ln>
-        </p:spPr>
-        <p:style>
-          <a:lnRef idx="2">
-            <a:schemeClr val="accent1"/>
-          </a:lnRef>
-          <a:fillRef idx="0">
-            <a:schemeClr val="accent1"/>
-          </a:fillRef>
-          <a:effectRef idx="1">
-            <a:schemeClr val="accent1"/>
-          </a:effectRef>
-          <a:fontRef idx="minor">
-            <a:schemeClr val="tx1"/>
-          </a:fontRef>
-        </p:style>
-      </p:cxnSp>
-      <p:sp>
-        <p:nvSpPr>
-          <p:cNvPr id="41" name="Rectangle 40"/>
-          <p:cNvSpPr/>
-          <p:nvPr/>
-        </p:nvSpPr>
-        <p:spPr>
-          <a:xfrm>
-            <a:off x="8997577" y="4231345"/>
-            <a:ext cx="1778000" cy="597646"/>
-          </a:xfrm>
-          <a:prstGeom prst="rect">
-            <a:avLst/>
-          </a:prstGeom>
-          <a:noFill/>
-          <a:ln>
-            <a:solidFill>
-              <a:schemeClr val="tx1"/>
-            </a:solidFill>
-          </a:ln>
-        </p:spPr>
-        <p:style>
-          <a:lnRef idx="1">
-            <a:schemeClr val="accent1"/>
-          </a:lnRef>
-          <a:fillRef idx="3">
-            <a:schemeClr val="accent1"/>
-          </a:fillRef>
-          <a:effectRef idx="2">
-            <a:schemeClr val="accent1"/>
-          </a:effectRef>
-          <a:fontRef idx="minor">
-            <a:schemeClr val="lt1"/>
-          </a:fontRef>
-        </p:style>
-        <p:txBody>
-          <a:bodyPr rtlCol="0" anchor="ctr"/>
-          <a:lstStyle/>
-          <a:p>
-            <a:pPr algn="ctr"/>
+              <a:t>(Reorder, Order new, remove an order, or view an order), and edit the inventory (Add new, remove, and view)</a:t>
+            </a:r>
+          </a:p>
+          <a:p>
             <a:r>
               <a:rPr lang="en-US" dirty="0" smtClean="0"/>
-              <a:t>Order</a:t>
-            </a:r>
-            <a:endParaRPr lang="en-US" dirty="0"/>
-          </a:p>
-        </p:txBody>
-      </p:sp>
-      <p:sp>
-        <p:nvSpPr>
-          <p:cNvPr id="42" name="Rectangle 41"/>
-          <p:cNvSpPr/>
-          <p:nvPr/>
-        </p:nvSpPr>
-        <p:spPr>
-          <a:xfrm>
-            <a:off x="9000565" y="5056098"/>
-            <a:ext cx="1775011" cy="597646"/>
-          </a:xfrm>
-          <a:prstGeom prst="rect">
-            <a:avLst/>
-          </a:prstGeom>
-          <a:noFill/>
-          <a:ln>
-            <a:solidFill>
-              <a:schemeClr val="tx1"/>
-            </a:solidFill>
-          </a:ln>
-        </p:spPr>
-        <p:style>
-          <a:lnRef idx="1">
-            <a:schemeClr val="accent1"/>
-          </a:lnRef>
-          <a:fillRef idx="3">
-            <a:schemeClr val="accent1"/>
-          </a:fillRef>
-          <a:effectRef idx="2">
-            <a:schemeClr val="accent1"/>
-          </a:effectRef>
-          <a:fontRef idx="minor">
-            <a:schemeClr val="lt1"/>
-          </a:fontRef>
-        </p:style>
-        <p:txBody>
-          <a:bodyPr rtlCol="0" anchor="ctr"/>
-          <a:lstStyle/>
-          <a:p>
-            <a:pPr algn="ctr"/>
-            <a:r>
-              <a:rPr lang="en-US" dirty="0" err="1" smtClean="0"/>
-              <a:t>StoreOrder</a:t>
-            </a:r>
-            <a:endParaRPr lang="en-US" dirty="0"/>
-          </a:p>
-        </p:txBody>
-      </p:sp>
-      <p:cxnSp>
-        <p:nvCxnSpPr>
-          <p:cNvPr id="43" name="Straight Arrow Connector 42"/>
-          <p:cNvCxnSpPr/>
-          <p:nvPr/>
-        </p:nvCxnSpPr>
-        <p:spPr>
-          <a:xfrm flipH="1" flipV="1">
-            <a:off x="9901519" y="4799110"/>
-            <a:ext cx="1494" cy="227107"/>
-          </a:xfrm>
-          <a:prstGeom prst="straightConnector1">
-            <a:avLst/>
-          </a:prstGeom>
-          <a:ln>
-            <a:solidFill>
-              <a:srgbClr val="FFFFFF"/>
-            </a:solidFill>
-            <a:tailEnd type="arrow"/>
-          </a:ln>
-        </p:spPr>
-        <p:style>
-          <a:lnRef idx="2">
-            <a:schemeClr val="accent1"/>
-          </a:lnRef>
-          <a:fillRef idx="0">
-            <a:schemeClr val="accent1"/>
-          </a:fillRef>
-          <a:effectRef idx="1">
-            <a:schemeClr val="accent1"/>
-          </a:effectRef>
-          <a:fontRef idx="minor">
-            <a:schemeClr val="tx1"/>
-          </a:fontRef>
-        </p:style>
-      </p:cxnSp>
-      <p:sp>
-        <p:nvSpPr>
-          <p:cNvPr id="44" name="Rectangle 43"/>
-          <p:cNvSpPr/>
-          <p:nvPr/>
-        </p:nvSpPr>
-        <p:spPr>
-          <a:xfrm>
-            <a:off x="8686800" y="1314824"/>
-            <a:ext cx="1760070" cy="597646"/>
-          </a:xfrm>
-          <a:prstGeom prst="rect">
-            <a:avLst/>
-          </a:prstGeom>
-          <a:noFill/>
-          <a:ln>
-            <a:solidFill>
-              <a:schemeClr val="tx1"/>
-            </a:solidFill>
-          </a:ln>
-        </p:spPr>
-        <p:style>
-          <a:lnRef idx="1">
-            <a:schemeClr val="accent1"/>
-          </a:lnRef>
-          <a:fillRef idx="3">
-            <a:schemeClr val="accent1"/>
-          </a:fillRef>
-          <a:effectRef idx="2">
-            <a:schemeClr val="accent1"/>
-          </a:effectRef>
-          <a:fontRef idx="minor">
-            <a:schemeClr val="lt1"/>
-          </a:fontRef>
-        </p:style>
-        <p:txBody>
-          <a:bodyPr rtlCol="0" anchor="ctr"/>
-          <a:lstStyle/>
-          <a:p>
-            <a:pPr algn="ctr"/>
-            <a:r>
-              <a:rPr lang="en-US" dirty="0" smtClean="0"/>
-              <a:t>List</a:t>
-            </a:r>
-            <a:endParaRPr lang="en-US" dirty="0"/>
-          </a:p>
-        </p:txBody>
-      </p:sp>
-      <p:sp>
-        <p:nvSpPr>
-          <p:cNvPr id="45" name="Rectangle 44"/>
-          <p:cNvSpPr/>
-          <p:nvPr/>
-        </p:nvSpPr>
-        <p:spPr>
-          <a:xfrm>
-            <a:off x="7052235" y="2274047"/>
-            <a:ext cx="1622611" cy="597646"/>
-          </a:xfrm>
-          <a:prstGeom prst="rect">
-            <a:avLst/>
-          </a:prstGeom>
-          <a:noFill/>
-          <a:ln>
-            <a:solidFill>
-              <a:schemeClr val="tx1"/>
-            </a:solidFill>
-          </a:ln>
-        </p:spPr>
-        <p:style>
-          <a:lnRef idx="1">
-            <a:schemeClr val="accent1"/>
-          </a:lnRef>
-          <a:fillRef idx="3">
-            <a:schemeClr val="accent1"/>
-          </a:fillRef>
-          <a:effectRef idx="2">
-            <a:schemeClr val="accent1"/>
-          </a:effectRef>
-          <a:fontRef idx="minor">
-            <a:schemeClr val="lt1"/>
-          </a:fontRef>
-        </p:style>
-        <p:txBody>
-          <a:bodyPr rtlCol="0" anchor="ctr"/>
-          <a:lstStyle/>
-          <a:p>
-            <a:pPr algn="ctr"/>
-            <a:r>
-              <a:rPr lang="en-US" dirty="0" err="1" smtClean="0"/>
-              <a:t>EmployeeList</a:t>
-            </a:r>
-            <a:endParaRPr lang="en-US" dirty="0"/>
-          </a:p>
-        </p:txBody>
-      </p:sp>
-      <p:sp>
-        <p:nvSpPr>
-          <p:cNvPr id="46" name="Rectangle 45"/>
-          <p:cNvSpPr/>
-          <p:nvPr/>
-        </p:nvSpPr>
-        <p:spPr>
-          <a:xfrm>
-            <a:off x="8845176" y="2262094"/>
-            <a:ext cx="1568824" cy="597646"/>
-          </a:xfrm>
-          <a:prstGeom prst="rect">
-            <a:avLst/>
-          </a:prstGeom>
-          <a:noFill/>
-          <a:ln>
-            <a:solidFill>
-              <a:schemeClr val="tx1"/>
-            </a:solidFill>
-          </a:ln>
-        </p:spPr>
-        <p:style>
-          <a:lnRef idx="1">
-            <a:schemeClr val="accent1"/>
-          </a:lnRef>
-          <a:fillRef idx="3">
-            <a:schemeClr val="accent1"/>
-          </a:fillRef>
-          <a:effectRef idx="2">
-            <a:schemeClr val="accent1"/>
-          </a:effectRef>
-          <a:fontRef idx="minor">
-            <a:schemeClr val="lt1"/>
-          </a:fontRef>
-        </p:style>
-        <p:txBody>
-          <a:bodyPr rtlCol="0" anchor="ctr"/>
-          <a:lstStyle/>
-          <a:p>
-            <a:pPr algn="ctr"/>
-            <a:r>
-              <a:rPr lang="en-US" dirty="0" err="1" smtClean="0"/>
-              <a:t>InventoryList</a:t>
-            </a:r>
-            <a:endParaRPr lang="en-US" dirty="0"/>
-          </a:p>
-        </p:txBody>
-      </p:sp>
-      <p:sp>
-        <p:nvSpPr>
-          <p:cNvPr id="47" name="Rectangle 46"/>
-          <p:cNvSpPr/>
-          <p:nvPr/>
-        </p:nvSpPr>
-        <p:spPr>
-          <a:xfrm>
-            <a:off x="10572375" y="2265082"/>
-            <a:ext cx="1350683" cy="597646"/>
-          </a:xfrm>
-          <a:prstGeom prst="rect">
-            <a:avLst/>
-          </a:prstGeom>
-          <a:noFill/>
-          <a:ln>
-            <a:solidFill>
-              <a:schemeClr val="tx1"/>
-            </a:solidFill>
-          </a:ln>
-        </p:spPr>
-        <p:style>
-          <a:lnRef idx="1">
-            <a:schemeClr val="accent1"/>
-          </a:lnRef>
-          <a:fillRef idx="3">
-            <a:schemeClr val="accent1"/>
-          </a:fillRef>
-          <a:effectRef idx="2">
-            <a:schemeClr val="accent1"/>
-          </a:effectRef>
-          <a:fontRef idx="minor">
-            <a:schemeClr val="lt1"/>
-          </a:fontRef>
-        </p:style>
-        <p:txBody>
-          <a:bodyPr rtlCol="0" anchor="ctr"/>
-          <a:lstStyle/>
-          <a:p>
-            <a:pPr algn="ctr"/>
-            <a:r>
-              <a:rPr lang="en-US" dirty="0" err="1" smtClean="0"/>
-              <a:t>OrderList</a:t>
-            </a:r>
-            <a:endParaRPr lang="en-US" dirty="0"/>
-          </a:p>
-        </p:txBody>
-      </p:sp>
-      <p:cxnSp>
-        <p:nvCxnSpPr>
-          <p:cNvPr id="48" name="Straight Arrow Connector 47"/>
-          <p:cNvCxnSpPr>
-            <a:stCxn id="46" idx="0"/>
-            <a:endCxn id="44" idx="2"/>
-          </p:cNvCxnSpPr>
-          <p:nvPr/>
-        </p:nvCxnSpPr>
-        <p:spPr>
-          <a:xfrm flipH="1" flipV="1">
-            <a:off x="9566835" y="1912470"/>
-            <a:ext cx="62753" cy="349624"/>
-          </a:xfrm>
-          <a:prstGeom prst="straightConnector1">
-            <a:avLst/>
-          </a:prstGeom>
-          <a:ln>
-            <a:solidFill>
-              <a:srgbClr val="FFFFFF"/>
-            </a:solidFill>
-            <a:tailEnd type="arrow"/>
-          </a:ln>
-        </p:spPr>
-        <p:style>
-          <a:lnRef idx="2">
-            <a:schemeClr val="accent1"/>
-          </a:lnRef>
-          <a:fillRef idx="0">
-            <a:schemeClr val="accent1"/>
-          </a:fillRef>
-          <a:effectRef idx="1">
-            <a:schemeClr val="accent1"/>
-          </a:effectRef>
-          <a:fontRef idx="minor">
-            <a:schemeClr val="tx1"/>
-          </a:fontRef>
-        </p:style>
-      </p:cxnSp>
-      <p:cxnSp>
-        <p:nvCxnSpPr>
-          <p:cNvPr id="49" name="Straight Arrow Connector 48"/>
-          <p:cNvCxnSpPr>
-            <a:stCxn id="45" idx="0"/>
-            <a:endCxn id="44" idx="2"/>
-          </p:cNvCxnSpPr>
-          <p:nvPr/>
-        </p:nvCxnSpPr>
-        <p:spPr>
-          <a:xfrm flipV="1">
-            <a:off x="7863541" y="1912470"/>
-            <a:ext cx="1703294" cy="361577"/>
-          </a:xfrm>
-          <a:prstGeom prst="straightConnector1">
-            <a:avLst/>
-          </a:prstGeom>
-          <a:ln>
-            <a:solidFill>
-              <a:srgbClr val="FFFFFF"/>
-            </a:solidFill>
-            <a:tailEnd type="arrow"/>
-          </a:ln>
-        </p:spPr>
-        <p:style>
-          <a:lnRef idx="2">
-            <a:schemeClr val="accent1"/>
-          </a:lnRef>
-          <a:fillRef idx="0">
-            <a:schemeClr val="accent1"/>
-          </a:fillRef>
-          <a:effectRef idx="1">
-            <a:schemeClr val="accent1"/>
-          </a:effectRef>
-          <a:fontRef idx="minor">
-            <a:schemeClr val="tx1"/>
-          </a:fontRef>
-        </p:style>
-      </p:cxnSp>
-      <p:cxnSp>
-        <p:nvCxnSpPr>
-          <p:cNvPr id="50" name="Straight Arrow Connector 49"/>
-          <p:cNvCxnSpPr>
-            <a:stCxn id="47" idx="0"/>
-            <a:endCxn id="44" idx="2"/>
-          </p:cNvCxnSpPr>
-          <p:nvPr/>
-        </p:nvCxnSpPr>
-        <p:spPr>
-          <a:xfrm flipH="1" flipV="1">
-            <a:off x="9566835" y="1912470"/>
-            <a:ext cx="1680882" cy="352612"/>
-          </a:xfrm>
-          <a:prstGeom prst="straightConnector1">
-            <a:avLst/>
-          </a:prstGeom>
-          <a:ln>
-            <a:solidFill>
-              <a:srgbClr val="FFFFFF"/>
-            </a:solidFill>
-            <a:tailEnd type="arrow"/>
-          </a:ln>
-        </p:spPr>
-        <p:style>
-          <a:lnRef idx="2">
-            <a:schemeClr val="accent1"/>
-          </a:lnRef>
-          <a:fillRef idx="0">
-            <a:schemeClr val="accent1"/>
-          </a:fillRef>
-          <a:effectRef idx="1">
-            <a:schemeClr val="accent1"/>
-          </a:effectRef>
-          <a:fontRef idx="minor">
-            <a:schemeClr val="tx1"/>
-          </a:fontRef>
-        </p:style>
-      </p:cxnSp>
-      <p:sp>
-        <p:nvSpPr>
-          <p:cNvPr id="58" name="Rectangle 57"/>
-          <p:cNvSpPr/>
-          <p:nvPr/>
-        </p:nvSpPr>
-        <p:spPr>
-          <a:xfrm>
-            <a:off x="756023" y="1721225"/>
-            <a:ext cx="2635623" cy="597646"/>
-          </a:xfrm>
-          <a:prstGeom prst="rect">
-            <a:avLst/>
-          </a:prstGeom>
-          <a:noFill/>
-          <a:ln>
-            <a:solidFill>
-              <a:schemeClr val="tx1"/>
-            </a:solidFill>
-          </a:ln>
-        </p:spPr>
-        <p:style>
-          <a:lnRef idx="1">
-            <a:schemeClr val="accent1"/>
-          </a:lnRef>
-          <a:fillRef idx="3">
-            <a:schemeClr val="accent1"/>
-          </a:fillRef>
-          <a:effectRef idx="2">
-            <a:schemeClr val="accent1"/>
-          </a:effectRef>
-          <a:fontRef idx="minor">
-            <a:schemeClr val="lt1"/>
-          </a:fontRef>
-        </p:style>
-        <p:txBody>
-          <a:bodyPr rtlCol="0" anchor="ctr"/>
-          <a:lstStyle/>
-          <a:p>
-            <a:pPr algn="ctr"/>
-            <a:r>
-              <a:rPr lang="en-US" dirty="0" err="1" smtClean="0"/>
-              <a:t>BookStoreSystem</a:t>
+              <a:t>Finally, the user can search a book by ISBN to help out customers</a:t>
             </a:r>
             <a:endParaRPr lang="en-US" dirty="0"/>
           </a:p>
@@ -8252,7 +6914,7 @@
     </p:spTree>
     <p:extLst>
       <p:ext uri="{BB962C8B-B14F-4D97-AF65-F5344CB8AC3E}">
-        <p14:creationId xmlns:p14="http://schemas.microsoft.com/office/powerpoint/2010/main" val="2878150280"/>
+        <p14:creationId xmlns:p14="http://schemas.microsoft.com/office/powerpoint/2010/main" val="3414519377"/>
       </p:ext>
     </p:extLst>
   </p:cSld>
@@ -8303,36 +6965,1368 @@
           <a:p>
             <a:r>
               <a:rPr lang="en-US" dirty="0" smtClean="0"/>
-              <a:t>DEMO</a:t>
-            </a:r>
-            <a:endParaRPr lang="en-US" dirty="0"/>
-          </a:p>
-        </p:txBody>
-      </p:sp>
-      <p:sp>
-        <p:nvSpPr>
-          <p:cNvPr id="3" name="Content Placeholder 2"/>
-          <p:cNvSpPr>
-            <a:spLocks noGrp="1"/>
-          </p:cNvSpPr>
-          <p:nvPr>
-            <p:ph idx="1"/>
-          </p:nvPr>
-        </p:nvSpPr>
-        <p:spPr/>
-        <p:txBody>
-          <a:bodyPr/>
-          <a:lstStyle/>
-          <a:p>
+              <a:t>HOW CLASSES INTERACT</a:t>
+            </a:r>
+            <a:endParaRPr lang="en-US" dirty="0"/>
+          </a:p>
+        </p:txBody>
+      </p:sp>
+      <p:sp>
+        <p:nvSpPr>
+          <p:cNvPr id="4" name="Rectangle 3"/>
+          <p:cNvSpPr/>
+          <p:nvPr/>
+        </p:nvSpPr>
+        <p:spPr>
+          <a:xfrm>
+            <a:off x="4915647" y="2510117"/>
+            <a:ext cx="1778000" cy="552825"/>
+          </a:xfrm>
+          <a:prstGeom prst="rect">
+            <a:avLst/>
+          </a:prstGeom>
+          <a:noFill/>
+          <a:ln>
+            <a:solidFill>
+              <a:schemeClr val="tx1"/>
+            </a:solidFill>
+          </a:ln>
+        </p:spPr>
+        <p:style>
+          <a:lnRef idx="1">
+            <a:schemeClr val="accent1"/>
+          </a:lnRef>
+          <a:fillRef idx="3">
+            <a:schemeClr val="accent1"/>
+          </a:fillRef>
+          <a:effectRef idx="2">
+            <a:schemeClr val="accent1"/>
+          </a:effectRef>
+          <a:fontRef idx="minor">
+            <a:schemeClr val="lt1"/>
+          </a:fontRef>
+        </p:style>
+        <p:txBody>
+          <a:bodyPr rtlCol="0" anchor="ctr"/>
+          <a:lstStyle/>
+          <a:p>
+            <a:pPr algn="ctr"/>
             <a:r>
               <a:rPr lang="en-US" dirty="0" smtClean="0"/>
-              <a:t>After explaining how the program works, we should do the demo</a:t>
-            </a:r>
-          </a:p>
-          <a:p>
-            <a:pPr marL="0" indent="0">
-              <a:buNone/>
-            </a:pPr>
+              <a:t>Item</a:t>
+            </a:r>
+            <a:endParaRPr lang="en-US" dirty="0"/>
+          </a:p>
+        </p:txBody>
+      </p:sp>
+      <p:sp>
+        <p:nvSpPr>
+          <p:cNvPr id="5" name="Rectangle 4"/>
+          <p:cNvSpPr/>
+          <p:nvPr/>
+        </p:nvSpPr>
+        <p:spPr>
+          <a:xfrm>
+            <a:off x="4918635" y="3376706"/>
+            <a:ext cx="1775011" cy="510990"/>
+          </a:xfrm>
+          <a:prstGeom prst="rect">
+            <a:avLst/>
+          </a:prstGeom>
+          <a:noFill/>
+          <a:ln>
+            <a:solidFill>
+              <a:schemeClr val="tx1"/>
+            </a:solidFill>
+          </a:ln>
+        </p:spPr>
+        <p:style>
+          <a:lnRef idx="1">
+            <a:schemeClr val="accent1"/>
+          </a:lnRef>
+          <a:fillRef idx="3">
+            <a:schemeClr val="accent1"/>
+          </a:fillRef>
+          <a:effectRef idx="2">
+            <a:schemeClr val="accent1"/>
+          </a:effectRef>
+          <a:fontRef idx="minor">
+            <a:schemeClr val="lt1"/>
+          </a:fontRef>
+        </p:style>
+        <p:txBody>
+          <a:bodyPr rtlCol="0" anchor="ctr"/>
+          <a:lstStyle/>
+          <a:p>
+            <a:pPr algn="ctr"/>
+            <a:r>
+              <a:rPr lang="en-US" dirty="0" smtClean="0"/>
+              <a:t>InventoryItem</a:t>
+            </a:r>
+            <a:endParaRPr lang="en-US" dirty="0"/>
+          </a:p>
+        </p:txBody>
+      </p:sp>
+      <p:sp>
+        <p:nvSpPr>
+          <p:cNvPr id="6" name="Rectangle 5"/>
+          <p:cNvSpPr/>
+          <p:nvPr/>
+        </p:nvSpPr>
+        <p:spPr>
+          <a:xfrm>
+            <a:off x="4918635" y="4228353"/>
+            <a:ext cx="1775011" cy="510990"/>
+          </a:xfrm>
+          <a:prstGeom prst="rect">
+            <a:avLst/>
+          </a:prstGeom>
+          <a:noFill/>
+          <a:ln>
+            <a:solidFill>
+              <a:schemeClr val="tx1"/>
+            </a:solidFill>
+          </a:ln>
+        </p:spPr>
+        <p:style>
+          <a:lnRef idx="1">
+            <a:schemeClr val="accent1"/>
+          </a:lnRef>
+          <a:fillRef idx="3">
+            <a:schemeClr val="accent1"/>
+          </a:fillRef>
+          <a:effectRef idx="2">
+            <a:schemeClr val="accent1"/>
+          </a:effectRef>
+          <a:fontRef idx="minor">
+            <a:schemeClr val="lt1"/>
+          </a:fontRef>
+        </p:style>
+        <p:txBody>
+          <a:bodyPr rtlCol="0" anchor="ctr"/>
+          <a:lstStyle/>
+          <a:p>
+            <a:pPr algn="ctr"/>
+            <a:r>
+              <a:rPr lang="en-US" dirty="0" smtClean="0"/>
+              <a:t>Product</a:t>
+            </a:r>
+            <a:endParaRPr lang="en-US" dirty="0"/>
+          </a:p>
+        </p:txBody>
+      </p:sp>
+      <p:sp>
+        <p:nvSpPr>
+          <p:cNvPr id="7" name="Rectangle 6"/>
+          <p:cNvSpPr/>
+          <p:nvPr/>
+        </p:nvSpPr>
+        <p:spPr>
+          <a:xfrm>
+            <a:off x="4933577" y="5124823"/>
+            <a:ext cx="1760070" cy="496049"/>
+          </a:xfrm>
+          <a:prstGeom prst="rect">
+            <a:avLst/>
+          </a:prstGeom>
+          <a:noFill/>
+          <a:ln>
+            <a:solidFill>
+              <a:schemeClr val="tx1"/>
+            </a:solidFill>
+          </a:ln>
+        </p:spPr>
+        <p:style>
+          <a:lnRef idx="1">
+            <a:schemeClr val="accent1"/>
+          </a:lnRef>
+          <a:fillRef idx="3">
+            <a:schemeClr val="accent1"/>
+          </a:fillRef>
+          <a:effectRef idx="2">
+            <a:schemeClr val="accent1"/>
+          </a:effectRef>
+          <a:fontRef idx="minor">
+            <a:schemeClr val="lt1"/>
+          </a:fontRef>
+        </p:style>
+        <p:txBody>
+          <a:bodyPr rtlCol="0" anchor="ctr"/>
+          <a:lstStyle/>
+          <a:p>
+            <a:pPr algn="ctr"/>
+            <a:r>
+              <a:rPr lang="en-US" dirty="0" smtClean="0"/>
+              <a:t>Book</a:t>
+            </a:r>
+            <a:endParaRPr lang="en-US" dirty="0"/>
+          </a:p>
+        </p:txBody>
+      </p:sp>
+      <p:sp>
+        <p:nvSpPr>
+          <p:cNvPr id="9" name="Rectangle 8"/>
+          <p:cNvSpPr/>
+          <p:nvPr/>
+        </p:nvSpPr>
+        <p:spPr>
+          <a:xfrm>
+            <a:off x="3316941" y="5982450"/>
+            <a:ext cx="1485152" cy="597646"/>
+          </a:xfrm>
+          <a:prstGeom prst="rect">
+            <a:avLst/>
+          </a:prstGeom>
+          <a:noFill/>
+          <a:ln>
+            <a:solidFill>
+              <a:schemeClr val="tx1"/>
+            </a:solidFill>
+          </a:ln>
+        </p:spPr>
+        <p:style>
+          <a:lnRef idx="1">
+            <a:schemeClr val="accent1"/>
+          </a:lnRef>
+          <a:fillRef idx="3">
+            <a:schemeClr val="accent1"/>
+          </a:fillRef>
+          <a:effectRef idx="2">
+            <a:schemeClr val="accent1"/>
+          </a:effectRef>
+          <a:fontRef idx="minor">
+            <a:schemeClr val="lt1"/>
+          </a:fontRef>
+        </p:style>
+        <p:txBody>
+          <a:bodyPr rtlCol="0" anchor="ctr"/>
+          <a:lstStyle/>
+          <a:p>
+            <a:pPr algn="ctr"/>
+            <a:r>
+              <a:rPr lang="en-US" dirty="0" smtClean="0"/>
+              <a:t>eBook</a:t>
+            </a:r>
+            <a:endParaRPr lang="en-US" dirty="0"/>
+          </a:p>
+        </p:txBody>
+      </p:sp>
+      <p:sp>
+        <p:nvSpPr>
+          <p:cNvPr id="10" name="Rectangle 9"/>
+          <p:cNvSpPr/>
+          <p:nvPr/>
+        </p:nvSpPr>
+        <p:spPr>
+          <a:xfrm>
+            <a:off x="4993340" y="5970497"/>
+            <a:ext cx="1610659" cy="597646"/>
+          </a:xfrm>
+          <a:prstGeom prst="rect">
+            <a:avLst/>
+          </a:prstGeom>
+          <a:noFill/>
+          <a:ln>
+            <a:solidFill>
+              <a:schemeClr val="tx1"/>
+            </a:solidFill>
+          </a:ln>
+        </p:spPr>
+        <p:style>
+          <a:lnRef idx="1">
+            <a:schemeClr val="accent1"/>
+          </a:lnRef>
+          <a:fillRef idx="3">
+            <a:schemeClr val="accent1"/>
+          </a:fillRef>
+          <a:effectRef idx="2">
+            <a:schemeClr val="accent1"/>
+          </a:effectRef>
+          <a:fontRef idx="minor">
+            <a:schemeClr val="lt1"/>
+          </a:fontRef>
+        </p:style>
+        <p:txBody>
+          <a:bodyPr rtlCol="0" anchor="ctr"/>
+          <a:lstStyle/>
+          <a:p>
+            <a:pPr algn="ctr"/>
+            <a:r>
+              <a:rPr lang="en-US" dirty="0" smtClean="0"/>
+              <a:t>PaperBook</a:t>
+            </a:r>
+            <a:endParaRPr lang="en-US" dirty="0"/>
+          </a:p>
+        </p:txBody>
+      </p:sp>
+      <p:sp>
+        <p:nvSpPr>
+          <p:cNvPr id="11" name="Rectangle 10"/>
+          <p:cNvSpPr/>
+          <p:nvPr/>
+        </p:nvSpPr>
+        <p:spPr>
+          <a:xfrm>
+            <a:off x="6819152" y="5973485"/>
+            <a:ext cx="1485152" cy="597646"/>
+          </a:xfrm>
+          <a:prstGeom prst="rect">
+            <a:avLst/>
+          </a:prstGeom>
+          <a:noFill/>
+          <a:ln>
+            <a:solidFill>
+              <a:schemeClr val="tx1"/>
+            </a:solidFill>
+          </a:ln>
+        </p:spPr>
+        <p:style>
+          <a:lnRef idx="1">
+            <a:schemeClr val="accent1"/>
+          </a:lnRef>
+          <a:fillRef idx="3">
+            <a:schemeClr val="accent1"/>
+          </a:fillRef>
+          <a:effectRef idx="2">
+            <a:schemeClr val="accent1"/>
+          </a:effectRef>
+          <a:fontRef idx="minor">
+            <a:schemeClr val="lt1"/>
+          </a:fontRef>
+        </p:style>
+        <p:txBody>
+          <a:bodyPr rtlCol="0" anchor="ctr"/>
+          <a:lstStyle/>
+          <a:p>
+            <a:pPr algn="ctr"/>
+            <a:r>
+              <a:rPr lang="en-US" dirty="0" smtClean="0"/>
+              <a:t>AudioBook</a:t>
+            </a:r>
+            <a:endParaRPr lang="en-US" dirty="0"/>
+          </a:p>
+        </p:txBody>
+      </p:sp>
+      <p:cxnSp>
+        <p:nvCxnSpPr>
+          <p:cNvPr id="13" name="Straight Arrow Connector 12"/>
+          <p:cNvCxnSpPr>
+            <a:stCxn id="5" idx="0"/>
+            <a:endCxn id="4" idx="2"/>
+          </p:cNvCxnSpPr>
+          <p:nvPr/>
+        </p:nvCxnSpPr>
+        <p:spPr>
+          <a:xfrm flipH="1" flipV="1">
+            <a:off x="5804647" y="3062942"/>
+            <a:ext cx="1494" cy="313764"/>
+          </a:xfrm>
+          <a:prstGeom prst="straightConnector1">
+            <a:avLst/>
+          </a:prstGeom>
+          <a:ln>
+            <a:solidFill>
+              <a:srgbClr val="FFFFFF"/>
+            </a:solidFill>
+            <a:tailEnd type="arrow"/>
+          </a:ln>
+        </p:spPr>
+        <p:style>
+          <a:lnRef idx="2">
+            <a:schemeClr val="accent1"/>
+          </a:lnRef>
+          <a:fillRef idx="0">
+            <a:schemeClr val="accent1"/>
+          </a:fillRef>
+          <a:effectRef idx="1">
+            <a:schemeClr val="accent1"/>
+          </a:effectRef>
+          <a:fontRef idx="minor">
+            <a:schemeClr val="tx1"/>
+          </a:fontRef>
+        </p:style>
+      </p:cxnSp>
+      <p:cxnSp>
+        <p:nvCxnSpPr>
+          <p:cNvPr id="14" name="Straight Arrow Connector 13"/>
+          <p:cNvCxnSpPr>
+            <a:stCxn id="10" idx="0"/>
+          </p:cNvCxnSpPr>
+          <p:nvPr/>
+        </p:nvCxnSpPr>
+        <p:spPr>
+          <a:xfrm flipH="1" flipV="1">
+            <a:off x="5792694" y="5605933"/>
+            <a:ext cx="5976" cy="364564"/>
+          </a:xfrm>
+          <a:prstGeom prst="straightConnector1">
+            <a:avLst/>
+          </a:prstGeom>
+          <a:ln>
+            <a:solidFill>
+              <a:srgbClr val="FFFFFF"/>
+            </a:solidFill>
+            <a:tailEnd type="arrow"/>
+          </a:ln>
+        </p:spPr>
+        <p:style>
+          <a:lnRef idx="2">
+            <a:schemeClr val="accent1"/>
+          </a:lnRef>
+          <a:fillRef idx="0">
+            <a:schemeClr val="accent1"/>
+          </a:fillRef>
+          <a:effectRef idx="1">
+            <a:schemeClr val="accent1"/>
+          </a:effectRef>
+          <a:fontRef idx="minor">
+            <a:schemeClr val="tx1"/>
+          </a:fontRef>
+        </p:style>
+      </p:cxnSp>
+      <p:cxnSp>
+        <p:nvCxnSpPr>
+          <p:cNvPr id="15" name="Straight Arrow Connector 14"/>
+          <p:cNvCxnSpPr>
+            <a:endCxn id="6" idx="2"/>
+          </p:cNvCxnSpPr>
+          <p:nvPr/>
+        </p:nvCxnSpPr>
+        <p:spPr>
+          <a:xfrm flipH="1" flipV="1">
+            <a:off x="5806141" y="4739343"/>
+            <a:ext cx="5976" cy="274920"/>
+          </a:xfrm>
+          <a:prstGeom prst="straightConnector1">
+            <a:avLst/>
+          </a:prstGeom>
+          <a:ln>
+            <a:solidFill>
+              <a:srgbClr val="FFFFFF"/>
+            </a:solidFill>
+            <a:tailEnd type="arrow"/>
+          </a:ln>
+        </p:spPr>
+        <p:style>
+          <a:lnRef idx="2">
+            <a:schemeClr val="accent1"/>
+          </a:lnRef>
+          <a:fillRef idx="0">
+            <a:schemeClr val="accent1"/>
+          </a:fillRef>
+          <a:effectRef idx="1">
+            <a:schemeClr val="accent1"/>
+          </a:effectRef>
+          <a:fontRef idx="minor">
+            <a:schemeClr val="tx1"/>
+          </a:fontRef>
+        </p:style>
+      </p:cxnSp>
+      <p:cxnSp>
+        <p:nvCxnSpPr>
+          <p:cNvPr id="16" name="Straight Arrow Connector 15"/>
+          <p:cNvCxnSpPr/>
+          <p:nvPr/>
+        </p:nvCxnSpPr>
+        <p:spPr>
+          <a:xfrm flipH="1" flipV="1">
+            <a:off x="5798671" y="3908613"/>
+            <a:ext cx="1494" cy="227107"/>
+          </a:xfrm>
+          <a:prstGeom prst="straightConnector1">
+            <a:avLst/>
+          </a:prstGeom>
+          <a:ln>
+            <a:solidFill>
+              <a:srgbClr val="FFFFFF"/>
+            </a:solidFill>
+            <a:tailEnd type="arrow"/>
+          </a:ln>
+        </p:spPr>
+        <p:style>
+          <a:lnRef idx="2">
+            <a:schemeClr val="accent1"/>
+          </a:lnRef>
+          <a:fillRef idx="0">
+            <a:schemeClr val="accent1"/>
+          </a:fillRef>
+          <a:effectRef idx="1">
+            <a:schemeClr val="accent1"/>
+          </a:effectRef>
+          <a:fontRef idx="minor">
+            <a:schemeClr val="tx1"/>
+          </a:fontRef>
+        </p:style>
+      </p:cxnSp>
+      <p:cxnSp>
+        <p:nvCxnSpPr>
+          <p:cNvPr id="22" name="Straight Arrow Connector 21"/>
+          <p:cNvCxnSpPr>
+            <a:stCxn id="9" idx="0"/>
+            <a:endCxn id="7" idx="2"/>
+          </p:cNvCxnSpPr>
+          <p:nvPr/>
+        </p:nvCxnSpPr>
+        <p:spPr>
+          <a:xfrm flipV="1">
+            <a:off x="4059517" y="5620872"/>
+            <a:ext cx="1754095" cy="361578"/>
+          </a:xfrm>
+          <a:prstGeom prst="straightConnector1">
+            <a:avLst/>
+          </a:prstGeom>
+          <a:ln>
+            <a:solidFill>
+              <a:srgbClr val="FFFFFF"/>
+            </a:solidFill>
+            <a:tailEnd type="arrow"/>
+          </a:ln>
+        </p:spPr>
+        <p:style>
+          <a:lnRef idx="2">
+            <a:schemeClr val="accent1"/>
+          </a:lnRef>
+          <a:fillRef idx="0">
+            <a:schemeClr val="accent1"/>
+          </a:fillRef>
+          <a:effectRef idx="1">
+            <a:schemeClr val="accent1"/>
+          </a:effectRef>
+          <a:fontRef idx="minor">
+            <a:schemeClr val="tx1"/>
+          </a:fontRef>
+        </p:style>
+      </p:cxnSp>
+      <p:cxnSp>
+        <p:nvCxnSpPr>
+          <p:cNvPr id="25" name="Straight Arrow Connector 24"/>
+          <p:cNvCxnSpPr>
+            <a:stCxn id="11" idx="0"/>
+            <a:endCxn id="7" idx="2"/>
+          </p:cNvCxnSpPr>
+          <p:nvPr/>
+        </p:nvCxnSpPr>
+        <p:spPr>
+          <a:xfrm flipH="1" flipV="1">
+            <a:off x="5813612" y="5620872"/>
+            <a:ext cx="1748116" cy="352613"/>
+          </a:xfrm>
+          <a:prstGeom prst="straightConnector1">
+            <a:avLst/>
+          </a:prstGeom>
+          <a:ln>
+            <a:solidFill>
+              <a:srgbClr val="FFFFFF"/>
+            </a:solidFill>
+            <a:tailEnd type="arrow"/>
+          </a:ln>
+        </p:spPr>
+        <p:style>
+          <a:lnRef idx="2">
+            <a:schemeClr val="accent1"/>
+          </a:lnRef>
+          <a:fillRef idx="0">
+            <a:schemeClr val="accent1"/>
+          </a:fillRef>
+          <a:effectRef idx="1">
+            <a:schemeClr val="accent1"/>
+          </a:effectRef>
+          <a:fontRef idx="minor">
+            <a:schemeClr val="tx1"/>
+          </a:fontRef>
+        </p:style>
+      </p:cxnSp>
+      <p:sp>
+        <p:nvSpPr>
+          <p:cNvPr id="28" name="Rectangle 27"/>
+          <p:cNvSpPr/>
+          <p:nvPr/>
+        </p:nvSpPr>
+        <p:spPr>
+          <a:xfrm>
+            <a:off x="1386540" y="3421529"/>
+            <a:ext cx="1778000" cy="597646"/>
+          </a:xfrm>
+          <a:prstGeom prst="rect">
+            <a:avLst/>
+          </a:prstGeom>
+          <a:noFill/>
+          <a:ln>
+            <a:solidFill>
+              <a:schemeClr val="tx1"/>
+            </a:solidFill>
+          </a:ln>
+        </p:spPr>
+        <p:style>
+          <a:lnRef idx="1">
+            <a:schemeClr val="accent1"/>
+          </a:lnRef>
+          <a:fillRef idx="3">
+            <a:schemeClr val="accent1"/>
+          </a:fillRef>
+          <a:effectRef idx="2">
+            <a:schemeClr val="accent1"/>
+          </a:effectRef>
+          <a:fontRef idx="minor">
+            <a:schemeClr val="lt1"/>
+          </a:fontRef>
+        </p:style>
+        <p:txBody>
+          <a:bodyPr rtlCol="0" anchor="ctr"/>
+          <a:lstStyle/>
+          <a:p>
+            <a:pPr algn="ctr"/>
+            <a:r>
+              <a:rPr lang="en-US" dirty="0" smtClean="0"/>
+              <a:t>Person</a:t>
+            </a:r>
+            <a:endParaRPr lang="en-US" dirty="0"/>
+          </a:p>
+        </p:txBody>
+      </p:sp>
+      <p:sp>
+        <p:nvSpPr>
+          <p:cNvPr id="29" name="Rectangle 28"/>
+          <p:cNvSpPr/>
+          <p:nvPr/>
+        </p:nvSpPr>
+        <p:spPr>
+          <a:xfrm>
+            <a:off x="373529" y="4291106"/>
+            <a:ext cx="1622612" cy="597646"/>
+          </a:xfrm>
+          <a:prstGeom prst="rect">
+            <a:avLst/>
+          </a:prstGeom>
+          <a:noFill/>
+          <a:ln>
+            <a:solidFill>
+              <a:schemeClr val="tx1"/>
+            </a:solidFill>
+          </a:ln>
+        </p:spPr>
+        <p:style>
+          <a:lnRef idx="1">
+            <a:schemeClr val="accent1"/>
+          </a:lnRef>
+          <a:fillRef idx="3">
+            <a:schemeClr val="accent1"/>
+          </a:fillRef>
+          <a:effectRef idx="2">
+            <a:schemeClr val="accent1"/>
+          </a:effectRef>
+          <a:fontRef idx="minor">
+            <a:schemeClr val="lt1"/>
+          </a:fontRef>
+        </p:style>
+        <p:txBody>
+          <a:bodyPr rtlCol="0" anchor="ctr"/>
+          <a:lstStyle/>
+          <a:p>
+            <a:pPr algn="ctr"/>
+            <a:r>
+              <a:rPr lang="en-US" dirty="0" smtClean="0"/>
+              <a:t>Employee</a:t>
+            </a:r>
+            <a:endParaRPr lang="en-US" dirty="0"/>
+          </a:p>
+        </p:txBody>
+      </p:sp>
+      <p:sp>
+        <p:nvSpPr>
+          <p:cNvPr id="30" name="Rectangle 29"/>
+          <p:cNvSpPr/>
+          <p:nvPr/>
+        </p:nvSpPr>
+        <p:spPr>
+          <a:xfrm>
+            <a:off x="373529" y="5112870"/>
+            <a:ext cx="1622612" cy="597646"/>
+          </a:xfrm>
+          <a:prstGeom prst="rect">
+            <a:avLst/>
+          </a:prstGeom>
+          <a:noFill/>
+          <a:ln>
+            <a:solidFill>
+              <a:schemeClr val="tx1"/>
+            </a:solidFill>
+          </a:ln>
+        </p:spPr>
+        <p:style>
+          <a:lnRef idx="1">
+            <a:schemeClr val="accent1"/>
+          </a:lnRef>
+          <a:fillRef idx="3">
+            <a:schemeClr val="accent1"/>
+          </a:fillRef>
+          <a:effectRef idx="2">
+            <a:schemeClr val="accent1"/>
+          </a:effectRef>
+          <a:fontRef idx="minor">
+            <a:schemeClr val="lt1"/>
+          </a:fontRef>
+        </p:style>
+        <p:txBody>
+          <a:bodyPr rtlCol="0" anchor="ctr"/>
+          <a:lstStyle/>
+          <a:p>
+            <a:pPr algn="ctr"/>
+            <a:r>
+              <a:rPr lang="en-US" dirty="0" smtClean="0"/>
+              <a:t>Manager</a:t>
+            </a:r>
+            <a:endParaRPr lang="en-US" dirty="0"/>
+          </a:p>
+        </p:txBody>
+      </p:sp>
+      <p:sp>
+        <p:nvSpPr>
+          <p:cNvPr id="31" name="Rectangle 30"/>
+          <p:cNvSpPr/>
+          <p:nvPr/>
+        </p:nvSpPr>
+        <p:spPr>
+          <a:xfrm>
+            <a:off x="2348752" y="4279153"/>
+            <a:ext cx="1622612" cy="597646"/>
+          </a:xfrm>
+          <a:prstGeom prst="rect">
+            <a:avLst/>
+          </a:prstGeom>
+          <a:noFill/>
+          <a:ln>
+            <a:solidFill>
+              <a:schemeClr val="tx1"/>
+            </a:solidFill>
+          </a:ln>
+        </p:spPr>
+        <p:style>
+          <a:lnRef idx="1">
+            <a:schemeClr val="accent1"/>
+          </a:lnRef>
+          <a:fillRef idx="3">
+            <a:schemeClr val="accent1"/>
+          </a:fillRef>
+          <a:effectRef idx="2">
+            <a:schemeClr val="accent1"/>
+          </a:effectRef>
+          <a:fontRef idx="minor">
+            <a:schemeClr val="lt1"/>
+          </a:fontRef>
+        </p:style>
+        <p:txBody>
+          <a:bodyPr rtlCol="0" anchor="ctr"/>
+          <a:lstStyle/>
+          <a:p>
+            <a:pPr algn="ctr"/>
+            <a:r>
+              <a:rPr lang="en-US" dirty="0" smtClean="0"/>
+              <a:t>Customer</a:t>
+            </a:r>
+            <a:endParaRPr lang="en-US" dirty="0"/>
+          </a:p>
+        </p:txBody>
+      </p:sp>
+      <p:cxnSp>
+        <p:nvCxnSpPr>
+          <p:cNvPr id="32" name="Straight Arrow Connector 31"/>
+          <p:cNvCxnSpPr>
+            <a:stCxn id="29" idx="0"/>
+            <a:endCxn id="28" idx="2"/>
+          </p:cNvCxnSpPr>
+          <p:nvPr/>
+        </p:nvCxnSpPr>
+        <p:spPr>
+          <a:xfrm flipV="1">
+            <a:off x="1184835" y="4019175"/>
+            <a:ext cx="1090705" cy="271931"/>
+          </a:xfrm>
+          <a:prstGeom prst="straightConnector1">
+            <a:avLst/>
+          </a:prstGeom>
+          <a:ln>
+            <a:solidFill>
+              <a:srgbClr val="FFFFFF"/>
+            </a:solidFill>
+            <a:tailEnd type="arrow"/>
+          </a:ln>
+        </p:spPr>
+        <p:style>
+          <a:lnRef idx="2">
+            <a:schemeClr val="accent1"/>
+          </a:lnRef>
+          <a:fillRef idx="0">
+            <a:schemeClr val="accent1"/>
+          </a:fillRef>
+          <a:effectRef idx="1">
+            <a:schemeClr val="accent1"/>
+          </a:effectRef>
+          <a:fontRef idx="minor">
+            <a:schemeClr val="tx1"/>
+          </a:fontRef>
+        </p:style>
+      </p:cxnSp>
+      <p:cxnSp>
+        <p:nvCxnSpPr>
+          <p:cNvPr id="35" name="Straight Arrow Connector 34"/>
+          <p:cNvCxnSpPr>
+            <a:stCxn id="31" idx="0"/>
+            <a:endCxn id="28" idx="2"/>
+          </p:cNvCxnSpPr>
+          <p:nvPr/>
+        </p:nvCxnSpPr>
+        <p:spPr>
+          <a:xfrm flipH="1" flipV="1">
+            <a:off x="2275540" y="4019175"/>
+            <a:ext cx="884518" cy="259978"/>
+          </a:xfrm>
+          <a:prstGeom prst="straightConnector1">
+            <a:avLst/>
+          </a:prstGeom>
+          <a:ln>
+            <a:solidFill>
+              <a:srgbClr val="FFFFFF"/>
+            </a:solidFill>
+            <a:tailEnd type="arrow"/>
+          </a:ln>
+        </p:spPr>
+        <p:style>
+          <a:lnRef idx="2">
+            <a:schemeClr val="accent1"/>
+          </a:lnRef>
+          <a:fillRef idx="0">
+            <a:schemeClr val="accent1"/>
+          </a:fillRef>
+          <a:effectRef idx="1">
+            <a:schemeClr val="accent1"/>
+          </a:effectRef>
+          <a:fontRef idx="minor">
+            <a:schemeClr val="tx1"/>
+          </a:fontRef>
+        </p:style>
+      </p:cxnSp>
+      <p:cxnSp>
+        <p:nvCxnSpPr>
+          <p:cNvPr id="38" name="Straight Arrow Connector 37"/>
+          <p:cNvCxnSpPr/>
+          <p:nvPr/>
+        </p:nvCxnSpPr>
+        <p:spPr>
+          <a:xfrm flipV="1">
+            <a:off x="1184835" y="4873811"/>
+            <a:ext cx="0" cy="224118"/>
+          </a:xfrm>
+          <a:prstGeom prst="straightConnector1">
+            <a:avLst/>
+          </a:prstGeom>
+          <a:ln>
+            <a:solidFill>
+              <a:srgbClr val="FFFFFF"/>
+            </a:solidFill>
+            <a:tailEnd type="arrow"/>
+          </a:ln>
+        </p:spPr>
+        <p:style>
+          <a:lnRef idx="2">
+            <a:schemeClr val="accent1"/>
+          </a:lnRef>
+          <a:fillRef idx="0">
+            <a:schemeClr val="accent1"/>
+          </a:fillRef>
+          <a:effectRef idx="1">
+            <a:schemeClr val="accent1"/>
+          </a:effectRef>
+          <a:fontRef idx="minor">
+            <a:schemeClr val="tx1"/>
+          </a:fontRef>
+        </p:style>
+      </p:cxnSp>
+      <p:sp>
+        <p:nvSpPr>
+          <p:cNvPr id="41" name="Rectangle 40"/>
+          <p:cNvSpPr/>
+          <p:nvPr/>
+        </p:nvSpPr>
+        <p:spPr>
+          <a:xfrm>
+            <a:off x="8997577" y="4231345"/>
+            <a:ext cx="1778000" cy="597646"/>
+          </a:xfrm>
+          <a:prstGeom prst="rect">
+            <a:avLst/>
+          </a:prstGeom>
+          <a:noFill/>
+          <a:ln>
+            <a:solidFill>
+              <a:schemeClr val="tx1"/>
+            </a:solidFill>
+          </a:ln>
+        </p:spPr>
+        <p:style>
+          <a:lnRef idx="1">
+            <a:schemeClr val="accent1"/>
+          </a:lnRef>
+          <a:fillRef idx="3">
+            <a:schemeClr val="accent1"/>
+          </a:fillRef>
+          <a:effectRef idx="2">
+            <a:schemeClr val="accent1"/>
+          </a:effectRef>
+          <a:fontRef idx="minor">
+            <a:schemeClr val="lt1"/>
+          </a:fontRef>
+        </p:style>
+        <p:txBody>
+          <a:bodyPr rtlCol="0" anchor="ctr"/>
+          <a:lstStyle/>
+          <a:p>
+            <a:pPr algn="ctr"/>
+            <a:r>
+              <a:rPr lang="en-US" dirty="0" smtClean="0"/>
+              <a:t>Order</a:t>
+            </a:r>
+            <a:endParaRPr lang="en-US" dirty="0"/>
+          </a:p>
+        </p:txBody>
+      </p:sp>
+      <p:sp>
+        <p:nvSpPr>
+          <p:cNvPr id="42" name="Rectangle 41"/>
+          <p:cNvSpPr/>
+          <p:nvPr/>
+        </p:nvSpPr>
+        <p:spPr>
+          <a:xfrm>
+            <a:off x="9000565" y="5056098"/>
+            <a:ext cx="1775011" cy="597646"/>
+          </a:xfrm>
+          <a:prstGeom prst="rect">
+            <a:avLst/>
+          </a:prstGeom>
+          <a:noFill/>
+          <a:ln>
+            <a:solidFill>
+              <a:schemeClr val="tx1"/>
+            </a:solidFill>
+          </a:ln>
+        </p:spPr>
+        <p:style>
+          <a:lnRef idx="1">
+            <a:schemeClr val="accent1"/>
+          </a:lnRef>
+          <a:fillRef idx="3">
+            <a:schemeClr val="accent1"/>
+          </a:fillRef>
+          <a:effectRef idx="2">
+            <a:schemeClr val="accent1"/>
+          </a:effectRef>
+          <a:fontRef idx="minor">
+            <a:schemeClr val="lt1"/>
+          </a:fontRef>
+        </p:style>
+        <p:txBody>
+          <a:bodyPr rtlCol="0" anchor="ctr"/>
+          <a:lstStyle/>
+          <a:p>
+            <a:pPr algn="ctr"/>
+            <a:r>
+              <a:rPr lang="en-US" dirty="0" smtClean="0"/>
+              <a:t>StoreOrder</a:t>
+            </a:r>
+            <a:endParaRPr lang="en-US" dirty="0"/>
+          </a:p>
+        </p:txBody>
+      </p:sp>
+      <p:cxnSp>
+        <p:nvCxnSpPr>
+          <p:cNvPr id="43" name="Straight Arrow Connector 42"/>
+          <p:cNvCxnSpPr/>
+          <p:nvPr/>
+        </p:nvCxnSpPr>
+        <p:spPr>
+          <a:xfrm flipH="1" flipV="1">
+            <a:off x="9901519" y="4799110"/>
+            <a:ext cx="1494" cy="227107"/>
+          </a:xfrm>
+          <a:prstGeom prst="straightConnector1">
+            <a:avLst/>
+          </a:prstGeom>
+          <a:ln>
+            <a:solidFill>
+              <a:srgbClr val="FFFFFF"/>
+            </a:solidFill>
+            <a:tailEnd type="arrow"/>
+          </a:ln>
+        </p:spPr>
+        <p:style>
+          <a:lnRef idx="2">
+            <a:schemeClr val="accent1"/>
+          </a:lnRef>
+          <a:fillRef idx="0">
+            <a:schemeClr val="accent1"/>
+          </a:fillRef>
+          <a:effectRef idx="1">
+            <a:schemeClr val="accent1"/>
+          </a:effectRef>
+          <a:fontRef idx="minor">
+            <a:schemeClr val="tx1"/>
+          </a:fontRef>
+        </p:style>
+      </p:cxnSp>
+      <p:sp>
+        <p:nvSpPr>
+          <p:cNvPr id="44" name="Rectangle 43"/>
+          <p:cNvSpPr/>
+          <p:nvPr/>
+        </p:nvSpPr>
+        <p:spPr>
+          <a:xfrm>
+            <a:off x="8686800" y="1314824"/>
+            <a:ext cx="1760070" cy="597646"/>
+          </a:xfrm>
+          <a:prstGeom prst="rect">
+            <a:avLst/>
+          </a:prstGeom>
+          <a:noFill/>
+          <a:ln>
+            <a:solidFill>
+              <a:schemeClr val="tx1"/>
+            </a:solidFill>
+          </a:ln>
+        </p:spPr>
+        <p:style>
+          <a:lnRef idx="1">
+            <a:schemeClr val="accent1"/>
+          </a:lnRef>
+          <a:fillRef idx="3">
+            <a:schemeClr val="accent1"/>
+          </a:fillRef>
+          <a:effectRef idx="2">
+            <a:schemeClr val="accent1"/>
+          </a:effectRef>
+          <a:fontRef idx="minor">
+            <a:schemeClr val="lt1"/>
+          </a:fontRef>
+        </p:style>
+        <p:txBody>
+          <a:bodyPr rtlCol="0" anchor="ctr"/>
+          <a:lstStyle/>
+          <a:p>
+            <a:pPr algn="ctr"/>
+            <a:r>
+              <a:rPr lang="en-US" dirty="0" smtClean="0"/>
+              <a:t>List</a:t>
+            </a:r>
+            <a:endParaRPr lang="en-US" dirty="0"/>
+          </a:p>
+        </p:txBody>
+      </p:sp>
+      <p:sp>
+        <p:nvSpPr>
+          <p:cNvPr id="45" name="Rectangle 44"/>
+          <p:cNvSpPr/>
+          <p:nvPr/>
+        </p:nvSpPr>
+        <p:spPr>
+          <a:xfrm>
+            <a:off x="7052235" y="2274047"/>
+            <a:ext cx="1622611" cy="597646"/>
+          </a:xfrm>
+          <a:prstGeom prst="rect">
+            <a:avLst/>
+          </a:prstGeom>
+          <a:noFill/>
+          <a:ln>
+            <a:solidFill>
+              <a:schemeClr val="tx1"/>
+            </a:solidFill>
+          </a:ln>
+        </p:spPr>
+        <p:style>
+          <a:lnRef idx="1">
+            <a:schemeClr val="accent1"/>
+          </a:lnRef>
+          <a:fillRef idx="3">
+            <a:schemeClr val="accent1"/>
+          </a:fillRef>
+          <a:effectRef idx="2">
+            <a:schemeClr val="accent1"/>
+          </a:effectRef>
+          <a:fontRef idx="minor">
+            <a:schemeClr val="lt1"/>
+          </a:fontRef>
+        </p:style>
+        <p:txBody>
+          <a:bodyPr rtlCol="0" anchor="ctr"/>
+          <a:lstStyle/>
+          <a:p>
+            <a:pPr algn="ctr"/>
+            <a:r>
+              <a:rPr lang="en-US" dirty="0" smtClean="0"/>
+              <a:t>EmployeeList</a:t>
+            </a:r>
+            <a:endParaRPr lang="en-US" dirty="0"/>
+          </a:p>
+        </p:txBody>
+      </p:sp>
+      <p:sp>
+        <p:nvSpPr>
+          <p:cNvPr id="46" name="Rectangle 45"/>
+          <p:cNvSpPr/>
+          <p:nvPr/>
+        </p:nvSpPr>
+        <p:spPr>
+          <a:xfrm>
+            <a:off x="8845176" y="2262094"/>
+            <a:ext cx="1568824" cy="597646"/>
+          </a:xfrm>
+          <a:prstGeom prst="rect">
+            <a:avLst/>
+          </a:prstGeom>
+          <a:noFill/>
+          <a:ln>
+            <a:solidFill>
+              <a:schemeClr val="tx1"/>
+            </a:solidFill>
+          </a:ln>
+        </p:spPr>
+        <p:style>
+          <a:lnRef idx="1">
+            <a:schemeClr val="accent1"/>
+          </a:lnRef>
+          <a:fillRef idx="3">
+            <a:schemeClr val="accent1"/>
+          </a:fillRef>
+          <a:effectRef idx="2">
+            <a:schemeClr val="accent1"/>
+          </a:effectRef>
+          <a:fontRef idx="minor">
+            <a:schemeClr val="lt1"/>
+          </a:fontRef>
+        </p:style>
+        <p:txBody>
+          <a:bodyPr rtlCol="0" anchor="ctr"/>
+          <a:lstStyle/>
+          <a:p>
+            <a:pPr algn="ctr"/>
+            <a:r>
+              <a:rPr lang="en-US" dirty="0" smtClean="0"/>
+              <a:t>InventoryList</a:t>
+            </a:r>
+            <a:endParaRPr lang="en-US" dirty="0"/>
+          </a:p>
+        </p:txBody>
+      </p:sp>
+      <p:sp>
+        <p:nvSpPr>
+          <p:cNvPr id="47" name="Rectangle 46"/>
+          <p:cNvSpPr/>
+          <p:nvPr/>
+        </p:nvSpPr>
+        <p:spPr>
+          <a:xfrm>
+            <a:off x="10572375" y="2265082"/>
+            <a:ext cx="1350683" cy="597646"/>
+          </a:xfrm>
+          <a:prstGeom prst="rect">
+            <a:avLst/>
+          </a:prstGeom>
+          <a:noFill/>
+          <a:ln>
+            <a:solidFill>
+              <a:schemeClr val="tx1"/>
+            </a:solidFill>
+          </a:ln>
+        </p:spPr>
+        <p:style>
+          <a:lnRef idx="1">
+            <a:schemeClr val="accent1"/>
+          </a:lnRef>
+          <a:fillRef idx="3">
+            <a:schemeClr val="accent1"/>
+          </a:fillRef>
+          <a:effectRef idx="2">
+            <a:schemeClr val="accent1"/>
+          </a:effectRef>
+          <a:fontRef idx="minor">
+            <a:schemeClr val="lt1"/>
+          </a:fontRef>
+        </p:style>
+        <p:txBody>
+          <a:bodyPr rtlCol="0" anchor="ctr"/>
+          <a:lstStyle/>
+          <a:p>
+            <a:pPr algn="ctr"/>
+            <a:r>
+              <a:rPr lang="en-US" dirty="0" smtClean="0"/>
+              <a:t>OrderList</a:t>
+            </a:r>
+            <a:endParaRPr lang="en-US" dirty="0"/>
+          </a:p>
+        </p:txBody>
+      </p:sp>
+      <p:cxnSp>
+        <p:nvCxnSpPr>
+          <p:cNvPr id="48" name="Straight Arrow Connector 47"/>
+          <p:cNvCxnSpPr>
+            <a:stCxn id="46" idx="0"/>
+            <a:endCxn id="44" idx="2"/>
+          </p:cNvCxnSpPr>
+          <p:nvPr/>
+        </p:nvCxnSpPr>
+        <p:spPr>
+          <a:xfrm flipH="1" flipV="1">
+            <a:off x="9566835" y="1912470"/>
+            <a:ext cx="62753" cy="349624"/>
+          </a:xfrm>
+          <a:prstGeom prst="straightConnector1">
+            <a:avLst/>
+          </a:prstGeom>
+          <a:ln>
+            <a:solidFill>
+              <a:srgbClr val="FFFFFF"/>
+            </a:solidFill>
+            <a:tailEnd type="arrow"/>
+          </a:ln>
+        </p:spPr>
+        <p:style>
+          <a:lnRef idx="2">
+            <a:schemeClr val="accent1"/>
+          </a:lnRef>
+          <a:fillRef idx="0">
+            <a:schemeClr val="accent1"/>
+          </a:fillRef>
+          <a:effectRef idx="1">
+            <a:schemeClr val="accent1"/>
+          </a:effectRef>
+          <a:fontRef idx="minor">
+            <a:schemeClr val="tx1"/>
+          </a:fontRef>
+        </p:style>
+      </p:cxnSp>
+      <p:cxnSp>
+        <p:nvCxnSpPr>
+          <p:cNvPr id="49" name="Straight Arrow Connector 48"/>
+          <p:cNvCxnSpPr>
+            <a:stCxn id="45" idx="0"/>
+            <a:endCxn id="44" idx="2"/>
+          </p:cNvCxnSpPr>
+          <p:nvPr/>
+        </p:nvCxnSpPr>
+        <p:spPr>
+          <a:xfrm flipV="1">
+            <a:off x="7863541" y="1912470"/>
+            <a:ext cx="1703294" cy="361577"/>
+          </a:xfrm>
+          <a:prstGeom prst="straightConnector1">
+            <a:avLst/>
+          </a:prstGeom>
+          <a:ln>
+            <a:solidFill>
+              <a:srgbClr val="FFFFFF"/>
+            </a:solidFill>
+            <a:tailEnd type="arrow"/>
+          </a:ln>
+        </p:spPr>
+        <p:style>
+          <a:lnRef idx="2">
+            <a:schemeClr val="accent1"/>
+          </a:lnRef>
+          <a:fillRef idx="0">
+            <a:schemeClr val="accent1"/>
+          </a:fillRef>
+          <a:effectRef idx="1">
+            <a:schemeClr val="accent1"/>
+          </a:effectRef>
+          <a:fontRef idx="minor">
+            <a:schemeClr val="tx1"/>
+          </a:fontRef>
+        </p:style>
+      </p:cxnSp>
+      <p:cxnSp>
+        <p:nvCxnSpPr>
+          <p:cNvPr id="50" name="Straight Arrow Connector 49"/>
+          <p:cNvCxnSpPr>
+            <a:stCxn id="47" idx="0"/>
+            <a:endCxn id="44" idx="2"/>
+          </p:cNvCxnSpPr>
+          <p:nvPr/>
+        </p:nvCxnSpPr>
+        <p:spPr>
+          <a:xfrm flipH="1" flipV="1">
+            <a:off x="9566835" y="1912470"/>
+            <a:ext cx="1680882" cy="352612"/>
+          </a:xfrm>
+          <a:prstGeom prst="straightConnector1">
+            <a:avLst/>
+          </a:prstGeom>
+          <a:ln>
+            <a:solidFill>
+              <a:srgbClr val="FFFFFF"/>
+            </a:solidFill>
+            <a:tailEnd type="arrow"/>
+          </a:ln>
+        </p:spPr>
+        <p:style>
+          <a:lnRef idx="2">
+            <a:schemeClr val="accent1"/>
+          </a:lnRef>
+          <a:fillRef idx="0">
+            <a:schemeClr val="accent1"/>
+          </a:fillRef>
+          <a:effectRef idx="1">
+            <a:schemeClr val="accent1"/>
+          </a:effectRef>
+          <a:fontRef idx="minor">
+            <a:schemeClr val="tx1"/>
+          </a:fontRef>
+        </p:style>
+      </p:cxnSp>
+      <p:sp>
+        <p:nvSpPr>
+          <p:cNvPr id="58" name="Rectangle 57"/>
+          <p:cNvSpPr/>
+          <p:nvPr/>
+        </p:nvSpPr>
+        <p:spPr>
+          <a:xfrm>
+            <a:off x="756023" y="1721225"/>
+            <a:ext cx="2635623" cy="597646"/>
+          </a:xfrm>
+          <a:prstGeom prst="rect">
+            <a:avLst/>
+          </a:prstGeom>
+          <a:noFill/>
+          <a:ln>
+            <a:solidFill>
+              <a:schemeClr val="tx1"/>
+            </a:solidFill>
+          </a:ln>
+        </p:spPr>
+        <p:style>
+          <a:lnRef idx="1">
+            <a:schemeClr val="accent1"/>
+          </a:lnRef>
+          <a:fillRef idx="3">
+            <a:schemeClr val="accent1"/>
+          </a:fillRef>
+          <a:effectRef idx="2">
+            <a:schemeClr val="accent1"/>
+          </a:effectRef>
+          <a:fontRef idx="minor">
+            <a:schemeClr val="lt1"/>
+          </a:fontRef>
+        </p:style>
+        <p:txBody>
+          <a:bodyPr rtlCol="0" anchor="ctr"/>
+          <a:lstStyle/>
+          <a:p>
+            <a:pPr algn="ctr"/>
+            <a:r>
+              <a:rPr lang="en-US" dirty="0" smtClean="0"/>
+              <a:t>BookStoreSystem</a:t>
+            </a:r>
             <a:endParaRPr lang="en-US" dirty="0"/>
           </a:p>
         </p:txBody>
@@ -8340,7 +8334,7 @@
     </p:spTree>
     <p:extLst>
       <p:ext uri="{BB962C8B-B14F-4D97-AF65-F5344CB8AC3E}">
-        <p14:creationId xmlns:p14="http://schemas.microsoft.com/office/powerpoint/2010/main" val="3417377940"/>
+        <p14:creationId xmlns:p14="http://schemas.microsoft.com/office/powerpoint/2010/main" val="2878150280"/>
       </p:ext>
     </p:extLst>
   </p:cSld>
@@ -8384,94 +8378,28 @@
             <p:ph type="title"/>
           </p:nvPr>
         </p:nvSpPr>
-        <p:spPr/>
+        <p:spPr>
+          <a:xfrm>
+            <a:off x="1000663" y="1337093"/>
+            <a:ext cx="9601201" cy="3907767"/>
+          </a:xfrm>
+        </p:spPr>
         <p:txBody>
           <a:bodyPr/>
           <a:lstStyle/>
           <a:p>
             <a:r>
-              <a:rPr lang="en-US" dirty="0" smtClean="0"/>
-              <a:t>Problem Statement</a:t>
-            </a:r>
-            <a:endParaRPr lang="en-US" dirty="0"/>
-          </a:p>
-        </p:txBody>
-      </p:sp>
-      <p:sp>
-        <p:nvSpPr>
-          <p:cNvPr id="3" name="Content Placeholder 2"/>
-          <p:cNvSpPr>
-            <a:spLocks noGrp="1"/>
-          </p:cNvSpPr>
-          <p:nvPr>
-            <p:ph idx="1"/>
-          </p:nvPr>
-        </p:nvSpPr>
-        <p:spPr/>
-        <p:txBody>
-          <a:bodyPr/>
-          <a:lstStyle/>
-          <a:p>
-            <a:r>
-              <a:rPr lang="en-US" dirty="0" smtClean="0"/>
-              <a:t>Main Goal:</a:t>
-            </a:r>
-          </a:p>
-          <a:p>
-            <a:pPr marL="457200" lvl="1" indent="0">
-              <a:buNone/>
-            </a:pPr>
-            <a:r>
-              <a:rPr lang="en-US" dirty="0" smtClean="0"/>
-              <a:t>To develop software to manage a bookstores inventory, employee databases and orders.</a:t>
-            </a:r>
-            <a:endParaRPr lang="en-US" dirty="0" smtClean="0"/>
-          </a:p>
-          <a:p>
-            <a:r>
-              <a:rPr lang="en-US" dirty="0" smtClean="0"/>
-              <a:t>This software is designed to be operated by, but not limited to, standard employees and managers.</a:t>
-            </a:r>
-          </a:p>
-          <a:p>
-            <a:r>
-              <a:rPr lang="en-US" dirty="0" smtClean="0"/>
-              <a:t>Non-Functional </a:t>
-            </a:r>
-            <a:r>
-              <a:rPr lang="en-US" dirty="0"/>
-              <a:t>R</a:t>
-            </a:r>
-            <a:r>
-              <a:rPr lang="en-US" dirty="0" smtClean="0"/>
-              <a:t>equirements</a:t>
-            </a:r>
-          </a:p>
-          <a:p>
-            <a:pPr lvl="1"/>
-            <a:r>
-              <a:rPr lang="en-US" dirty="0" smtClean="0"/>
-              <a:t>Operating system: Windows</a:t>
-            </a:r>
-          </a:p>
-          <a:p>
-            <a:pPr lvl="1"/>
-            <a:r>
-              <a:rPr lang="en-US" dirty="0" smtClean="0"/>
-              <a:t>Written in C++ programming language.</a:t>
-            </a:r>
-            <a:endParaRPr lang="en-US" dirty="0" smtClean="0"/>
-          </a:p>
-          <a:p>
-            <a:pPr lvl="1"/>
-            <a:endParaRPr lang="en-US" dirty="0"/>
+              <a:rPr lang="en-US" sz="23900" dirty="0" smtClean="0"/>
+              <a:t>DEMO</a:t>
+            </a:r>
+            <a:endParaRPr lang="en-US" sz="23900" dirty="0"/>
           </a:p>
         </p:txBody>
       </p:sp>
     </p:spTree>
     <p:extLst>
       <p:ext uri="{BB962C8B-B14F-4D97-AF65-F5344CB8AC3E}">
-        <p14:creationId xmlns:p14="http://schemas.microsoft.com/office/powerpoint/2010/main" val="3391240560"/>
+        <p14:creationId xmlns:p14="http://schemas.microsoft.com/office/powerpoint/2010/main" val="3417377940"/>
       </p:ext>
     </p:extLst>
   </p:cSld>
@@ -8540,45 +8468,49 @@
         </p:nvSpPr>
         <p:spPr/>
         <p:txBody>
-          <a:bodyPr/>
-          <a:lstStyle/>
+          <a:bodyPr>
+            <a:normAutofit/>
+          </a:bodyPr>
+          <a:lstStyle/>
+          <a:p>
+            <a:r>
+              <a:rPr lang="en-US" sz="2400" dirty="0" smtClean="0"/>
+              <a:t>We hope to incorporate a keyword search feature that allows employees to search for items by partial titles and authors</a:t>
+            </a:r>
+            <a:r>
+              <a:rPr lang="en-US" sz="2400" dirty="0" smtClean="0"/>
+              <a:t>.</a:t>
+            </a:r>
+            <a:endParaRPr lang="en-US" sz="2400" dirty="0"/>
+          </a:p>
           <a:p>
             <a:pPr lvl="0"/>
             <a:r>
-              <a:rPr lang="en-US" dirty="0" smtClean="0"/>
-              <a:t>Additional search criteria such as keywords and genre.</a:t>
-            </a:r>
-            <a:endParaRPr lang="en-US" dirty="0"/>
-          </a:p>
-          <a:p>
-            <a:pPr lvl="0"/>
-            <a:r>
-              <a:rPr lang="en-US" dirty="0" smtClean="0"/>
-              <a:t>Track statistics</a:t>
-            </a:r>
-          </a:p>
-          <a:p>
-            <a:pPr lvl="1"/>
-            <a:r>
-              <a:rPr lang="en-US" dirty="0" smtClean="0"/>
-              <a:t>Most popular Book, author, etc. </a:t>
-            </a:r>
-            <a:endParaRPr lang="en-US" dirty="0"/>
-          </a:p>
-          <a:p>
-            <a:r>
-              <a:rPr lang="en-US" dirty="0" smtClean="0"/>
-              <a:t>Additional functionality </a:t>
-            </a:r>
-            <a:r>
-              <a:rPr lang="en-US" smtClean="0"/>
-              <a:t>specific to managers </a:t>
-            </a:r>
-            <a:r>
-              <a:rPr lang="en-US" dirty="0" smtClean="0"/>
-              <a:t>such as discount items</a:t>
-            </a:r>
-            <a:endParaRPr lang="en-US" dirty="0"/>
+              <a:rPr lang="en-US" sz="2400" dirty="0" smtClean="0"/>
+              <a:t>Generate sales reports for the owner by most popular book, author, etc.</a:t>
+            </a:r>
+            <a:endParaRPr lang="en-US" sz="2400" dirty="0" smtClean="0"/>
+          </a:p>
+          <a:p>
+            <a:r>
+              <a:rPr lang="en-US" sz="2400" dirty="0" smtClean="0"/>
+              <a:t>Additional </a:t>
+            </a:r>
+            <a:r>
+              <a:rPr lang="en-US" sz="2400" dirty="0" smtClean="0"/>
+              <a:t>functionality specific to managers such as </a:t>
+            </a:r>
+            <a:r>
+              <a:rPr lang="en-US" sz="2400" dirty="0" smtClean="0"/>
+              <a:t>custom discounting items, automatically creating seasonal sales</a:t>
+            </a:r>
+          </a:p>
+          <a:p>
+            <a:r>
+              <a:rPr lang="en-US" sz="2400" dirty="0" smtClean="0"/>
+              <a:t>Some functionality that recommends books to customers by their past purchases, and demographic match</a:t>
+            </a:r>
+            <a:endParaRPr lang="en-US" sz="2400" dirty="0"/>
           </a:p>
         </p:txBody>
       </p:sp>
@@ -8629,39 +8561,21 @@
             <p:ph type="title"/>
           </p:nvPr>
         </p:nvSpPr>
-        <p:spPr/>
+        <p:spPr>
+          <a:xfrm>
+            <a:off x="1146443" y="1850197"/>
+            <a:ext cx="10162787" cy="1910920"/>
+          </a:xfrm>
+        </p:spPr>
         <p:txBody>
           <a:bodyPr/>
           <a:lstStyle/>
           <a:p>
             <a:r>
-              <a:rPr lang="en-US" dirty="0" smtClean="0"/>
+              <a:rPr lang="en-US" sz="11500" dirty="0" smtClean="0"/>
               <a:t>CONCLUSION</a:t>
             </a:r>
-            <a:endParaRPr lang="en-US" dirty="0"/>
-          </a:p>
-        </p:txBody>
-      </p:sp>
-      <p:sp>
-        <p:nvSpPr>
-          <p:cNvPr id="3" name="Content Placeholder 2"/>
-          <p:cNvSpPr>
-            <a:spLocks noGrp="1"/>
-          </p:cNvSpPr>
-          <p:nvPr>
-            <p:ph idx="1"/>
-          </p:nvPr>
-        </p:nvSpPr>
-        <p:spPr/>
-        <p:txBody>
-          <a:bodyPr/>
-          <a:lstStyle/>
-          <a:p>
-            <a:r>
-              <a:rPr lang="en-US" dirty="0" smtClean="0"/>
-              <a:t>Thank You for Listening to Us</a:t>
-            </a:r>
-            <a:endParaRPr lang="en-US" dirty="0"/>
+            <a:endParaRPr lang="en-US" sz="11500" dirty="0"/>
           </a:p>
         </p:txBody>
       </p:sp>

</xml_diff>